<commit_message>
new slides in powerpointpresentation
</commit_message>
<xml_diff>
--- a/powerpoint/final_presentation.pptx
+++ b/powerpoint/final_presentation.pptx
@@ -5,22 +5,27 @@
     <p:sldMasterId id="2147483651" r:id="rId1"/>
   </p:sldMasterIdLst>
   <p:notesMasterIdLst>
-    <p:notesMasterId r:id="rId12"/>
+    <p:notesMasterId r:id="rId17"/>
   </p:notesMasterIdLst>
   <p:handoutMasterIdLst>
-    <p:handoutMasterId r:id="rId13"/>
+    <p:handoutMasterId r:id="rId18"/>
   </p:handoutMasterIdLst>
   <p:sldIdLst>
     <p:sldId id="256" r:id="rId2"/>
     <p:sldId id="274" r:id="rId3"/>
     <p:sldId id="275" r:id="rId4"/>
     <p:sldId id="276" r:id="rId5"/>
-    <p:sldId id="278" r:id="rId6"/>
-    <p:sldId id="277" r:id="rId7"/>
-    <p:sldId id="279" r:id="rId8"/>
-    <p:sldId id="280" r:id="rId9"/>
-    <p:sldId id="261" r:id="rId10"/>
-    <p:sldId id="273" r:id="rId11"/>
+    <p:sldId id="284" r:id="rId6"/>
+    <p:sldId id="278" r:id="rId7"/>
+    <p:sldId id="277" r:id="rId8"/>
+    <p:sldId id="279" r:id="rId9"/>
+    <p:sldId id="280" r:id="rId10"/>
+    <p:sldId id="281" r:id="rId11"/>
+    <p:sldId id="282" r:id="rId12"/>
+    <p:sldId id="283" r:id="rId13"/>
+    <p:sldId id="285" r:id="rId14"/>
+    <p:sldId id="261" r:id="rId15"/>
+    <p:sldId id="273" r:id="rId16"/>
   </p:sldIdLst>
   <p:sldSz cx="9144000" cy="6858000" type="screen4x3"/>
   <p:notesSz cx="6797675" cy="9874250"/>
@@ -2782,6 +2787,1237 @@
       </p:grpSpPr>
       <p:sp>
         <p:nvSpPr>
+          <p:cNvPr id="2" name="Foliennummernplatzhalter 1"/>
+          <p:cNvSpPr>
+            <a:spLocks noGrp="1"/>
+          </p:cNvSpPr>
+          <p:nvPr>
+            <p:ph type="sldNum" sz="quarter" idx="11"/>
+          </p:nvPr>
+        </p:nvSpPr>
+        <p:spPr/>
+        <p:txBody>
+          <a:bodyPr/>
+          <a:lstStyle/>
+          <a:p>
+            <a:fld id="{B69F85DD-1765-4155-BE31-DCDCF098BCB6}" type="slidenum">
+              <a:rPr lang="de-DE" smtClean="0"/>
+              <a:pPr/>
+              <a:t>10</a:t>
+            </a:fld>
+            <a:endParaRPr lang="de-DE"/>
+          </a:p>
+        </p:txBody>
+      </p:sp>
+      <p:sp>
+        <p:nvSpPr>
+          <p:cNvPr id="3" name="Untertitel 2"/>
+          <p:cNvSpPr>
+            <a:spLocks noGrp="1"/>
+          </p:cNvSpPr>
+          <p:nvPr>
+            <p:ph type="subTitle" idx="12"/>
+          </p:nvPr>
+        </p:nvSpPr>
+        <p:spPr/>
+        <p:txBody>
+          <a:bodyPr/>
+          <a:lstStyle/>
+          <a:p>
+            <a:r>
+              <a:rPr lang="de-DE" dirty="0" err="1" smtClean="0"/>
+              <a:t>Trajectories</a:t>
+            </a:r>
+            <a:endParaRPr lang="de-DE" dirty="0"/>
+          </a:p>
+        </p:txBody>
+      </p:sp>
+      <p:sp>
+        <p:nvSpPr>
+          <p:cNvPr id="4" name="Titel 3"/>
+          <p:cNvSpPr>
+            <a:spLocks noGrp="1"/>
+          </p:cNvSpPr>
+          <p:nvPr>
+            <p:ph type="title"/>
+          </p:nvPr>
+        </p:nvSpPr>
+        <p:spPr/>
+        <p:txBody>
+          <a:bodyPr/>
+          <a:lstStyle/>
+          <a:p>
+            <a:r>
+              <a:rPr lang="de-DE" dirty="0" err="1" smtClean="0"/>
+              <a:t>Parameterization</a:t>
+            </a:r>
+            <a:endParaRPr lang="de-DE" dirty="0"/>
+          </a:p>
+        </p:txBody>
+      </p:sp>
+      <p:pic>
+        <p:nvPicPr>
+          <p:cNvPr id="6" name="Inhaltsplatzhalter 5" descr="ApproxInterpol.eps"/>
+          <p:cNvPicPr>
+            <a:picLocks noGrp="1" noChangeAspect="1"/>
+          </p:cNvPicPr>
+          <p:nvPr>
+            <p:ph sz="quarter" idx="13"/>
+          </p:nvPr>
+        </p:nvPicPr>
+        <p:blipFill rotWithShape="1">
+          <a:blip r:embed="rId3">
+            <a:extLst>
+              <a:ext uri="{28A0092B-C50C-407E-A947-70E740481C1C}">
+                <a14:useLocalDpi xmlns:a14="http://schemas.microsoft.com/office/drawing/2010/main" val="0"/>
+              </a:ext>
+            </a:extLst>
+          </a:blip>
+          <a:srcRect l="48248" r="266"/>
+          <a:stretch/>
+        </p:blipFill>
+        <p:spPr>
+          <a:xfrm>
+            <a:off x="101600" y="1281901"/>
+            <a:ext cx="5116818" cy="4916188"/>
+          </a:xfrm>
+        </p:spPr>
+      </p:pic>
+      <p:graphicFrame>
+        <p:nvGraphicFramePr>
+          <p:cNvPr id="7" name="Objekt 6"/>
+          <p:cNvGraphicFramePr>
+            <a:graphicFrameLocks noChangeAspect="1"/>
+          </p:cNvGraphicFramePr>
+          <p:nvPr>
+            <p:extLst>
+              <p:ext uri="{D42A27DB-BD31-4B8C-83A1-F6EECF244321}">
+                <p14:modId xmlns:p14="http://schemas.microsoft.com/office/powerpoint/2010/main" val="1783936355"/>
+              </p:ext>
+            </p:extLst>
+          </p:nvPr>
+        </p:nvGraphicFramePr>
+        <p:xfrm>
+          <a:off x="215900" y="1141626"/>
+          <a:ext cx="635000" cy="1407297"/>
+        </p:xfrm>
+        <a:graphic>
+          <a:graphicData uri="http://schemas.openxmlformats.org/presentationml/2006/ole">
+            <mc:AlternateContent xmlns:mc="http://schemas.openxmlformats.org/markup-compatibility/2006">
+              <mc:Choice xmlns:v="urn:schemas-microsoft-com:vml" Requires="v">
+                <p:oleObj spid="_x0000_s2069" name="Formel" r:id="rId4" imgW="469900" imgH="1041400" progId="Equation.3">
+                  <p:embed/>
+                </p:oleObj>
+              </mc:Choice>
+              <mc:Fallback>
+                <p:oleObj name="Formel" r:id="rId4" imgW="469900" imgH="1041400" progId="Equation.3">
+                  <p:embed/>
+                  <p:pic>
+                    <p:nvPicPr>
+                      <p:cNvPr id="0" name=""/>
+                      <p:cNvPicPr/>
+                      <p:nvPr/>
+                    </p:nvPicPr>
+                    <p:blipFill>
+                      <a:blip r:embed="rId5"/>
+                      <a:stretch>
+                        <a:fillRect/>
+                      </a:stretch>
+                    </p:blipFill>
+                    <p:spPr>
+                      <a:xfrm>
+                        <a:off x="215900" y="1141626"/>
+                        <a:ext cx="635000" cy="1407297"/>
+                      </a:xfrm>
+                      <a:prstGeom prst="rect">
+                        <a:avLst/>
+                      </a:prstGeom>
+                    </p:spPr>
+                  </p:pic>
+                </p:oleObj>
+              </mc:Fallback>
+            </mc:AlternateContent>
+          </a:graphicData>
+        </a:graphic>
+      </p:graphicFrame>
+      <p:graphicFrame>
+        <p:nvGraphicFramePr>
+          <p:cNvPr id="8" name="Objekt 7"/>
+          <p:cNvGraphicFramePr>
+            <a:graphicFrameLocks noChangeAspect="1"/>
+          </p:cNvGraphicFramePr>
+          <p:nvPr>
+            <p:extLst>
+              <p:ext uri="{D42A27DB-BD31-4B8C-83A1-F6EECF244321}">
+                <p14:modId xmlns:p14="http://schemas.microsoft.com/office/powerpoint/2010/main" val="842372637"/>
+              </p:ext>
+            </p:extLst>
+          </p:nvPr>
+        </p:nvGraphicFramePr>
+        <p:xfrm>
+          <a:off x="2659063" y="2830513"/>
+          <a:ext cx="600075" cy="1408112"/>
+        </p:xfrm>
+        <a:graphic>
+          <a:graphicData uri="http://schemas.openxmlformats.org/presentationml/2006/ole">
+            <mc:AlternateContent xmlns:mc="http://schemas.openxmlformats.org/markup-compatibility/2006">
+              <mc:Choice xmlns:v="urn:schemas-microsoft-com:vml" Requires="v">
+                <p:oleObj spid="_x0000_s2070" name="Formel" r:id="rId6" imgW="444500" imgH="1041400" progId="Equation.3">
+                  <p:embed/>
+                </p:oleObj>
+              </mc:Choice>
+              <mc:Fallback>
+                <p:oleObj name="Formel" r:id="rId6" imgW="444500" imgH="1041400" progId="Equation.3">
+                  <p:embed/>
+                  <p:pic>
+                    <p:nvPicPr>
+                      <p:cNvPr id="0" name=""/>
+                      <p:cNvPicPr/>
+                      <p:nvPr/>
+                    </p:nvPicPr>
+                    <p:blipFill>
+                      <a:blip r:embed="rId7"/>
+                      <a:stretch>
+                        <a:fillRect/>
+                      </a:stretch>
+                    </p:blipFill>
+                    <p:spPr>
+                      <a:xfrm>
+                        <a:off x="2659063" y="2830513"/>
+                        <a:ext cx="600075" cy="1408112"/>
+                      </a:xfrm>
+                      <a:prstGeom prst="rect">
+                        <a:avLst/>
+                      </a:prstGeom>
+                    </p:spPr>
+                  </p:pic>
+                </p:oleObj>
+              </mc:Fallback>
+            </mc:AlternateContent>
+          </a:graphicData>
+        </a:graphic>
+      </p:graphicFrame>
+      <p:cxnSp>
+        <p:nvCxnSpPr>
+          <p:cNvPr id="10" name="Gerade Verbindung mit Pfeil 9"/>
+          <p:cNvCxnSpPr/>
+          <p:nvPr/>
+        </p:nvCxnSpPr>
+        <p:spPr bwMode="auto">
+          <a:xfrm>
+            <a:off x="889000" y="1739900"/>
+            <a:ext cx="736600" cy="279400"/>
+          </a:xfrm>
+          <a:prstGeom prst="straightConnector1">
+            <a:avLst/>
+          </a:prstGeom>
+          <a:noFill/>
+          <a:ln w="9525" cap="flat" cmpd="sng" algn="ctr">
+            <a:solidFill>
+              <a:schemeClr val="tx1"/>
+            </a:solidFill>
+            <a:prstDash val="solid"/>
+            <a:round/>
+            <a:headEnd type="none" w="med" len="med"/>
+            <a:tailEnd type="arrow"/>
+          </a:ln>
+          <a:effectLst/>
+        </p:spPr>
+      </p:cxnSp>
+      <p:cxnSp>
+        <p:nvCxnSpPr>
+          <p:cNvPr id="13" name="Gerade Verbindung mit Pfeil 12"/>
+          <p:cNvCxnSpPr>
+            <a:stCxn id="8" idx="1"/>
+          </p:cNvCxnSpPr>
+          <p:nvPr/>
+        </p:nvCxnSpPr>
+        <p:spPr bwMode="auto">
+          <a:xfrm flipH="1" flipV="1">
+            <a:off x="2070100" y="2806701"/>
+            <a:ext cx="588963" cy="727868"/>
+          </a:xfrm>
+          <a:prstGeom prst="straightConnector1">
+            <a:avLst/>
+          </a:prstGeom>
+          <a:noFill/>
+          <a:ln w="9525" cap="flat" cmpd="sng" algn="ctr">
+            <a:solidFill>
+              <a:schemeClr val="tx1"/>
+            </a:solidFill>
+            <a:prstDash val="solid"/>
+            <a:round/>
+            <a:headEnd type="none" w="med" len="med"/>
+            <a:tailEnd type="arrow"/>
+          </a:ln>
+          <a:effectLst/>
+        </p:spPr>
+      </p:cxnSp>
+      <p:graphicFrame>
+        <p:nvGraphicFramePr>
+          <p:cNvPr id="15" name="Objekt 14"/>
+          <p:cNvGraphicFramePr>
+            <a:graphicFrameLocks noChangeAspect="1"/>
+          </p:cNvGraphicFramePr>
+          <p:nvPr>
+            <p:extLst>
+              <p:ext uri="{D42A27DB-BD31-4B8C-83A1-F6EECF244321}">
+                <p14:modId xmlns:p14="http://schemas.microsoft.com/office/powerpoint/2010/main" val="4264526694"/>
+              </p:ext>
+            </p:extLst>
+          </p:nvPr>
+        </p:nvGraphicFramePr>
+        <p:xfrm>
+          <a:off x="5775324" y="3033713"/>
+          <a:ext cx="1793875" cy="1797928"/>
+        </p:xfrm>
+        <a:graphic>
+          <a:graphicData uri="http://schemas.openxmlformats.org/presentationml/2006/ole">
+            <mc:AlternateContent xmlns:mc="http://schemas.openxmlformats.org/markup-compatibility/2006">
+              <mc:Choice xmlns:v="urn:schemas-microsoft-com:vml" Requires="v">
+                <p:oleObj spid="_x0000_s2071" name="Formel" r:id="rId8" imgW="1041400" imgH="1041400" progId="Equation.3">
+                  <p:embed/>
+                </p:oleObj>
+              </mc:Choice>
+              <mc:Fallback>
+                <p:oleObj name="Formel" r:id="rId8" imgW="1041400" imgH="1041400" progId="Equation.3">
+                  <p:embed/>
+                  <p:pic>
+                    <p:nvPicPr>
+                      <p:cNvPr id="0" name=""/>
+                      <p:cNvPicPr/>
+                      <p:nvPr/>
+                    </p:nvPicPr>
+                    <p:blipFill>
+                      <a:blip r:embed="rId9"/>
+                      <a:stretch>
+                        <a:fillRect/>
+                      </a:stretch>
+                    </p:blipFill>
+                    <p:spPr>
+                      <a:xfrm>
+                        <a:off x="5775324" y="3033713"/>
+                        <a:ext cx="1793875" cy="1797928"/>
+                      </a:xfrm>
+                      <a:prstGeom prst="rect">
+                        <a:avLst/>
+                      </a:prstGeom>
+                    </p:spPr>
+                  </p:pic>
+                </p:oleObj>
+              </mc:Fallback>
+            </mc:AlternateContent>
+          </a:graphicData>
+        </a:graphic>
+      </p:graphicFrame>
+      <p:sp>
+        <p:nvSpPr>
+          <p:cNvPr id="19" name="Textfeld 18"/>
+          <p:cNvSpPr txBox="1"/>
+          <p:nvPr/>
+        </p:nvSpPr>
+        <p:spPr>
+          <a:xfrm>
+            <a:off x="5715000" y="1295400"/>
+            <a:ext cx="2959100" cy="1620957"/>
+          </a:xfrm>
+          <a:prstGeom prst="rect">
+            <a:avLst/>
+          </a:prstGeom>
+          <a:noFill/>
+        </p:spPr>
+        <p:txBody>
+          <a:bodyPr wrap="square" rtlCol="0">
+            <a:spAutoFit/>
+          </a:bodyPr>
+          <a:lstStyle/>
+          <a:p>
+            <a:r>
+              <a:rPr lang="de-DE" dirty="0" smtClean="0"/>
+              <a:t>The </a:t>
+            </a:r>
+            <a:r>
+              <a:rPr lang="de-DE" dirty="0" err="1" smtClean="0"/>
+              <a:t>decision</a:t>
+            </a:r>
+            <a:r>
+              <a:rPr lang="de-DE" dirty="0" smtClean="0"/>
+              <a:t> </a:t>
+            </a:r>
+            <a:r>
+              <a:rPr lang="de-DE" dirty="0" err="1" smtClean="0"/>
+              <a:t>of</a:t>
+            </a:r>
+            <a:r>
+              <a:rPr lang="de-DE" dirty="0" smtClean="0"/>
+              <a:t> </a:t>
+            </a:r>
+            <a:r>
+              <a:rPr lang="de-DE" dirty="0" err="1" smtClean="0"/>
+              <a:t>parameterization</a:t>
+            </a:r>
+            <a:r>
+              <a:rPr lang="de-DE" dirty="0" smtClean="0"/>
+              <a:t> </a:t>
+            </a:r>
+            <a:r>
+              <a:rPr lang="de-DE" dirty="0" err="1" smtClean="0"/>
+              <a:t>affect</a:t>
+            </a:r>
+            <a:r>
+              <a:rPr lang="de-DE" dirty="0" smtClean="0"/>
+              <a:t> </a:t>
+            </a:r>
+            <a:r>
+              <a:rPr lang="de-DE" dirty="0" err="1" smtClean="0"/>
+              <a:t>the</a:t>
+            </a:r>
+            <a:r>
+              <a:rPr lang="de-DE" dirty="0" smtClean="0"/>
+              <a:t> </a:t>
+            </a:r>
+            <a:r>
+              <a:rPr lang="de-DE" dirty="0" err="1" smtClean="0"/>
+              <a:t>geometry</a:t>
+            </a:r>
+            <a:r>
+              <a:rPr lang="de-DE" dirty="0" smtClean="0"/>
+              <a:t> </a:t>
+            </a:r>
+            <a:r>
+              <a:rPr lang="de-DE" dirty="0" err="1" smtClean="0"/>
+              <a:t>of</a:t>
+            </a:r>
+            <a:r>
+              <a:rPr lang="de-DE" dirty="0" smtClean="0"/>
+              <a:t> </a:t>
+            </a:r>
+            <a:r>
+              <a:rPr lang="de-DE" dirty="0" err="1" smtClean="0"/>
+              <a:t>the</a:t>
+            </a:r>
+            <a:r>
+              <a:rPr lang="de-DE" dirty="0" smtClean="0"/>
+              <a:t> </a:t>
+            </a:r>
+            <a:r>
+              <a:rPr lang="de-DE" dirty="0" err="1" smtClean="0"/>
+              <a:t>path</a:t>
+            </a:r>
+            <a:r>
+              <a:rPr lang="de-DE" dirty="0" smtClean="0"/>
+              <a:t> </a:t>
+            </a:r>
+            <a:r>
+              <a:rPr lang="de-DE" dirty="0" err="1" smtClean="0"/>
+              <a:t>as</a:t>
+            </a:r>
+            <a:r>
+              <a:rPr lang="de-DE" dirty="0" smtClean="0"/>
+              <a:t> </a:t>
+            </a:r>
+            <a:r>
+              <a:rPr lang="de-DE" dirty="0" err="1" smtClean="0"/>
+              <a:t>well</a:t>
+            </a:r>
+            <a:r>
+              <a:rPr lang="de-DE" dirty="0" smtClean="0"/>
+              <a:t> </a:t>
+            </a:r>
+            <a:r>
+              <a:rPr lang="de-DE" dirty="0" err="1" smtClean="0"/>
+              <a:t>as</a:t>
+            </a:r>
+            <a:r>
+              <a:rPr lang="de-DE" dirty="0" smtClean="0"/>
+              <a:t> </a:t>
+            </a:r>
+            <a:r>
+              <a:rPr lang="de-DE" dirty="0" err="1" smtClean="0"/>
+              <a:t>the</a:t>
+            </a:r>
+            <a:r>
+              <a:rPr lang="de-DE" dirty="0" smtClean="0"/>
+              <a:t> </a:t>
+            </a:r>
+            <a:r>
+              <a:rPr lang="de-DE" dirty="0" err="1" smtClean="0"/>
+              <a:t>properties</a:t>
+            </a:r>
+            <a:r>
+              <a:rPr lang="de-DE" dirty="0" smtClean="0"/>
+              <a:t> </a:t>
+            </a:r>
+            <a:r>
+              <a:rPr lang="de-DE" dirty="0" err="1" smtClean="0"/>
+              <a:t>of</a:t>
+            </a:r>
+            <a:r>
+              <a:rPr lang="de-DE" dirty="0" smtClean="0"/>
+              <a:t> </a:t>
+            </a:r>
+            <a:r>
+              <a:rPr lang="de-DE" dirty="0" err="1" smtClean="0"/>
+              <a:t>the</a:t>
+            </a:r>
+            <a:r>
+              <a:rPr lang="de-DE" dirty="0" smtClean="0"/>
+              <a:t> </a:t>
+            </a:r>
+            <a:r>
+              <a:rPr lang="de-DE" dirty="0" err="1" smtClean="0"/>
+              <a:t>trajectory</a:t>
+            </a:r>
+            <a:r>
+              <a:rPr lang="de-DE" dirty="0" smtClean="0"/>
+              <a:t>!</a:t>
+            </a:r>
+            <a:endParaRPr lang="de-DE" dirty="0"/>
+          </a:p>
+        </p:txBody>
+      </p:sp>
+      <p:graphicFrame>
+        <p:nvGraphicFramePr>
+          <p:cNvPr id="20" name="Objekt 19"/>
+          <p:cNvGraphicFramePr>
+            <a:graphicFrameLocks noChangeAspect="1"/>
+          </p:cNvGraphicFramePr>
+          <p:nvPr>
+            <p:extLst>
+              <p:ext uri="{D42A27DB-BD31-4B8C-83A1-F6EECF244321}">
+                <p14:modId xmlns:p14="http://schemas.microsoft.com/office/powerpoint/2010/main" val="3101432426"/>
+              </p:ext>
+            </p:extLst>
+          </p:nvPr>
+        </p:nvGraphicFramePr>
+        <p:xfrm>
+          <a:off x="5764212" y="5103812"/>
+          <a:ext cx="3093337" cy="877887"/>
+        </p:xfrm>
+        <a:graphic>
+          <a:graphicData uri="http://schemas.openxmlformats.org/presentationml/2006/ole">
+            <mc:AlternateContent xmlns:mc="http://schemas.openxmlformats.org/markup-compatibility/2006">
+              <mc:Choice xmlns:v="urn:schemas-microsoft-com:vml" Requires="v">
+                <p:oleObj spid="_x0000_s2072" name="Formel" r:id="rId10" imgW="2019300" imgH="571500" progId="Equation.3">
+                  <p:embed/>
+                </p:oleObj>
+              </mc:Choice>
+              <mc:Fallback>
+                <p:oleObj name="Formel" r:id="rId10" imgW="2019300" imgH="571500" progId="Equation.3">
+                  <p:embed/>
+                  <p:pic>
+                    <p:nvPicPr>
+                      <p:cNvPr id="0" name=""/>
+                      <p:cNvPicPr/>
+                      <p:nvPr/>
+                    </p:nvPicPr>
+                    <p:blipFill>
+                      <a:blip r:embed="rId11"/>
+                      <a:stretch>
+                        <a:fillRect/>
+                      </a:stretch>
+                    </p:blipFill>
+                    <p:spPr>
+                      <a:xfrm>
+                        <a:off x="5764212" y="5103812"/>
+                        <a:ext cx="3093337" cy="877887"/>
+                      </a:xfrm>
+                      <a:prstGeom prst="rect">
+                        <a:avLst/>
+                      </a:prstGeom>
+                    </p:spPr>
+                  </p:pic>
+                </p:oleObj>
+              </mc:Fallback>
+            </mc:AlternateContent>
+          </a:graphicData>
+        </a:graphic>
+      </p:graphicFrame>
+    </p:spTree>
+    <p:extLst>
+      <p:ext uri="{BB962C8B-B14F-4D97-AF65-F5344CB8AC3E}">
+        <p14:creationId xmlns:p14="http://schemas.microsoft.com/office/powerpoint/2010/main" val="1409542441"/>
+      </p:ext>
+    </p:extLst>
+  </p:cSld>
+  <p:clrMapOvr>
+    <a:masterClrMapping/>
+  </p:clrMapOvr>
+  <mc:AlternateContent xmlns:mc="http://schemas.openxmlformats.org/markup-compatibility/2006" xmlns:p14="http://schemas.microsoft.com/office/powerpoint/2010/main">
+    <mc:Choice Requires="p14">
+      <p:transition p14:dur="0"/>
+    </mc:Choice>
+    <mc:Fallback xmlns="">
+      <p:transition/>
+    </mc:Fallback>
+  </mc:AlternateContent>
+</p:sld>
+</file>
+
+<file path=ppt/slides/slide11.xml><?xml version="1.0" encoding="utf-8"?>
+<p:sld xmlns:a="http://schemas.openxmlformats.org/drawingml/2006/main" xmlns:r="http://schemas.openxmlformats.org/officeDocument/2006/relationships" xmlns:p="http://schemas.openxmlformats.org/presentationml/2006/main">
+  <p:cSld>
+    <p:spTree>
+      <p:nvGrpSpPr>
+        <p:cNvPr id="1" name=""/>
+        <p:cNvGrpSpPr/>
+        <p:nvPr/>
+      </p:nvGrpSpPr>
+      <p:grpSpPr>
+        <a:xfrm>
+          <a:off x="0" y="0"/>
+          <a:ext cx="0" cy="0"/>
+          <a:chOff x="0" y="0"/>
+          <a:chExt cx="0" cy="0"/>
+        </a:xfrm>
+      </p:grpSpPr>
+      <p:sp>
+        <p:nvSpPr>
+          <p:cNvPr id="2" name="Foliennummernplatzhalter 1"/>
+          <p:cNvSpPr>
+            <a:spLocks noGrp="1"/>
+          </p:cNvSpPr>
+          <p:nvPr>
+            <p:ph type="sldNum" sz="quarter" idx="11"/>
+          </p:nvPr>
+        </p:nvSpPr>
+        <p:spPr/>
+        <p:txBody>
+          <a:bodyPr/>
+          <a:lstStyle/>
+          <a:p>
+            <a:fld id="{B69F85DD-1765-4155-BE31-DCDCF098BCB6}" type="slidenum">
+              <a:rPr lang="de-DE" smtClean="0"/>
+              <a:pPr/>
+              <a:t>11</a:t>
+            </a:fld>
+            <a:endParaRPr lang="de-DE"/>
+          </a:p>
+        </p:txBody>
+      </p:sp>
+      <p:sp>
+        <p:nvSpPr>
+          <p:cNvPr id="3" name="Untertitel 2"/>
+          <p:cNvSpPr>
+            <a:spLocks noGrp="1"/>
+          </p:cNvSpPr>
+          <p:nvPr>
+            <p:ph type="subTitle" idx="12"/>
+          </p:nvPr>
+        </p:nvSpPr>
+        <p:spPr/>
+        <p:txBody>
+          <a:bodyPr/>
+          <a:lstStyle/>
+          <a:p>
+            <a:r>
+              <a:rPr lang="de-DE" dirty="0" err="1" smtClean="0"/>
+              <a:t>Trajectories</a:t>
+            </a:r>
+            <a:endParaRPr lang="de-DE" dirty="0"/>
+          </a:p>
+        </p:txBody>
+      </p:sp>
+      <p:sp>
+        <p:nvSpPr>
+          <p:cNvPr id="4" name="Titel 3"/>
+          <p:cNvSpPr>
+            <a:spLocks noGrp="1"/>
+          </p:cNvSpPr>
+          <p:nvPr>
+            <p:ph type="title"/>
+          </p:nvPr>
+        </p:nvSpPr>
+        <p:spPr/>
+        <p:txBody>
+          <a:bodyPr/>
+          <a:lstStyle/>
+          <a:p>
+            <a:r>
+              <a:rPr lang="de-DE" dirty="0" err="1" smtClean="0"/>
+              <a:t>Parameterization</a:t>
+            </a:r>
+            <a:endParaRPr lang="de-DE" dirty="0"/>
+          </a:p>
+        </p:txBody>
+      </p:sp>
+      <p:sp>
+        <p:nvSpPr>
+          <p:cNvPr id="7" name="Textfeld 6"/>
+          <p:cNvSpPr txBox="1"/>
+          <p:nvPr/>
+        </p:nvSpPr>
+        <p:spPr>
+          <a:xfrm>
+            <a:off x="5671653" y="1454821"/>
+            <a:ext cx="1861782" cy="389850"/>
+          </a:xfrm>
+          <a:prstGeom prst="rect">
+            <a:avLst/>
+          </a:prstGeom>
+          <a:noFill/>
+        </p:spPr>
+        <p:txBody>
+          <a:bodyPr wrap="square" rtlCol="0">
+            <a:spAutoFit/>
+          </a:bodyPr>
+          <a:lstStyle/>
+          <a:p>
+            <a:r>
+              <a:rPr lang="de-DE" dirty="0" err="1" smtClean="0">
+                <a:solidFill>
+                  <a:schemeClr val="tx1"/>
+                </a:solidFill>
+              </a:rPr>
+              <a:t>Equally-distant</a:t>
+            </a:r>
+            <a:endParaRPr lang="de-DE" dirty="0">
+              <a:solidFill>
+                <a:schemeClr val="tx1"/>
+              </a:solidFill>
+            </a:endParaRPr>
+          </a:p>
+        </p:txBody>
+      </p:sp>
+      <p:sp>
+        <p:nvSpPr>
+          <p:cNvPr id="9" name="Textfeld 8"/>
+          <p:cNvSpPr txBox="1"/>
+          <p:nvPr/>
+        </p:nvSpPr>
+        <p:spPr>
+          <a:xfrm>
+            <a:off x="5737746" y="2322302"/>
+            <a:ext cx="1861782" cy="389850"/>
+          </a:xfrm>
+          <a:prstGeom prst="rect">
+            <a:avLst/>
+          </a:prstGeom>
+          <a:noFill/>
+        </p:spPr>
+        <p:txBody>
+          <a:bodyPr wrap="square" rtlCol="0">
+            <a:spAutoFit/>
+          </a:bodyPr>
+          <a:lstStyle/>
+          <a:p>
+            <a:r>
+              <a:rPr lang="de-DE" dirty="0" err="1" smtClean="0">
+                <a:solidFill>
+                  <a:srgbClr val="0000FF"/>
+                </a:solidFill>
+              </a:rPr>
+              <a:t>Chord-distant</a:t>
+            </a:r>
+            <a:endParaRPr lang="de-DE" dirty="0" smtClean="0">
+              <a:solidFill>
+                <a:srgbClr val="0000FF"/>
+              </a:solidFill>
+            </a:endParaRPr>
+          </a:p>
+        </p:txBody>
+      </p:sp>
+      <p:sp>
+        <p:nvSpPr>
+          <p:cNvPr id="11" name="Textfeld 10"/>
+          <p:cNvSpPr txBox="1"/>
+          <p:nvPr/>
+        </p:nvSpPr>
+        <p:spPr>
+          <a:xfrm>
+            <a:off x="5824053" y="3283963"/>
+            <a:ext cx="1861782" cy="389850"/>
+          </a:xfrm>
+          <a:prstGeom prst="rect">
+            <a:avLst/>
+          </a:prstGeom>
+          <a:noFill/>
+        </p:spPr>
+        <p:txBody>
+          <a:bodyPr wrap="square" rtlCol="0">
+            <a:spAutoFit/>
+          </a:bodyPr>
+          <a:lstStyle/>
+          <a:p>
+            <a:r>
+              <a:rPr lang="de-DE" dirty="0" err="1" smtClean="0">
+                <a:solidFill>
+                  <a:srgbClr val="008000"/>
+                </a:solidFill>
+              </a:rPr>
+              <a:t>Arc-distant</a:t>
+            </a:r>
+            <a:endParaRPr lang="de-DE" dirty="0">
+              <a:solidFill>
+                <a:srgbClr val="008000"/>
+              </a:solidFill>
+            </a:endParaRPr>
+          </a:p>
+        </p:txBody>
+      </p:sp>
+      <p:sp>
+        <p:nvSpPr>
+          <p:cNvPr id="12" name="Textfeld 11"/>
+          <p:cNvSpPr txBox="1"/>
+          <p:nvPr/>
+        </p:nvSpPr>
+        <p:spPr>
+          <a:xfrm>
+            <a:off x="5824053" y="4183979"/>
+            <a:ext cx="1861782" cy="389850"/>
+          </a:xfrm>
+          <a:prstGeom prst="rect">
+            <a:avLst/>
+          </a:prstGeom>
+          <a:noFill/>
+        </p:spPr>
+        <p:txBody>
+          <a:bodyPr wrap="square" rtlCol="0">
+            <a:spAutoFit/>
+          </a:bodyPr>
+          <a:lstStyle/>
+          <a:p>
+            <a:r>
+              <a:rPr lang="de-DE" dirty="0" err="1" smtClean="0">
+                <a:solidFill>
+                  <a:srgbClr val="FF0000"/>
+                </a:solidFill>
+              </a:rPr>
+              <a:t>Centripetal</a:t>
+            </a:r>
+            <a:endParaRPr lang="de-DE" dirty="0">
+              <a:solidFill>
+                <a:srgbClr val="FF0000"/>
+              </a:solidFill>
+            </a:endParaRPr>
+          </a:p>
+        </p:txBody>
+      </p:sp>
+      <p:pic>
+        <p:nvPicPr>
+          <p:cNvPr id="14" name="Inhaltsplatzhalter 13" descr="Parameterization_4_HG.eps"/>
+          <p:cNvPicPr>
+            <a:picLocks noGrp="1" noChangeAspect="1"/>
+          </p:cNvPicPr>
+          <p:nvPr>
+            <p:ph sz="quarter" idx="13"/>
+          </p:nvPr>
+        </p:nvPicPr>
+        <p:blipFill rotWithShape="1">
+          <a:blip r:embed="rId2">
+            <a:extLst>
+              <a:ext uri="{28A0092B-C50C-407E-A947-70E740481C1C}">
+                <a14:useLocalDpi xmlns:a14="http://schemas.microsoft.com/office/drawing/2010/main" val="0"/>
+              </a:ext>
+            </a:extLst>
+          </a:blip>
+          <a:srcRect l="9478" t="4054" r="10395" b="6749"/>
+          <a:stretch/>
+        </p:blipFill>
+        <p:spPr>
+          <a:xfrm>
+            <a:off x="382219" y="1342656"/>
+            <a:ext cx="4469788" cy="4242376"/>
+          </a:xfrm>
+        </p:spPr>
+      </p:pic>
+    </p:spTree>
+    <p:extLst>
+      <p:ext uri="{BB962C8B-B14F-4D97-AF65-F5344CB8AC3E}">
+        <p14:creationId xmlns:p14="http://schemas.microsoft.com/office/powerpoint/2010/main" val="1897204175"/>
+      </p:ext>
+    </p:extLst>
+  </p:cSld>
+  <p:clrMapOvr>
+    <a:masterClrMapping/>
+  </p:clrMapOvr>
+  <mc:AlternateContent xmlns:mc="http://schemas.openxmlformats.org/markup-compatibility/2006" xmlns:p14="http://schemas.microsoft.com/office/powerpoint/2010/main">
+    <mc:Choice Requires="p14">
+      <p:transition p14:dur="0"/>
+    </mc:Choice>
+    <mc:Fallback xmlns="">
+      <p:transition/>
+    </mc:Fallback>
+  </mc:AlternateContent>
+</p:sld>
+</file>
+
+<file path=ppt/slides/slide12.xml><?xml version="1.0" encoding="utf-8"?>
+<p:sld xmlns:a="http://schemas.openxmlformats.org/drawingml/2006/main" xmlns:r="http://schemas.openxmlformats.org/officeDocument/2006/relationships" xmlns:p="http://schemas.openxmlformats.org/presentationml/2006/main">
+  <p:cSld>
+    <p:spTree>
+      <p:nvGrpSpPr>
+        <p:cNvPr id="1" name=""/>
+        <p:cNvGrpSpPr/>
+        <p:nvPr/>
+      </p:nvGrpSpPr>
+      <p:grpSpPr>
+        <a:xfrm>
+          <a:off x="0" y="0"/>
+          <a:ext cx="0" cy="0"/>
+          <a:chOff x="0" y="0"/>
+          <a:chExt cx="0" cy="0"/>
+        </a:xfrm>
+      </p:grpSpPr>
+      <p:sp>
+        <p:nvSpPr>
+          <p:cNvPr id="2" name="Foliennummernplatzhalter 1"/>
+          <p:cNvSpPr>
+            <a:spLocks noGrp="1"/>
+          </p:cNvSpPr>
+          <p:nvPr>
+            <p:ph type="sldNum" sz="quarter" idx="11"/>
+          </p:nvPr>
+        </p:nvSpPr>
+        <p:spPr/>
+        <p:txBody>
+          <a:bodyPr/>
+          <a:lstStyle/>
+          <a:p>
+            <a:fld id="{B69F85DD-1765-4155-BE31-DCDCF098BCB6}" type="slidenum">
+              <a:rPr lang="de-DE" smtClean="0"/>
+              <a:pPr/>
+              <a:t>12</a:t>
+            </a:fld>
+            <a:endParaRPr lang="de-DE"/>
+          </a:p>
+        </p:txBody>
+      </p:sp>
+      <p:sp>
+        <p:nvSpPr>
+          <p:cNvPr id="3" name="Untertitel 2"/>
+          <p:cNvSpPr>
+            <a:spLocks noGrp="1"/>
+          </p:cNvSpPr>
+          <p:nvPr>
+            <p:ph type="subTitle" idx="12"/>
+          </p:nvPr>
+        </p:nvSpPr>
+        <p:spPr/>
+        <p:txBody>
+          <a:bodyPr/>
+          <a:lstStyle/>
+          <a:p>
+            <a:r>
+              <a:rPr lang="de-DE" dirty="0" err="1" smtClean="0"/>
+              <a:t>Trajectories</a:t>
+            </a:r>
+            <a:endParaRPr lang="de-DE" dirty="0"/>
+          </a:p>
+        </p:txBody>
+      </p:sp>
+      <p:sp>
+        <p:nvSpPr>
+          <p:cNvPr id="4" name="Titel 3"/>
+          <p:cNvSpPr>
+            <a:spLocks noGrp="1"/>
+          </p:cNvSpPr>
+          <p:nvPr>
+            <p:ph type="title"/>
+          </p:nvPr>
+        </p:nvSpPr>
+        <p:spPr/>
+        <p:txBody>
+          <a:bodyPr/>
+          <a:lstStyle/>
+          <a:p>
+            <a:r>
+              <a:rPr lang="de-DE" dirty="0" err="1" smtClean="0"/>
+              <a:t>Trajectory-Controlers</a:t>
+            </a:r>
+            <a:endParaRPr lang="de-DE" dirty="0"/>
+          </a:p>
+        </p:txBody>
+      </p:sp>
+      <p:sp>
+        <p:nvSpPr>
+          <p:cNvPr id="5" name="Inhaltsplatzhalter 4"/>
+          <p:cNvSpPr>
+            <a:spLocks noGrp="1"/>
+          </p:cNvSpPr>
+          <p:nvPr>
+            <p:ph sz="quarter" idx="13"/>
+          </p:nvPr>
+        </p:nvSpPr>
+        <p:spPr/>
+        <p:txBody>
+          <a:bodyPr/>
+          <a:lstStyle/>
+          <a:p>
+            <a:endParaRPr lang="de-DE" dirty="0"/>
+          </a:p>
+        </p:txBody>
+      </p:sp>
+    </p:spTree>
+    <p:extLst>
+      <p:ext uri="{BB962C8B-B14F-4D97-AF65-F5344CB8AC3E}">
+        <p14:creationId xmlns:p14="http://schemas.microsoft.com/office/powerpoint/2010/main" val="1749412363"/>
+      </p:ext>
+    </p:extLst>
+  </p:cSld>
+  <p:clrMapOvr>
+    <a:masterClrMapping/>
+  </p:clrMapOvr>
+  <mc:AlternateContent xmlns:mc="http://schemas.openxmlformats.org/markup-compatibility/2006" xmlns:p14="http://schemas.microsoft.com/office/powerpoint/2010/main">
+    <mc:Choice Requires="p14">
+      <p:transition p14:dur="0"/>
+    </mc:Choice>
+    <mc:Fallback xmlns="">
+      <p:transition/>
+    </mc:Fallback>
+  </mc:AlternateContent>
+</p:sld>
+</file>
+
+<file path=ppt/slides/slide13.xml><?xml version="1.0" encoding="utf-8"?>
+<p:sld xmlns:a="http://schemas.openxmlformats.org/drawingml/2006/main" xmlns:r="http://schemas.openxmlformats.org/officeDocument/2006/relationships" xmlns:p="http://schemas.openxmlformats.org/presentationml/2006/main">
+  <p:cSld>
+    <p:spTree>
+      <p:nvGrpSpPr>
+        <p:cNvPr id="1" name=""/>
+        <p:cNvGrpSpPr/>
+        <p:nvPr/>
+      </p:nvGrpSpPr>
+      <p:grpSpPr>
+        <a:xfrm>
+          <a:off x="0" y="0"/>
+          <a:ext cx="0" cy="0"/>
+          <a:chOff x="0" y="0"/>
+          <a:chExt cx="0" cy="0"/>
+        </a:xfrm>
+      </p:grpSpPr>
+      <p:sp>
+        <p:nvSpPr>
+          <p:cNvPr id="2" name="Foliennummernplatzhalter 1"/>
+          <p:cNvSpPr>
+            <a:spLocks noGrp="1"/>
+          </p:cNvSpPr>
+          <p:nvPr>
+            <p:ph type="sldNum" sz="quarter" idx="11"/>
+          </p:nvPr>
+        </p:nvSpPr>
+        <p:spPr/>
+        <p:txBody>
+          <a:bodyPr/>
+          <a:lstStyle/>
+          <a:p>
+            <a:fld id="{B69F85DD-1765-4155-BE31-DCDCF098BCB6}" type="slidenum">
+              <a:rPr lang="de-DE" smtClean="0"/>
+              <a:pPr/>
+              <a:t>13</a:t>
+            </a:fld>
+            <a:endParaRPr lang="de-DE"/>
+          </a:p>
+        </p:txBody>
+      </p:sp>
+      <p:sp>
+        <p:nvSpPr>
+          <p:cNvPr id="3" name="Untertitel 2"/>
+          <p:cNvSpPr>
+            <a:spLocks noGrp="1"/>
+          </p:cNvSpPr>
+          <p:nvPr>
+            <p:ph type="subTitle" idx="12"/>
+          </p:nvPr>
+        </p:nvSpPr>
+        <p:spPr/>
+        <p:txBody>
+          <a:bodyPr/>
+          <a:lstStyle/>
+          <a:p>
+            <a:r>
+              <a:rPr lang="de-DE" dirty="0" err="1" smtClean="0"/>
+              <a:t>Trajectories</a:t>
+            </a:r>
+            <a:endParaRPr lang="de-DE" dirty="0"/>
+          </a:p>
+        </p:txBody>
+      </p:sp>
+      <p:sp>
+        <p:nvSpPr>
+          <p:cNvPr id="4" name="Titel 3"/>
+          <p:cNvSpPr>
+            <a:spLocks noGrp="1"/>
+          </p:cNvSpPr>
+          <p:nvPr>
+            <p:ph type="title"/>
+          </p:nvPr>
+        </p:nvSpPr>
+        <p:spPr/>
+        <p:txBody>
+          <a:bodyPr/>
+          <a:lstStyle/>
+          <a:p>
+            <a:r>
+              <a:rPr lang="de-DE" dirty="0" smtClean="0"/>
+              <a:t>Evaluation</a:t>
+            </a:r>
+            <a:endParaRPr lang="de-DE" dirty="0"/>
+          </a:p>
+        </p:txBody>
+      </p:sp>
+      <p:sp>
+        <p:nvSpPr>
+          <p:cNvPr id="5" name="Inhaltsplatzhalter 4"/>
+          <p:cNvSpPr>
+            <a:spLocks noGrp="1"/>
+          </p:cNvSpPr>
+          <p:nvPr>
+            <p:ph sz="quarter" idx="13"/>
+          </p:nvPr>
+        </p:nvSpPr>
+        <p:spPr/>
+        <p:txBody>
+          <a:bodyPr/>
+          <a:lstStyle/>
+          <a:p>
+            <a:endParaRPr lang="de-DE" dirty="0"/>
+          </a:p>
+        </p:txBody>
+      </p:sp>
+    </p:spTree>
+    <p:extLst>
+      <p:ext uri="{BB962C8B-B14F-4D97-AF65-F5344CB8AC3E}">
+        <p14:creationId xmlns:p14="http://schemas.microsoft.com/office/powerpoint/2010/main" val="533356852"/>
+      </p:ext>
+    </p:extLst>
+  </p:cSld>
+  <p:clrMapOvr>
+    <a:masterClrMapping/>
+  </p:clrMapOvr>
+  <mc:AlternateContent xmlns:mc="http://schemas.openxmlformats.org/markup-compatibility/2006" xmlns:p14="http://schemas.microsoft.com/office/powerpoint/2010/main">
+    <mc:Choice Requires="p14">
+      <p:transition p14:dur="0"/>
+    </mc:Choice>
+    <mc:Fallback xmlns="">
+      <p:transition/>
+    </mc:Fallback>
+  </mc:AlternateContent>
+</p:sld>
+</file>
+
+<file path=ppt/slides/slide14.xml><?xml version="1.0" encoding="utf-8"?>
+<p:sld xmlns:a="http://schemas.openxmlformats.org/drawingml/2006/main" xmlns:r="http://schemas.openxmlformats.org/officeDocument/2006/relationships" xmlns:p="http://schemas.openxmlformats.org/presentationml/2006/main">
+  <p:cSld>
+    <p:spTree>
+      <p:nvGrpSpPr>
+        <p:cNvPr id="1" name=""/>
+        <p:cNvGrpSpPr/>
+        <p:nvPr/>
+      </p:nvGrpSpPr>
+      <p:grpSpPr>
+        <a:xfrm>
+          <a:off x="0" y="0"/>
+          <a:ext cx="0" cy="0"/>
+          <a:chOff x="0" y="0"/>
+          <a:chExt cx="0" cy="0"/>
+        </a:xfrm>
+      </p:grpSpPr>
+      <p:sp>
+        <p:nvSpPr>
+          <p:cNvPr id="2" name="Titel 1"/>
+          <p:cNvSpPr>
+            <a:spLocks noGrp="1"/>
+          </p:cNvSpPr>
+          <p:nvPr>
+            <p:ph type="ctrTitle"/>
+          </p:nvPr>
+        </p:nvSpPr>
+        <p:spPr/>
+        <p:txBody>
+          <a:bodyPr/>
+          <a:lstStyle/>
+          <a:p>
+            <a:r>
+              <a:rPr lang="de-CH" dirty="0">
+                <a:solidFill>
+                  <a:srgbClr val="00B0F0"/>
+                </a:solidFill>
+              </a:rPr>
+              <a:t>&gt;&gt;</a:t>
+            </a:r>
+            <a:r>
+              <a:rPr lang="de-CH" dirty="0"/>
+              <a:t> </a:t>
+            </a:r>
+            <a:r>
+              <a:rPr lang="de-CH" dirty="0" smtClean="0"/>
+              <a:t>Backup</a:t>
+            </a:r>
+            <a:endParaRPr lang="de-DE" dirty="0"/>
+          </a:p>
+        </p:txBody>
+      </p:sp>
+      <p:sp>
+        <p:nvSpPr>
+          <p:cNvPr id="3" name="Untertitel 2"/>
+          <p:cNvSpPr>
+            <a:spLocks noGrp="1"/>
+          </p:cNvSpPr>
+          <p:nvPr>
+            <p:ph type="subTitle" idx="1"/>
+          </p:nvPr>
+        </p:nvSpPr>
+        <p:spPr/>
+        <p:txBody>
+          <a:bodyPr/>
+          <a:lstStyle/>
+          <a:p>
+            <a:r>
+              <a:rPr lang="de-CH" dirty="0" smtClean="0"/>
+              <a:t> </a:t>
+            </a:r>
+            <a:endParaRPr lang="de-DE" dirty="0"/>
+          </a:p>
+        </p:txBody>
+      </p:sp>
+    </p:spTree>
+    <p:extLst>
+      <p:ext uri="{BB962C8B-B14F-4D97-AF65-F5344CB8AC3E}">
+        <p14:creationId xmlns:p14="http://schemas.microsoft.com/office/powerpoint/2010/main" val="289141002"/>
+      </p:ext>
+    </p:extLst>
+  </p:cSld>
+  <p:clrMapOvr>
+    <a:masterClrMapping/>
+  </p:clrMapOvr>
+  <mc:AlternateContent xmlns:mc="http://schemas.openxmlformats.org/markup-compatibility/2006" xmlns:p14="http://schemas.microsoft.com/office/powerpoint/2010/main">
+    <mc:Choice Requires="p14">
+      <p:transition p14:dur="0"/>
+    </mc:Choice>
+    <mc:Fallback xmlns="">
+      <p:transition/>
+    </mc:Fallback>
+  </mc:AlternateContent>
+  <p:timing>
+    <p:tnLst>
+      <p:par>
+        <p:cTn xmlns:p14="http://schemas.microsoft.com/office/powerpoint/2010/main" id="1" dur="indefinite" restart="never" nodeType="tmRoot"/>
+      </p:par>
+    </p:tnLst>
+  </p:timing>
+</p:sld>
+</file>
+
+<file path=ppt/slides/slide15.xml><?xml version="1.0" encoding="utf-8"?>
+<p:sld xmlns:a="http://schemas.openxmlformats.org/drawingml/2006/main" xmlns:r="http://schemas.openxmlformats.org/officeDocument/2006/relationships" xmlns:p="http://schemas.openxmlformats.org/presentationml/2006/main">
+  <p:cSld>
+    <p:spTree>
+      <p:nvGrpSpPr>
+        <p:cNvPr id="1" name=""/>
+        <p:cNvGrpSpPr/>
+        <p:nvPr/>
+      </p:nvGrpSpPr>
+      <p:grpSpPr>
+        <a:xfrm>
+          <a:off x="0" y="0"/>
+          <a:ext cx="0" cy="0"/>
+          <a:chOff x="0" y="0"/>
+          <a:chExt cx="0" cy="0"/>
+        </a:xfrm>
+      </p:grpSpPr>
+      <p:sp>
+        <p:nvSpPr>
           <p:cNvPr id="2" name="Slide Number Placeholder 1"/>
           <p:cNvSpPr>
             <a:spLocks noGrp="1"/>
@@ -2798,7 +4034,7 @@
             <a:fld id="{B69F85DD-1765-4155-BE31-DCDCF098BCB6}" type="slidenum">
               <a:rPr lang="de-DE"/>
               <a:pPr/>
-              <a:t>10</a:t>
+              <a:t>15</a:t>
             </a:fld>
             <a:endParaRPr lang="de-DE"/>
           </a:p>
@@ -3323,6 +4559,64 @@
           </a:p>
         </p:txBody>
       </p:sp>
+      <p:pic>
+        <p:nvPicPr>
+          <p:cNvPr id="7" name="Bild 6" descr="x220t_hero.jpg"/>
+          <p:cNvPicPr>
+            <a:picLocks noChangeAspect="1"/>
+          </p:cNvPicPr>
+          <p:nvPr/>
+        </p:nvPicPr>
+        <p:blipFill>
+          <a:blip r:embed="rId2">
+            <a:extLst>
+              <a:ext uri="{28A0092B-C50C-407E-A947-70E740481C1C}">
+                <a14:useLocalDpi xmlns:a14="http://schemas.microsoft.com/office/drawing/2010/main" val="0"/>
+              </a:ext>
+            </a:extLst>
+          </a:blip>
+          <a:stretch>
+            <a:fillRect/>
+          </a:stretch>
+        </p:blipFill>
+        <p:spPr>
+          <a:xfrm>
+            <a:off x="0" y="727409"/>
+            <a:ext cx="8255000" cy="5715000"/>
+          </a:xfrm>
+          <a:prstGeom prst="rect">
+            <a:avLst/>
+          </a:prstGeom>
+        </p:spPr>
+      </p:pic>
+      <p:pic>
+        <p:nvPicPr>
+          <p:cNvPr id="6" name="Inhaltsplatzhalter 5" descr="futaba_7C_radio.jpg"/>
+          <p:cNvPicPr>
+            <a:picLocks noGrp="1" noChangeAspect="1"/>
+          </p:cNvPicPr>
+          <p:nvPr>
+            <p:ph sz="quarter" idx="13"/>
+          </p:nvPr>
+        </p:nvPicPr>
+        <p:blipFill rotWithShape="1">
+          <a:blip r:embed="rId3">
+            <a:extLst>
+              <a:ext uri="{28A0092B-C50C-407E-A947-70E740481C1C}">
+                <a14:useLocalDpi xmlns:a14="http://schemas.microsoft.com/office/drawing/2010/main" val="0"/>
+              </a:ext>
+            </a:extLst>
+          </a:blip>
+          <a:srcRect t="-3254" b="144"/>
+          <a:stretch/>
+        </p:blipFill>
+        <p:spPr>
+          <a:xfrm>
+            <a:off x="6830643" y="4113139"/>
+            <a:ext cx="2081651" cy="2285605"/>
+          </a:xfrm>
+        </p:spPr>
+      </p:pic>
       <p:sp>
         <p:nvSpPr>
           <p:cNvPr id="3" name="Untertitel 2"/>
@@ -3361,29 +4655,44 @@
           <a:bodyPr/>
           <a:lstStyle/>
           <a:p>
-            <a:endParaRPr lang="de-DE"/>
-          </a:p>
-        </p:txBody>
-      </p:sp>
-      <p:sp>
-        <p:nvSpPr>
-          <p:cNvPr id="5" name="Inhaltsplatzhalter 4"/>
-          <p:cNvSpPr>
-            <a:spLocks noGrp="1"/>
-          </p:cNvSpPr>
-          <p:nvPr>
-            <p:ph sz="quarter" idx="13"/>
-          </p:nvPr>
-        </p:nvSpPr>
-        <p:spPr/>
-        <p:txBody>
-          <a:bodyPr/>
-          <a:lstStyle/>
-          <a:p>
-            <a:endParaRPr lang="de-DE"/>
-          </a:p>
-        </p:txBody>
-      </p:sp>
+            <a:r>
+              <a:rPr lang="de-DE" dirty="0" smtClean="0"/>
+              <a:t>Devices</a:t>
+            </a:r>
+            <a:endParaRPr lang="de-DE" dirty="0"/>
+          </a:p>
+        </p:txBody>
+      </p:sp>
+      <p:pic>
+        <p:nvPicPr>
+          <p:cNvPr id="8" name="Bild 7" descr="3dconnexion_spacenavigator.jpg"/>
+          <p:cNvPicPr>
+            <a:picLocks noChangeAspect="1"/>
+          </p:cNvPicPr>
+          <p:nvPr/>
+        </p:nvPicPr>
+        <p:blipFill>
+          <a:blip r:embed="rId4">
+            <a:extLst>
+              <a:ext uri="{28A0092B-C50C-407E-A947-70E740481C1C}">
+                <a14:useLocalDpi xmlns:a14="http://schemas.microsoft.com/office/drawing/2010/main" val="0"/>
+              </a:ext>
+            </a:extLst>
+          </a:blip>
+          <a:stretch>
+            <a:fillRect/>
+          </a:stretch>
+        </p:blipFill>
+        <p:spPr>
+          <a:xfrm>
+            <a:off x="5867790" y="1294544"/>
+            <a:ext cx="3276210" cy="2182231"/>
+          </a:xfrm>
+          <a:prstGeom prst="rect">
+            <a:avLst/>
+          </a:prstGeom>
+        </p:spPr>
+      </p:pic>
     </p:spTree>
     <p:extLst>
       <p:ext uri="{BB962C8B-B14F-4D97-AF65-F5344CB8AC3E}">
@@ -3484,7 +4793,11 @@
           <a:bodyPr/>
           <a:lstStyle/>
           <a:p>
-            <a:endParaRPr lang="de-DE"/>
+            <a:r>
+              <a:rPr lang="de-DE" dirty="0" smtClean="0"/>
+              <a:t>GUI</a:t>
+            </a:r>
+            <a:endParaRPr lang="de-DE" dirty="0"/>
           </a:p>
         </p:txBody>
       </p:sp>
@@ -3503,7 +4816,49 @@
           <a:bodyPr/>
           <a:lstStyle/>
           <a:p>
-            <a:endParaRPr lang="de-DE"/>
+            <a:r>
+              <a:rPr lang="de-DE" dirty="0" err="1" smtClean="0"/>
+              <a:t>Widget</a:t>
+            </a:r>
+            <a:r>
+              <a:rPr lang="de-DE" dirty="0" smtClean="0"/>
+              <a:t> kurzbeschrieb</a:t>
+            </a:r>
+          </a:p>
+          <a:p>
+            <a:r>
+              <a:rPr lang="de-DE" dirty="0" smtClean="0"/>
+              <a:t>Evolution </a:t>
+            </a:r>
+            <a:r>
+              <a:rPr lang="de-DE" dirty="0" err="1" smtClean="0"/>
+              <a:t>with</a:t>
+            </a:r>
+            <a:r>
+              <a:rPr lang="de-DE" dirty="0" smtClean="0"/>
+              <a:t> </a:t>
+            </a:r>
+            <a:r>
+              <a:rPr lang="de-DE" dirty="0" err="1" smtClean="0"/>
+              <a:t>skye</a:t>
+            </a:r>
+            <a:r>
+              <a:rPr lang="de-DE" dirty="0" smtClean="0"/>
+              <a:t> =&gt;Testphase, jede Achse, 3dMouse, </a:t>
+            </a:r>
+            <a:r>
+              <a:rPr lang="de-DE" dirty="0" err="1" smtClean="0"/>
+              <a:t>Touchinputs</a:t>
+            </a:r>
+            <a:r>
+              <a:rPr lang="de-DE" dirty="0" smtClean="0"/>
+              <a:t>, </a:t>
+            </a:r>
+            <a:r>
+              <a:rPr lang="de-DE" dirty="0" err="1" smtClean="0"/>
+              <a:t>Waypoints</a:t>
+            </a:r>
+            <a:endParaRPr lang="de-DE" dirty="0"/>
           </a:p>
         </p:txBody>
       </p:sp>
@@ -3584,11 +4939,7 @@
           <a:bodyPr/>
           <a:lstStyle/>
           <a:p>
-            <a:r>
-              <a:rPr lang="de-DE" dirty="0" err="1" smtClean="0"/>
-              <a:t>Trajectories</a:t>
-            </a:r>
-            <a:endParaRPr lang="de-DE" dirty="0"/>
+            <a:endParaRPr lang="de-DE"/>
           </a:p>
         </p:txBody>
       </p:sp>
@@ -3609,11 +4960,7 @@
           <a:p>
             <a:r>
               <a:rPr lang="de-DE" dirty="0" smtClean="0"/>
-              <a:t>Path/</a:t>
-            </a:r>
-            <a:r>
-              <a:rPr lang="de-DE" dirty="0" err="1" smtClean="0"/>
-              <a:t>Trajectory</a:t>
+              <a:t>Video</a:t>
             </a:r>
             <a:endParaRPr lang="de-DE" dirty="0"/>
           </a:p>
@@ -3634,6 +4981,10 @@
           <a:bodyPr/>
           <a:lstStyle/>
           <a:p>
+            <a:r>
+              <a:rPr lang="de-DE" dirty="0" smtClean="0"/>
+              <a:t>Video in Aktion</a:t>
+            </a:r>
             <a:endParaRPr lang="de-DE" dirty="0"/>
           </a:p>
         </p:txBody>
@@ -3641,7 +4992,7 @@
     </p:spTree>
     <p:extLst>
       <p:ext uri="{BB962C8B-B14F-4D97-AF65-F5344CB8AC3E}">
-        <p14:creationId xmlns:p14="http://schemas.microsoft.com/office/powerpoint/2010/main" val="4153126855"/>
+        <p14:creationId xmlns:p14="http://schemas.microsoft.com/office/powerpoint/2010/main" val="2498159707"/>
       </p:ext>
     </p:extLst>
   </p:cSld>
@@ -3695,6 +5046,147 @@
               <a:rPr lang="de-DE" smtClean="0"/>
               <a:pPr/>
               <a:t>6</a:t>
+            </a:fld>
+            <a:endParaRPr lang="de-DE"/>
+          </a:p>
+        </p:txBody>
+      </p:sp>
+      <p:sp>
+        <p:nvSpPr>
+          <p:cNvPr id="3" name="Untertitel 2"/>
+          <p:cNvSpPr>
+            <a:spLocks noGrp="1"/>
+          </p:cNvSpPr>
+          <p:nvPr>
+            <p:ph type="subTitle" idx="12"/>
+          </p:nvPr>
+        </p:nvSpPr>
+        <p:spPr/>
+        <p:txBody>
+          <a:bodyPr/>
+          <a:lstStyle/>
+          <a:p>
+            <a:r>
+              <a:rPr lang="de-DE" dirty="0" err="1" smtClean="0"/>
+              <a:t>Trajectories</a:t>
+            </a:r>
+            <a:endParaRPr lang="de-DE" dirty="0"/>
+          </a:p>
+        </p:txBody>
+      </p:sp>
+      <p:sp>
+        <p:nvSpPr>
+          <p:cNvPr id="4" name="Titel 3"/>
+          <p:cNvSpPr>
+            <a:spLocks noGrp="1"/>
+          </p:cNvSpPr>
+          <p:nvPr>
+            <p:ph type="title"/>
+          </p:nvPr>
+        </p:nvSpPr>
+        <p:spPr/>
+        <p:txBody>
+          <a:bodyPr/>
+          <a:lstStyle/>
+          <a:p>
+            <a:r>
+              <a:rPr lang="de-DE" dirty="0" smtClean="0"/>
+              <a:t>Path/</a:t>
+            </a:r>
+            <a:r>
+              <a:rPr lang="de-DE" dirty="0" err="1" smtClean="0"/>
+              <a:t>Trajectory</a:t>
+            </a:r>
+            <a:endParaRPr lang="de-DE" dirty="0"/>
+          </a:p>
+        </p:txBody>
+      </p:sp>
+      <p:sp>
+        <p:nvSpPr>
+          <p:cNvPr id="5" name="Inhaltsplatzhalter 4"/>
+          <p:cNvSpPr>
+            <a:spLocks noGrp="1"/>
+          </p:cNvSpPr>
+          <p:nvPr>
+            <p:ph sz="quarter" idx="13"/>
+          </p:nvPr>
+        </p:nvSpPr>
+        <p:spPr/>
+        <p:txBody>
+          <a:bodyPr/>
+          <a:lstStyle/>
+          <a:p>
+            <a:r>
+              <a:rPr lang="de-DE" dirty="0" smtClean="0"/>
+              <a:t>Generell, was ist das Ziel von diesem Teil der BA?</a:t>
+            </a:r>
+          </a:p>
+          <a:p>
+            <a:r>
+              <a:rPr lang="de-DE" dirty="0" smtClean="0"/>
+              <a:t>Unterschied Path/Trajektorie anhand bekannter Darstellung</a:t>
+            </a:r>
+            <a:endParaRPr lang="de-DE" dirty="0"/>
+          </a:p>
+        </p:txBody>
+      </p:sp>
+    </p:spTree>
+    <p:extLst>
+      <p:ext uri="{BB962C8B-B14F-4D97-AF65-F5344CB8AC3E}">
+        <p14:creationId xmlns:p14="http://schemas.microsoft.com/office/powerpoint/2010/main" val="4153126855"/>
+      </p:ext>
+    </p:extLst>
+  </p:cSld>
+  <p:clrMapOvr>
+    <a:masterClrMapping/>
+  </p:clrMapOvr>
+  <mc:AlternateContent xmlns:mc="http://schemas.openxmlformats.org/markup-compatibility/2006" xmlns:p14="http://schemas.microsoft.com/office/powerpoint/2010/main">
+    <mc:Choice Requires="p14">
+      <p:transition p14:dur="0"/>
+    </mc:Choice>
+    <mc:Fallback xmlns="">
+      <p:transition/>
+    </mc:Fallback>
+  </mc:AlternateContent>
+</p:sld>
+</file>
+
+<file path=ppt/slides/slide7.xml><?xml version="1.0" encoding="utf-8"?>
+<p:sld xmlns:a="http://schemas.openxmlformats.org/drawingml/2006/main" xmlns:r="http://schemas.openxmlformats.org/officeDocument/2006/relationships" xmlns:p="http://schemas.openxmlformats.org/presentationml/2006/main">
+  <p:cSld>
+    <p:spTree>
+      <p:nvGrpSpPr>
+        <p:cNvPr id="1" name=""/>
+        <p:cNvGrpSpPr/>
+        <p:nvPr/>
+      </p:nvGrpSpPr>
+      <p:grpSpPr>
+        <a:xfrm>
+          <a:off x="0" y="0"/>
+          <a:ext cx="0" cy="0"/>
+          <a:chOff x="0" y="0"/>
+          <a:chExt cx="0" cy="0"/>
+        </a:xfrm>
+      </p:grpSpPr>
+      <p:sp>
+        <p:nvSpPr>
+          <p:cNvPr id="2" name="Foliennummernplatzhalter 1"/>
+          <p:cNvSpPr>
+            <a:spLocks noGrp="1"/>
+          </p:cNvSpPr>
+          <p:nvPr>
+            <p:ph type="sldNum" sz="quarter" idx="11"/>
+          </p:nvPr>
+        </p:nvSpPr>
+        <p:spPr/>
+        <p:txBody>
+          <a:bodyPr/>
+          <a:lstStyle/>
+          <a:p>
+            <a:fld id="{B69F85DD-1765-4155-BE31-DCDCF098BCB6}" type="slidenum">
+              <a:rPr lang="de-DE" smtClean="0"/>
+              <a:pPr/>
+              <a:t>7</a:t>
             </a:fld>
             <a:endParaRPr lang="de-DE"/>
           </a:p>
@@ -3802,7 +5294,7 @@
 </p:sld>
 </file>
 
-<file path=ppt/slides/slide7.xml><?xml version="1.0" encoding="utf-8"?>
+<file path=ppt/slides/slide8.xml><?xml version="1.0" encoding="utf-8"?>
 <p:sld xmlns:a="http://schemas.openxmlformats.org/drawingml/2006/main" xmlns:r="http://schemas.openxmlformats.org/officeDocument/2006/relationships" xmlns:p="http://schemas.openxmlformats.org/presentationml/2006/main">
   <p:cSld>
     <p:spTree>
@@ -3837,7 +5329,7 @@
             <a:fld id="{B69F85DD-1765-4155-BE31-DCDCF098BCB6}" type="slidenum">
               <a:rPr lang="de-DE" smtClean="0"/>
               <a:pPr/>
-              <a:t>7</a:t>
+              <a:t>8</a:t>
             </a:fld>
             <a:endParaRPr lang="de-DE"/>
           </a:p>
@@ -3976,7 +5468,7 @@
           <a:graphicData uri="http://schemas.openxmlformats.org/presentationml/2006/ole">
             <mc:AlternateContent xmlns:mc="http://schemas.openxmlformats.org/markup-compatibility/2006">
               <mc:Choice xmlns:v="urn:schemas-microsoft-com:vml" Requires="v">
-                <p:oleObj spid="_x0000_s1033" name="Formel" r:id="rId5" imgW="1295400" imgH="787400" progId="Equation.3">
+                <p:oleObj spid="_x0000_s1049" name="Formel" r:id="rId5" imgW="1295400" imgH="787400" progId="Equation.3">
                   <p:embed/>
                 </p:oleObj>
               </mc:Choice>
@@ -4033,7 +5525,7 @@
           <a:graphicData uri="http://schemas.openxmlformats.org/presentationml/2006/ole">
             <mc:AlternateContent xmlns:mc="http://schemas.openxmlformats.org/markup-compatibility/2006">
               <mc:Choice xmlns:v="urn:schemas-microsoft-com:vml" Requires="v">
-                <p:oleObj spid="_x0000_s1034" name="Formel" r:id="rId7" imgW="800100" imgH="393700" progId="Equation.3">
+                <p:oleObj spid="_x0000_s1050" name="Formel" r:id="rId7" imgW="800100" imgH="393700" progId="Equation.3">
                   <p:embed/>
                 </p:oleObj>
               </mc:Choice>
@@ -4090,7 +5582,7 @@
           <a:graphicData uri="http://schemas.openxmlformats.org/presentationml/2006/ole">
             <mc:AlternateContent xmlns:mc="http://schemas.openxmlformats.org/markup-compatibility/2006">
               <mc:Choice xmlns:v="urn:schemas-microsoft-com:vml" Requires="v">
-                <p:oleObj spid="_x0000_s1035" name="Formel" r:id="rId9" imgW="1752600" imgH="457200" progId="Equation.3">
+                <p:oleObj spid="_x0000_s1051" name="Formel" r:id="rId9" imgW="1752600" imgH="457200" progId="Equation.3">
                   <p:embed/>
                 </p:oleObj>
               </mc:Choice>
@@ -4153,7 +5645,7 @@
 </p:sld>
 </file>
 
-<file path=ppt/slides/slide8.xml><?xml version="1.0" encoding="utf-8"?>
+<file path=ppt/slides/slide9.xml><?xml version="1.0" encoding="utf-8"?>
 <p:sld xmlns:a="http://schemas.openxmlformats.org/drawingml/2006/main" xmlns:r="http://schemas.openxmlformats.org/officeDocument/2006/relationships" xmlns:p="http://schemas.openxmlformats.org/presentationml/2006/main">
   <p:cSld>
     <p:spTree>
@@ -4188,7 +5680,7 @@
             <a:fld id="{B69F85DD-1765-4155-BE31-DCDCF098BCB6}" type="slidenum">
               <a:rPr lang="de-DE" smtClean="0"/>
               <a:pPr/>
-              <a:t>8</a:t>
+              <a:t>9</a:t>
             </a:fld>
             <a:endParaRPr lang="de-DE"/>
           </a:p>
@@ -4262,22 +5754,542 @@
           </a:p>
         </p:txBody>
       </p:sp>
-      <p:sp>
-        <p:nvSpPr>
-          <p:cNvPr id="5" name="Inhaltsplatzhalter 4"/>
-          <p:cNvSpPr>
-            <a:spLocks noGrp="1"/>
-          </p:cNvSpPr>
+      <p:pic>
+        <p:nvPicPr>
+          <p:cNvPr id="6" name="Inhaltsplatzhalter 5" descr="Mot_Alloc_Helix.eps"/>
+          <p:cNvPicPr>
+            <a:picLocks noGrp="1" noChangeAspect="1"/>
+          </p:cNvPicPr>
           <p:nvPr>
             <p:ph sz="quarter" idx="13"/>
           </p:nvPr>
-        </p:nvSpPr>
-        <p:spPr/>
-        <p:txBody>
-          <a:bodyPr/>
+        </p:nvPicPr>
+        <p:blipFill rotWithShape="1">
+          <a:blip r:embed="rId2">
+            <a:extLst>
+              <a:ext uri="{28A0092B-C50C-407E-A947-70E740481C1C}">
+                <a14:useLocalDpi xmlns:a14="http://schemas.microsoft.com/office/drawing/2010/main" val="0"/>
+              </a:ext>
+            </a:extLst>
+          </a:blip>
+          <a:srcRect t="984" b="2234"/>
+          <a:stretch/>
+        </p:blipFill>
+        <p:spPr>
+          <a:xfrm>
+            <a:off x="0" y="1121938"/>
+            <a:ext cx="6368545" cy="4999850"/>
+          </a:xfrm>
+        </p:spPr>
+      </p:pic>
+      <p:grpSp>
+        <p:nvGrpSpPr>
+          <p:cNvPr id="23" name="Gruppierung 22"/>
+          <p:cNvGrpSpPr/>
+          <p:nvPr/>
+        </p:nvGrpSpPr>
+        <p:grpSpPr>
+          <a:xfrm>
+            <a:off x="1306946" y="2305521"/>
+            <a:ext cx="2971453" cy="2231547"/>
+            <a:chOff x="1306946" y="2305521"/>
+            <a:chExt cx="2971453" cy="2231547"/>
+          </a:xfrm>
+        </p:grpSpPr>
+        <p:sp>
+          <p:nvSpPr>
+            <p:cNvPr id="8" name="Rechteck 7"/>
+            <p:cNvSpPr/>
+            <p:nvPr/>
+          </p:nvSpPr>
+          <p:spPr bwMode="auto">
+            <a:xfrm>
+              <a:off x="1319276" y="2305521"/>
+              <a:ext cx="357561" cy="394528"/>
+            </a:xfrm>
+            <a:prstGeom prst="rect">
+              <a:avLst/>
+            </a:prstGeom>
+            <a:noFill/>
+            <a:ln w="9525" cap="flat" cmpd="sng" algn="ctr">
+              <a:solidFill>
+                <a:schemeClr val="tx1"/>
+              </a:solidFill>
+              <a:prstDash val="solid"/>
+              <a:round/>
+              <a:headEnd type="none" w="med" len="med"/>
+              <a:tailEnd type="none" w="med" len="med"/>
+            </a:ln>
+            <a:effectLst/>
+          </p:spPr>
+          <p:txBody>
+            <a:bodyPr vert="horz" wrap="square" lIns="0" tIns="36000" rIns="0" bIns="36000" numCol="1" rtlCol="0" anchor="t" anchorCtr="0" compatLnSpc="1">
+              <a:prstTxWarp prst="textNoShape">
+                <a:avLst/>
+              </a:prstTxWarp>
+            </a:bodyPr>
+            <a:lstStyle/>
+            <a:p>
+              <a:pPr marL="0" marR="0" indent="0" algn="l" defTabSz="457200" rtl="0" eaLnBrk="1" fontAlgn="base" latinLnBrk="0" hangingPunct="1">
+                <a:lnSpc>
+                  <a:spcPts val="2400"/>
+                </a:lnSpc>
+                <a:spcBef>
+                  <a:spcPts val="600"/>
+                </a:spcBef>
+                <a:spcAft>
+                  <a:spcPct val="0"/>
+                </a:spcAft>
+                <a:buClr>
+                  <a:srgbClr val="2A6AB3"/>
+                </a:buClr>
+                <a:buSzPct val="110000"/>
+                <a:buFont typeface="Wingdings" pitchFamily="16" charset="2"/>
+                <a:buNone/>
+                <a:tabLst/>
+              </a:pPr>
+              <a:endParaRPr kumimoji="0" lang="de-DE" sz="1600" b="0" i="0" u="none" strike="noStrike" cap="none" normalizeH="0" baseline="0" smtClean="0">
+                <a:ln>
+                  <a:noFill/>
+                </a:ln>
+                <a:solidFill>
+                  <a:srgbClr val="000000"/>
+                </a:solidFill>
+                <a:effectLst/>
+                <a:latin typeface="Arial" charset="0"/>
+              </a:endParaRPr>
+            </a:p>
+          </p:txBody>
+        </p:sp>
+        <p:pic>
+          <p:nvPicPr>
+            <p:cNvPr id="9" name="Bild 8" descr="Mot_Alloc_Helix_enlarged.eps"/>
+            <p:cNvPicPr>
+              <a:picLocks noChangeAspect="1"/>
+            </p:cNvPicPr>
+            <p:nvPr/>
+          </p:nvPicPr>
+          <p:blipFill rotWithShape="1">
+            <a:blip r:embed="rId3">
+              <a:extLst>
+                <a:ext uri="{28A0092B-C50C-407E-A947-70E740481C1C}">
+                  <a14:useLocalDpi xmlns:a14="http://schemas.microsoft.com/office/drawing/2010/main" val="0"/>
+                </a:ext>
+              </a:extLst>
+            </a:blip>
+            <a:srcRect l="41871" t="8808" r="36455" b="67820"/>
+            <a:stretch/>
+          </p:blipFill>
+          <p:spPr>
+            <a:xfrm>
+              <a:off x="2441276" y="2921969"/>
+              <a:ext cx="1837123" cy="1602769"/>
+            </a:xfrm>
+            <a:prstGeom prst="rect">
+              <a:avLst/>
+            </a:prstGeom>
+            <a:ln>
+              <a:solidFill>
+                <a:schemeClr val="tx1"/>
+              </a:solidFill>
+            </a:ln>
+          </p:spPr>
+        </p:pic>
+        <p:cxnSp>
+          <p:nvCxnSpPr>
+            <p:cNvPr id="13" name="Gerade Verbindung 12"/>
+            <p:cNvCxnSpPr/>
+            <p:nvPr/>
+          </p:nvCxnSpPr>
+          <p:spPr bwMode="auto">
+            <a:xfrm>
+              <a:off x="1306946" y="2675390"/>
+              <a:ext cx="1134331" cy="1861678"/>
+            </a:xfrm>
+            <a:prstGeom prst="line">
+              <a:avLst/>
+            </a:prstGeom>
+            <a:noFill/>
+            <a:ln w="9525" cap="flat" cmpd="sng" algn="ctr">
+              <a:solidFill>
+                <a:schemeClr val="tx1"/>
+              </a:solidFill>
+              <a:prstDash val="solid"/>
+              <a:round/>
+              <a:headEnd type="none" w="med" len="med"/>
+              <a:tailEnd type="none" w="med" len="med"/>
+            </a:ln>
+            <a:effectLst/>
+          </p:spPr>
+        </p:cxnSp>
+        <p:cxnSp>
+          <p:nvCxnSpPr>
+            <p:cNvPr id="15" name="Gerade Verbindung 14"/>
+            <p:cNvCxnSpPr/>
+            <p:nvPr/>
+          </p:nvCxnSpPr>
+          <p:spPr bwMode="auto">
+            <a:xfrm>
+              <a:off x="1689166" y="2330179"/>
+              <a:ext cx="2589233" cy="591791"/>
+            </a:xfrm>
+            <a:prstGeom prst="line">
+              <a:avLst/>
+            </a:prstGeom>
+            <a:noFill/>
+            <a:ln w="9525" cap="flat" cmpd="sng" algn="ctr">
+              <a:solidFill>
+                <a:schemeClr val="tx1"/>
+              </a:solidFill>
+              <a:prstDash val="solid"/>
+              <a:round/>
+              <a:headEnd type="none" w="med" len="med"/>
+              <a:tailEnd type="none" w="med" len="med"/>
+            </a:ln>
+            <a:effectLst/>
+          </p:spPr>
+        </p:cxnSp>
+        <p:cxnSp>
+          <p:nvCxnSpPr>
+            <p:cNvPr id="19" name="Gerade Verbindung 18"/>
+            <p:cNvCxnSpPr/>
+            <p:nvPr/>
+          </p:nvCxnSpPr>
+          <p:spPr bwMode="auto">
+            <a:xfrm>
+              <a:off x="1336049" y="2322303"/>
+              <a:ext cx="1092898" cy="587338"/>
+            </a:xfrm>
+            <a:prstGeom prst="line">
+              <a:avLst/>
+            </a:prstGeom>
+            <a:noFill/>
+            <a:ln w="9525" cap="flat" cmpd="sng" algn="ctr">
+              <a:solidFill>
+                <a:schemeClr val="tx1"/>
+              </a:solidFill>
+              <a:prstDash val="solid"/>
+              <a:round/>
+              <a:headEnd type="none" w="med" len="med"/>
+              <a:tailEnd type="none" w="med" len="med"/>
+            </a:ln>
+            <a:effectLst/>
+          </p:spPr>
+        </p:cxnSp>
+        <p:cxnSp>
+          <p:nvCxnSpPr>
+            <p:cNvPr id="21" name="Gerade Verbindung 20"/>
+            <p:cNvCxnSpPr/>
+            <p:nvPr/>
+          </p:nvCxnSpPr>
+          <p:spPr bwMode="auto">
+            <a:xfrm>
+              <a:off x="1693610" y="2692171"/>
+              <a:ext cx="723008" cy="525695"/>
+            </a:xfrm>
+            <a:prstGeom prst="line">
+              <a:avLst/>
+            </a:prstGeom>
+            <a:noFill/>
+            <a:ln w="9525" cap="flat" cmpd="sng" algn="ctr">
+              <a:solidFill>
+                <a:schemeClr val="tx1"/>
+              </a:solidFill>
+              <a:prstDash val="solid"/>
+              <a:round/>
+              <a:headEnd type="none" w="med" len="med"/>
+              <a:tailEnd type="none" w="med" len="med"/>
+            </a:ln>
+            <a:effectLst/>
+          </p:spPr>
+        </p:cxnSp>
+      </p:grpSp>
+      <p:sp>
+        <p:nvSpPr>
+          <p:cNvPr id="24" name="Textfeld 23"/>
+          <p:cNvSpPr txBox="1"/>
+          <p:nvPr/>
+        </p:nvSpPr>
+        <p:spPr>
+          <a:xfrm>
+            <a:off x="6473083" y="1627427"/>
+            <a:ext cx="2231672" cy="1395254"/>
+          </a:xfrm>
+          <a:prstGeom prst="rect">
+            <a:avLst/>
+          </a:prstGeom>
+          <a:noFill/>
+        </p:spPr>
+        <p:txBody>
+          <a:bodyPr wrap="square" rtlCol="0">
+            <a:spAutoFit/>
+          </a:bodyPr>
           <a:lstStyle/>
           <a:p>
-            <a:endParaRPr lang="de-DE"/>
+            <a:pPr marL="285750" indent="-285750">
+              <a:buFont typeface="Arial"/>
+              <a:buChar char="•"/>
+            </a:pPr>
+            <a:r>
+              <a:rPr lang="de-DE" sz="1800" dirty="0" smtClean="0"/>
+              <a:t>C</a:t>
+            </a:r>
+            <a:r>
+              <a:rPr lang="de-DE" sz="1800" baseline="30000" dirty="0" smtClean="0"/>
+              <a:t>3</a:t>
+            </a:r>
+            <a:r>
+              <a:rPr lang="de-DE" sz="1800" dirty="0" smtClean="0"/>
+              <a:t> </a:t>
+            </a:r>
+            <a:r>
+              <a:rPr lang="de-DE" sz="1800" dirty="0" err="1" smtClean="0"/>
+              <a:t>Continuity</a:t>
+            </a:r>
+            <a:r>
+              <a:rPr lang="de-DE" sz="1800" dirty="0" smtClean="0"/>
+              <a:t> </a:t>
+            </a:r>
+            <a:r>
+              <a:rPr lang="de-DE" sz="1800" dirty="0" err="1" smtClean="0"/>
+              <a:t>would</a:t>
+            </a:r>
+            <a:r>
+              <a:rPr lang="de-DE" sz="1800" dirty="0" smtClean="0"/>
+              <a:t> </a:t>
+            </a:r>
+            <a:r>
+              <a:rPr lang="de-DE" sz="1800" dirty="0" err="1" smtClean="0"/>
+              <a:t>be</a:t>
+            </a:r>
+            <a:r>
+              <a:rPr lang="de-DE" sz="1800" dirty="0" smtClean="0"/>
+              <a:t> </a:t>
+            </a:r>
+            <a:r>
+              <a:rPr lang="de-DE" sz="1800" dirty="0" err="1" smtClean="0"/>
+              <a:t>best</a:t>
+            </a:r>
+            <a:r>
+              <a:rPr lang="de-DE" sz="1800" dirty="0" smtClean="0"/>
+              <a:t>!</a:t>
+            </a:r>
+          </a:p>
+          <a:p>
+            <a:pPr marL="285750" indent="-285750">
+              <a:buFont typeface="Arial"/>
+              <a:buChar char="•"/>
+            </a:pPr>
+            <a:r>
+              <a:rPr lang="de-DE" sz="1800" dirty="0" err="1" smtClean="0"/>
+              <a:t>Yet</a:t>
+            </a:r>
+            <a:r>
+              <a:rPr lang="de-DE" sz="1800" dirty="0" smtClean="0"/>
+              <a:t> C</a:t>
+            </a:r>
+            <a:r>
+              <a:rPr lang="de-DE" sz="1800" baseline="30000" dirty="0" smtClean="0"/>
+              <a:t>2</a:t>
+            </a:r>
+            <a:r>
+              <a:rPr lang="de-DE" sz="1800" dirty="0" smtClean="0"/>
+              <a:t> </a:t>
+            </a:r>
+            <a:r>
+              <a:rPr lang="de-DE" sz="1800" dirty="0" err="1" smtClean="0"/>
+              <a:t>seems</a:t>
+            </a:r>
+            <a:r>
+              <a:rPr lang="de-DE" sz="1800" dirty="0" smtClean="0"/>
+              <a:t> </a:t>
+            </a:r>
+            <a:r>
+              <a:rPr lang="de-DE" sz="1800" dirty="0" err="1" smtClean="0"/>
+              <a:t>to</a:t>
+            </a:r>
+            <a:r>
+              <a:rPr lang="de-DE" sz="1800" dirty="0" smtClean="0"/>
+              <a:t> </a:t>
+            </a:r>
+            <a:r>
+              <a:rPr lang="de-DE" sz="1800" dirty="0" err="1" smtClean="0"/>
+              <a:t>be</a:t>
+            </a:r>
+            <a:r>
+              <a:rPr lang="de-DE" sz="1800" dirty="0" smtClean="0"/>
+              <a:t> </a:t>
+            </a:r>
+            <a:r>
+              <a:rPr lang="de-DE" sz="1800" dirty="0" err="1" smtClean="0"/>
+              <a:t>sufficient</a:t>
+            </a:r>
+            <a:endParaRPr lang="de-DE" sz="1800" dirty="0"/>
+          </a:p>
+        </p:txBody>
+      </p:sp>
+      <p:sp>
+        <p:nvSpPr>
+          <p:cNvPr id="25" name="Textfeld 24"/>
+          <p:cNvSpPr txBox="1"/>
+          <p:nvPr/>
+        </p:nvSpPr>
+        <p:spPr>
+          <a:xfrm>
+            <a:off x="6625483" y="3394925"/>
+            <a:ext cx="2177910" cy="2626360"/>
+          </a:xfrm>
+          <a:prstGeom prst="rect">
+            <a:avLst/>
+          </a:prstGeom>
+          <a:noFill/>
+        </p:spPr>
+        <p:txBody>
+          <a:bodyPr wrap="square" rtlCol="0">
+            <a:spAutoFit/>
+          </a:bodyPr>
+          <a:lstStyle/>
+          <a:p>
+            <a:r>
+              <a:rPr lang="de-DE" sz="1800" dirty="0" err="1" smtClean="0"/>
+              <a:t>Decision</a:t>
+            </a:r>
+            <a:endParaRPr lang="de-DE" sz="1800" dirty="0" smtClean="0"/>
+          </a:p>
+          <a:p>
+            <a:pPr marL="285750" indent="-285750">
+              <a:buFont typeface="Arial"/>
+              <a:buChar char="•"/>
+            </a:pPr>
+            <a:r>
+              <a:rPr lang="de-DE" sz="1800" dirty="0" err="1" smtClean="0"/>
+              <a:t>Consider</a:t>
+            </a:r>
+            <a:r>
+              <a:rPr lang="de-DE" sz="1800" dirty="0" smtClean="0"/>
+              <a:t> </a:t>
+            </a:r>
+            <a:r>
+              <a:rPr lang="de-DE" sz="1800" dirty="0" err="1" smtClean="0"/>
+              <a:t>the</a:t>
+            </a:r>
+            <a:r>
+              <a:rPr lang="de-DE" sz="1800" dirty="0" smtClean="0"/>
+              <a:t> </a:t>
+            </a:r>
+            <a:r>
+              <a:rPr lang="de-DE" sz="1800" dirty="0" err="1" smtClean="0"/>
+              <a:t>other</a:t>
+            </a:r>
+            <a:r>
+              <a:rPr lang="de-DE" sz="1800" dirty="0" smtClean="0"/>
+              <a:t> </a:t>
+            </a:r>
+            <a:r>
+              <a:rPr lang="de-DE" sz="1800" dirty="0" err="1" smtClean="0"/>
+              <a:t>effects</a:t>
+            </a:r>
+            <a:r>
+              <a:rPr lang="de-DE" sz="1800" dirty="0" smtClean="0"/>
+              <a:t> </a:t>
+            </a:r>
+            <a:r>
+              <a:rPr lang="de-DE" sz="1800" dirty="0" err="1" smtClean="0"/>
+              <a:t>of</a:t>
+            </a:r>
+            <a:r>
+              <a:rPr lang="de-DE" sz="1800" dirty="0" smtClean="0"/>
+              <a:t> </a:t>
+            </a:r>
+            <a:r>
+              <a:rPr lang="de-DE" sz="1800" dirty="0" err="1" smtClean="0"/>
+              <a:t>the</a:t>
+            </a:r>
+            <a:r>
+              <a:rPr lang="de-DE" sz="1800" dirty="0" smtClean="0"/>
+              <a:t> </a:t>
+            </a:r>
+            <a:r>
+              <a:rPr lang="de-DE" sz="1800" dirty="0" err="1" smtClean="0"/>
+              <a:t>spline</a:t>
+            </a:r>
+            <a:r>
+              <a:rPr lang="de-DE" sz="1800" dirty="0" smtClean="0"/>
+              <a:t> </a:t>
+            </a:r>
+            <a:r>
+              <a:rPr lang="de-DE" sz="1800" dirty="0" err="1" smtClean="0"/>
+              <a:t>degree</a:t>
+            </a:r>
+            <a:r>
+              <a:rPr lang="de-DE" sz="1800" dirty="0" smtClean="0"/>
+              <a:t> </a:t>
+            </a:r>
+            <a:r>
+              <a:rPr lang="de-DE" sz="1800" dirty="0" err="1" smtClean="0"/>
+              <a:t>choice</a:t>
+            </a:r>
+            <a:r>
+              <a:rPr lang="de-DE" sz="1800" dirty="0" smtClean="0"/>
+              <a:t>, </a:t>
+            </a:r>
+            <a:r>
+              <a:rPr lang="de-DE" sz="1800" dirty="0" err="1" smtClean="0"/>
+              <a:t>if</a:t>
+            </a:r>
+            <a:r>
+              <a:rPr lang="de-DE" sz="1800" dirty="0" smtClean="0"/>
+              <a:t> </a:t>
+            </a:r>
+            <a:r>
+              <a:rPr lang="de-DE" sz="1800" dirty="0" err="1" smtClean="0"/>
+              <a:t>quartic</a:t>
+            </a:r>
+            <a:r>
+              <a:rPr lang="de-DE" sz="1800" dirty="0" smtClean="0"/>
+              <a:t> </a:t>
+            </a:r>
+            <a:r>
+              <a:rPr lang="de-DE" sz="1800" dirty="0" err="1" smtClean="0"/>
+              <a:t>has</a:t>
+            </a:r>
+            <a:r>
+              <a:rPr lang="de-DE" sz="1800" dirty="0" smtClean="0"/>
+              <a:t> </a:t>
+            </a:r>
+            <a:r>
+              <a:rPr lang="de-DE" sz="1800" dirty="0" err="1" smtClean="0"/>
+              <a:t>no</a:t>
+            </a:r>
+            <a:r>
+              <a:rPr lang="de-DE" sz="1800" dirty="0" smtClean="0"/>
+              <a:t> </a:t>
+            </a:r>
+            <a:r>
+              <a:rPr lang="de-DE" sz="1800" dirty="0" err="1" smtClean="0"/>
+              <a:t>drawbacks</a:t>
+            </a:r>
+            <a:r>
+              <a:rPr lang="de-DE" sz="1800" dirty="0" smtClean="0"/>
+              <a:t>, </a:t>
+            </a:r>
+            <a:r>
+              <a:rPr lang="de-DE" sz="1800" dirty="0" err="1" smtClean="0"/>
+              <a:t>choose</a:t>
+            </a:r>
+            <a:r>
+              <a:rPr lang="de-DE" sz="1800" dirty="0" smtClean="0"/>
+              <a:t> </a:t>
+            </a:r>
+            <a:r>
+              <a:rPr lang="de-DE" sz="1800" dirty="0" err="1" smtClean="0"/>
+              <a:t>quartic</a:t>
+            </a:r>
+            <a:r>
+              <a:rPr lang="de-DE" sz="1800" dirty="0" smtClean="0"/>
+              <a:t>.</a:t>
+            </a:r>
+            <a:endParaRPr lang="de-DE" sz="1800" dirty="0"/>
           </a:p>
         </p:txBody>
       </p:sp>
@@ -4299,109 +6311,6 @@
       <p:transition/>
     </mc:Fallback>
   </mc:AlternateContent>
-</p:sld>
-</file>
-
-<file path=ppt/slides/slide9.xml><?xml version="1.0" encoding="utf-8"?>
-<p:sld xmlns:a="http://schemas.openxmlformats.org/drawingml/2006/main" xmlns:r="http://schemas.openxmlformats.org/officeDocument/2006/relationships" xmlns:p="http://schemas.openxmlformats.org/presentationml/2006/main">
-  <p:cSld>
-    <p:spTree>
-      <p:nvGrpSpPr>
-        <p:cNvPr id="1" name=""/>
-        <p:cNvGrpSpPr/>
-        <p:nvPr/>
-      </p:nvGrpSpPr>
-      <p:grpSpPr>
-        <a:xfrm>
-          <a:off x="0" y="0"/>
-          <a:ext cx="0" cy="0"/>
-          <a:chOff x="0" y="0"/>
-          <a:chExt cx="0" cy="0"/>
-        </a:xfrm>
-      </p:grpSpPr>
-      <p:sp>
-        <p:nvSpPr>
-          <p:cNvPr id="2" name="Titel 1"/>
-          <p:cNvSpPr>
-            <a:spLocks noGrp="1"/>
-          </p:cNvSpPr>
-          <p:nvPr>
-            <p:ph type="ctrTitle"/>
-          </p:nvPr>
-        </p:nvSpPr>
-        <p:spPr/>
-        <p:txBody>
-          <a:bodyPr/>
-          <a:lstStyle/>
-          <a:p>
-            <a:r>
-              <a:rPr lang="de-CH" dirty="0">
-                <a:solidFill>
-                  <a:srgbClr val="00B0F0"/>
-                </a:solidFill>
-              </a:rPr>
-              <a:t>&gt;&gt;</a:t>
-            </a:r>
-            <a:r>
-              <a:rPr lang="de-CH" dirty="0"/>
-              <a:t> </a:t>
-            </a:r>
-            <a:r>
-              <a:rPr lang="de-CH" dirty="0" smtClean="0"/>
-              <a:t>Backup</a:t>
-            </a:r>
-            <a:endParaRPr lang="de-DE" dirty="0"/>
-          </a:p>
-        </p:txBody>
-      </p:sp>
-      <p:sp>
-        <p:nvSpPr>
-          <p:cNvPr id="3" name="Untertitel 2"/>
-          <p:cNvSpPr>
-            <a:spLocks noGrp="1"/>
-          </p:cNvSpPr>
-          <p:nvPr>
-            <p:ph type="subTitle" idx="1"/>
-          </p:nvPr>
-        </p:nvSpPr>
-        <p:spPr/>
-        <p:txBody>
-          <a:bodyPr/>
-          <a:lstStyle/>
-          <a:p>
-            <a:r>
-              <a:rPr lang="de-CH" dirty="0" smtClean="0"/>
-              <a:t> </a:t>
-            </a:r>
-            <a:endParaRPr lang="de-DE" dirty="0"/>
-          </a:p>
-        </p:txBody>
-      </p:sp>
-    </p:spTree>
-    <p:extLst>
-      <p:ext uri="{BB962C8B-B14F-4D97-AF65-F5344CB8AC3E}">
-        <p14:creationId xmlns:p14="http://schemas.microsoft.com/office/powerpoint/2010/main" val="289141002"/>
-      </p:ext>
-    </p:extLst>
-  </p:cSld>
-  <p:clrMapOvr>
-    <a:masterClrMapping/>
-  </p:clrMapOvr>
-  <mc:AlternateContent xmlns:mc="http://schemas.openxmlformats.org/markup-compatibility/2006" xmlns:p14="http://schemas.microsoft.com/office/powerpoint/2010/main">
-    <mc:Choice Requires="p14">
-      <p:transition p14:dur="0"/>
-    </mc:Choice>
-    <mc:Fallback xmlns="">
-      <p:transition/>
-    </mc:Fallback>
-  </mc:AlternateContent>
-  <p:timing>
-    <p:tnLst>
-      <p:par>
-        <p:cTn xmlns:p14="http://schemas.microsoft.com/office/powerpoint/2010/main" id="1" dur="indefinite" restart="never" nodeType="tmRoot"/>
-      </p:par>
-    </p:tnLst>
-  </p:timing>
 </p:sld>
 </file>
 

</xml_diff>

<commit_message>
Started trajectory controller part of ppt
</commit_message>
<xml_diff>
--- a/powerpoint/final_presentation.pptx
+++ b/powerpoint/final_presentation.pptx
@@ -5,10 +5,10 @@
     <p:sldMasterId id="2147483651" r:id="rId1"/>
   </p:sldMasterIdLst>
   <p:notesMasterIdLst>
-    <p:notesMasterId r:id="rId17"/>
+    <p:notesMasterId r:id="rId19"/>
   </p:notesMasterIdLst>
   <p:handoutMasterIdLst>
-    <p:handoutMasterId r:id="rId18"/>
+    <p:handoutMasterId r:id="rId20"/>
   </p:handoutMasterIdLst>
   <p:sldIdLst>
     <p:sldId id="256" r:id="rId2"/>
@@ -23,9 +23,11 @@
     <p:sldId id="281" r:id="rId11"/>
     <p:sldId id="282" r:id="rId12"/>
     <p:sldId id="283" r:id="rId13"/>
-    <p:sldId id="285" r:id="rId14"/>
-    <p:sldId id="261" r:id="rId15"/>
-    <p:sldId id="273" r:id="rId16"/>
+    <p:sldId id="286" r:id="rId14"/>
+    <p:sldId id="287" r:id="rId15"/>
+    <p:sldId id="285" r:id="rId16"/>
+    <p:sldId id="261" r:id="rId17"/>
+    <p:sldId id="273" r:id="rId18"/>
   </p:sldIdLst>
   <p:sldSz cx="9144000" cy="6858000" type="screen4x3"/>
   <p:notesSz cx="6797675" cy="9874250"/>
@@ -458,7 +460,7 @@
     </p:spTree>
     <p:extLst>
       <p:ext uri="{BB962C8B-B14F-4D97-AF65-F5344CB8AC3E}">
-        <p14:creationId xmlns:p14="http://schemas.microsoft.com/office/powerpoint/2010/main" val="3768771490"/>
+        <p14:creationId xmlns:p14="http://schemas.microsoft.com/office/powerpoint/2010/main" xmlns="" val="3768771490"/>
       </p:ext>
     </p:extLst>
   </p:cSld>
@@ -926,7 +928,7 @@
     </p:spTree>
     <p:extLst>
       <p:ext uri="{BB962C8B-B14F-4D97-AF65-F5344CB8AC3E}">
-        <p14:creationId xmlns:p14="http://schemas.microsoft.com/office/powerpoint/2010/main" val="4213939783"/>
+        <p14:creationId xmlns:p14="http://schemas.microsoft.com/office/powerpoint/2010/main" xmlns="" val="4213939783"/>
       </p:ext>
     </p:extLst>
   </p:cSld>
@@ -1107,10 +1109,10 @@
           <p:nvPr userDrawn="1"/>
         </p:nvPicPr>
         <p:blipFill rotWithShape="1">
-          <a:blip r:embed="rId2">
+          <a:blip r:embed="rId2" cstate="print">
             <a:extLst>
               <a:ext uri="{28A0092B-C50C-407E-A947-70E740481C1C}">
-                <a14:useLocalDpi xmlns:a14="http://schemas.microsoft.com/office/drawing/2010/main" val="0"/>
+                <a14:useLocalDpi xmlns:a14="http://schemas.microsoft.com/office/drawing/2010/main" xmlns="" val="0"/>
               </a:ext>
             </a:extLst>
           </a:blip>
@@ -1132,14 +1134,14 @@
           <a:effectLst/>
           <a:extLst>
             <a:ext uri="{909E8E84-426E-40dd-AFC4-6F175D3DCCD1}">
-              <a14:hiddenFill xmlns:a14="http://schemas.microsoft.com/office/drawing/2010/main">
+              <a14:hiddenFill xmlns:a14="http://schemas.microsoft.com/office/drawing/2010/main" xmlns="">
                 <a:solidFill>
                   <a:schemeClr val="accent1"/>
                 </a:solidFill>
               </a14:hiddenFill>
             </a:ext>
             <a:ext uri="{91240B29-F687-4f45-9708-019B960494DF}">
-              <a14:hiddenLine xmlns:a14="http://schemas.microsoft.com/office/drawing/2010/main" w="9525">
+              <a14:hiddenLine xmlns:a14="http://schemas.microsoft.com/office/drawing/2010/main" xmlns="" w="9525">
                 <a:solidFill>
                   <a:schemeClr val="tx1"/>
                 </a:solidFill>
@@ -1149,7 +1151,7 @@
               </a14:hiddenLine>
             </a:ext>
             <a:ext uri="{AF507438-7753-43e0-B8FC-AC1667EBCBE1}">
-              <a14:hiddenEffects xmlns:a14="http://schemas.microsoft.com/office/drawing/2010/main">
+              <a14:hiddenEffects xmlns:a14="http://schemas.microsoft.com/office/drawing/2010/main" xmlns="">
                 <a:effectLst>
                   <a:outerShdw dist="35921" dir="2700000" algn="ctr" rotWithShape="0">
                     <a:schemeClr val="bg2"/>
@@ -1248,7 +1250,7 @@
           <a:blip r:embed="rId3" cstate="print">
             <a:extLst>
               <a:ext uri="{28A0092B-C50C-407E-A947-70E740481C1C}">
-                <a14:useLocalDpi xmlns:a14="http://schemas.microsoft.com/office/drawing/2010/main" val="0"/>
+                <a14:useLocalDpi xmlns:a14="http://schemas.microsoft.com/office/drawing/2010/main" xmlns="" val="0"/>
               </a:ext>
             </a:extLst>
           </a:blip>
@@ -1272,14 +1274,14 @@
           <a:effectLst/>
           <a:extLst>
             <a:ext uri="{909E8E84-426E-40dd-AFC4-6F175D3DCCD1}">
-              <a14:hiddenFill xmlns:a14="http://schemas.microsoft.com/office/drawing/2010/main">
+              <a14:hiddenFill xmlns:a14="http://schemas.microsoft.com/office/drawing/2010/main" xmlns="">
                 <a:solidFill>
                   <a:schemeClr val="accent1"/>
                 </a:solidFill>
               </a14:hiddenFill>
             </a:ext>
             <a:ext uri="{91240B29-F687-4f45-9708-019B960494DF}">
-              <a14:hiddenLine xmlns:a14="http://schemas.microsoft.com/office/drawing/2010/main" w="9525">
+              <a14:hiddenLine xmlns:a14="http://schemas.microsoft.com/office/drawing/2010/main" xmlns="" w="9525">
                 <a:solidFill>
                   <a:schemeClr val="tx1"/>
                 </a:solidFill>
@@ -1289,7 +1291,7 @@
               </a14:hiddenLine>
             </a:ext>
             <a:ext uri="{AF507438-7753-43e0-B8FC-AC1667EBCBE1}">
-              <a14:hiddenEffects xmlns:a14="http://schemas.microsoft.com/office/drawing/2010/main">
+              <a14:hiddenEffects xmlns:a14="http://schemas.microsoft.com/office/drawing/2010/main" xmlns="">
                 <a:effectLst>
                   <a:outerShdw dist="35921" dir="2700000" algn="ctr" rotWithShape="0">
                     <a:schemeClr val="bg2"/>
@@ -1312,7 +1314,7 @@
           <a:blip r:embed="rId4" cstate="print">
             <a:extLst>
               <a:ext uri="{28A0092B-C50C-407E-A947-70E740481C1C}">
-                <a14:useLocalDpi xmlns:a14="http://schemas.microsoft.com/office/drawing/2010/main" val="0"/>
+                <a14:useLocalDpi xmlns:a14="http://schemas.microsoft.com/office/drawing/2010/main" xmlns="" val="0"/>
               </a:ext>
             </a:extLst>
           </a:blip>
@@ -1334,14 +1336,14 @@
           <a:effectLst/>
           <a:extLst>
             <a:ext uri="{909E8E84-426E-40dd-AFC4-6F175D3DCCD1}">
-              <a14:hiddenFill xmlns:a14="http://schemas.microsoft.com/office/drawing/2010/main">
+              <a14:hiddenFill xmlns:a14="http://schemas.microsoft.com/office/drawing/2010/main" xmlns="">
                 <a:solidFill>
                   <a:schemeClr val="accent1"/>
                 </a:solidFill>
               </a14:hiddenFill>
             </a:ext>
             <a:ext uri="{91240B29-F687-4f45-9708-019B960494DF}">
-              <a14:hiddenLine xmlns:a14="http://schemas.microsoft.com/office/drawing/2010/main" w="9525">
+              <a14:hiddenLine xmlns:a14="http://schemas.microsoft.com/office/drawing/2010/main" xmlns="" w="9525">
                 <a:solidFill>
                   <a:schemeClr val="tx1"/>
                 </a:solidFill>
@@ -1351,7 +1353,7 @@
               </a14:hiddenLine>
             </a:ext>
             <a:ext uri="{AF507438-7753-43e0-B8FC-AC1667EBCBE1}">
-              <a14:hiddenEffects xmlns:a14="http://schemas.microsoft.com/office/drawing/2010/main">
+              <a14:hiddenEffects xmlns:a14="http://schemas.microsoft.com/office/drawing/2010/main" xmlns="">
                 <a:effectLst>
                   <a:outerShdw dist="35921" dir="2700000" algn="ctr" rotWithShape="0">
                     <a:schemeClr val="bg2"/>
@@ -1388,7 +1390,7 @@
             <a:blip r:embed="rId5" cstate="print">
               <a:extLst>
                 <a:ext uri="{28A0092B-C50C-407E-A947-70E740481C1C}">
-                  <a14:useLocalDpi xmlns:a14="http://schemas.microsoft.com/office/drawing/2010/main" val="0"/>
+                  <a14:useLocalDpi xmlns:a14="http://schemas.microsoft.com/office/drawing/2010/main" xmlns="" val="0"/>
                 </a:ext>
               </a:extLst>
             </a:blip>
@@ -1408,7 +1410,7 @@
             <a:noFill/>
             <a:extLst>
               <a:ext uri="{909E8E84-426E-40dd-AFC4-6F175D3DCCD1}">
-                <a14:hiddenFill xmlns:a14="http://schemas.microsoft.com/office/drawing/2010/main">
+                <a14:hiddenFill xmlns:a14="http://schemas.microsoft.com/office/drawing/2010/main" xmlns="">
                   <a:solidFill>
                     <a:srgbClr val="FFFFFF"/>
                   </a:solidFill>
@@ -1429,7 +1431,7 @@
             <a:blip r:embed="rId6" cstate="print">
               <a:extLst>
                 <a:ext uri="{28A0092B-C50C-407E-A947-70E740481C1C}">
-                  <a14:useLocalDpi xmlns:a14="http://schemas.microsoft.com/office/drawing/2010/main" val="0"/>
+                  <a14:useLocalDpi xmlns:a14="http://schemas.microsoft.com/office/drawing/2010/main" xmlns="" val="0"/>
                 </a:ext>
               </a:extLst>
             </a:blip>
@@ -1449,7 +1451,7 @@
             <a:noFill/>
             <a:extLst>
               <a:ext uri="{909E8E84-426E-40dd-AFC4-6F175D3DCCD1}">
-                <a14:hiddenFill xmlns:a14="http://schemas.microsoft.com/office/drawing/2010/main">
+                <a14:hiddenFill xmlns:a14="http://schemas.microsoft.com/office/drawing/2010/main" xmlns="">
                   <a:solidFill>
                     <a:srgbClr val="FFFFFF"/>
                   </a:solidFill>
@@ -1470,7 +1472,7 @@
             <a:blip r:embed="rId7" cstate="print">
               <a:extLst>
                 <a:ext uri="{28A0092B-C50C-407E-A947-70E740481C1C}">
-                  <a14:useLocalDpi xmlns:a14="http://schemas.microsoft.com/office/drawing/2010/main" val="0"/>
+                  <a14:useLocalDpi xmlns:a14="http://schemas.microsoft.com/office/drawing/2010/main" xmlns="" val="0"/>
                 </a:ext>
               </a:extLst>
             </a:blip>
@@ -1490,7 +1492,7 @@
             <a:noFill/>
             <a:extLst>
               <a:ext uri="{909E8E84-426E-40dd-AFC4-6F175D3DCCD1}">
-                <a14:hiddenFill xmlns:a14="http://schemas.microsoft.com/office/drawing/2010/main">
+                <a14:hiddenFill xmlns:a14="http://schemas.microsoft.com/office/drawing/2010/main" xmlns="">
                   <a:solidFill>
                     <a:srgbClr val="FFFFFF"/>
                   </a:solidFill>
@@ -1508,10 +1510,10 @@
             <p:nvPr userDrawn="1"/>
           </p:nvPicPr>
           <p:blipFill>
-            <a:blip r:embed="rId8">
+            <a:blip r:embed="rId8" cstate="print">
               <a:extLst>
                 <a:ext uri="{28A0092B-C50C-407E-A947-70E740481C1C}">
-                  <a14:useLocalDpi xmlns:a14="http://schemas.microsoft.com/office/drawing/2010/main" val="0"/>
+                  <a14:useLocalDpi xmlns:a14="http://schemas.microsoft.com/office/drawing/2010/main" xmlns="" val="0"/>
                 </a:ext>
               </a:extLst>
             </a:blip>
@@ -1531,7 +1533,7 @@
             <a:noFill/>
             <a:extLst>
               <a:ext uri="{909E8E84-426E-40dd-AFC4-6F175D3DCCD1}">
-                <a14:hiddenFill xmlns:a14="http://schemas.microsoft.com/office/drawing/2010/main">
+                <a14:hiddenFill xmlns:a14="http://schemas.microsoft.com/office/drawing/2010/main" xmlns="">
                   <a:solidFill>
                     <a:srgbClr val="FFFFFF"/>
                   </a:solidFill>
@@ -1549,10 +1551,10 @@
             <p:nvPr userDrawn="1"/>
           </p:nvPicPr>
           <p:blipFill>
-            <a:blip r:embed="rId9">
+            <a:blip r:embed="rId9" cstate="print">
               <a:extLst>
                 <a:ext uri="{28A0092B-C50C-407E-A947-70E740481C1C}">
-                  <a14:useLocalDpi xmlns:a14="http://schemas.microsoft.com/office/drawing/2010/main" val="0"/>
+                  <a14:useLocalDpi xmlns:a14="http://schemas.microsoft.com/office/drawing/2010/main" xmlns="" val="0"/>
                 </a:ext>
               </a:extLst>
             </a:blip>
@@ -1572,7 +1574,7 @@
             <a:noFill/>
             <a:extLst>
               <a:ext uri="{909E8E84-426E-40dd-AFC4-6F175D3DCCD1}">
-                <a14:hiddenFill xmlns:a14="http://schemas.microsoft.com/office/drawing/2010/main">
+                <a14:hiddenFill xmlns:a14="http://schemas.microsoft.com/office/drawing/2010/main" xmlns="">
                   <a:solidFill>
                     <a:srgbClr val="FFFFFF"/>
                   </a:solidFill>
@@ -1587,13 +1589,13 @@
   <p:clrMapOvr>
     <a:masterClrMapping/>
   </p:clrMapOvr>
-  <p:transition xmlns:p14="http://schemas.microsoft.com/office/powerpoint/2010/main" spd="slow">
+  <p:transition spd="slow">
     <p:fade/>
   </p:transition>
   <p:timing>
     <p:tnLst>
       <p:par>
-        <p:cTn xmlns:p14="http://schemas.microsoft.com/office/powerpoint/2010/main" id="1" dur="indefinite" restart="never" nodeType="tmRoot"/>
+        <p:cTn id="1" dur="indefinite" restart="never" nodeType="tmRoot"/>
       </p:par>
     </p:tnLst>
   </p:timing>
@@ -1780,18 +1782,18 @@
   <p:clrMapOvr>
     <a:masterClrMapping/>
   </p:clrMapOvr>
-  <mc:AlternateContent xmlns:mc="http://schemas.openxmlformats.org/markup-compatibility/2006" xmlns:p14="http://schemas.microsoft.com/office/powerpoint/2010/main">
-    <mc:Choice Requires="p14">
+  <mc:AlternateContent xmlns:mc="http://schemas.openxmlformats.org/markup-compatibility/2006">
+    <mc:Choice xmlns:p14="http://schemas.microsoft.com/office/powerpoint/2010/main" xmlns="" Requires="p14">
       <p:transition p14:dur="0"/>
     </mc:Choice>
-    <mc:Fallback xmlns="">
+    <mc:Fallback>
       <p:transition/>
     </mc:Fallback>
   </mc:AlternateContent>
   <p:timing>
     <p:tnLst>
       <p:par>
-        <p:cTn xmlns:p14="http://schemas.microsoft.com/office/powerpoint/2010/main" id="1" dur="indefinite" restart="never" nodeType="tmRoot"/>
+        <p:cTn id="1" dur="indefinite" restart="never" nodeType="tmRoot"/>
       </p:par>
     </p:tnLst>
   </p:timing>
@@ -1912,13 +1914,13 @@
   <p:clrMapOvr>
     <a:masterClrMapping/>
   </p:clrMapOvr>
-  <p:transition xmlns:p14="http://schemas.microsoft.com/office/powerpoint/2010/main" spd="slow">
+  <p:transition spd="slow">
     <p:fade/>
   </p:transition>
   <p:timing>
     <p:tnLst>
       <p:par>
-        <p:cTn xmlns:p14="http://schemas.microsoft.com/office/powerpoint/2010/main" id="1" dur="indefinite" restart="never" nodeType="tmRoot"/>
+        <p:cTn id="1" dur="indefinite" restart="never" nodeType="tmRoot"/>
       </p:par>
     </p:tnLst>
   </p:timing>
@@ -1962,7 +1964,7 @@
           <a:blip r:embed="rId5" cstate="print">
             <a:extLst>
               <a:ext uri="{28A0092B-C50C-407E-A947-70E740481C1C}">
-                <a14:useLocalDpi xmlns:a14="http://schemas.microsoft.com/office/drawing/2010/main" val="0"/>
+                <a14:useLocalDpi xmlns:a14="http://schemas.microsoft.com/office/drawing/2010/main" xmlns="" val="0"/>
               </a:ext>
             </a:extLst>
           </a:blip>
@@ -1984,14 +1986,14 @@
           <a:effectLst/>
           <a:extLst>
             <a:ext uri="{909E8E84-426E-40dd-AFC4-6F175D3DCCD1}">
-              <a14:hiddenFill xmlns:a14="http://schemas.microsoft.com/office/drawing/2010/main">
+              <a14:hiddenFill xmlns:a14="http://schemas.microsoft.com/office/drawing/2010/main" xmlns="">
                 <a:solidFill>
                   <a:schemeClr val="accent1"/>
                 </a:solidFill>
               </a14:hiddenFill>
             </a:ext>
             <a:ext uri="{91240B29-F687-4f45-9708-019B960494DF}">
-              <a14:hiddenLine xmlns:a14="http://schemas.microsoft.com/office/drawing/2010/main" w="9525">
+              <a14:hiddenLine xmlns:a14="http://schemas.microsoft.com/office/drawing/2010/main" xmlns="" w="9525">
                 <a:solidFill>
                   <a:schemeClr val="tx1"/>
                 </a:solidFill>
@@ -2001,7 +2003,7 @@
               </a14:hiddenLine>
             </a:ext>
             <a:ext uri="{AF507438-7753-43e0-B8FC-AC1667EBCBE1}">
-              <a14:hiddenEffects xmlns:a14="http://schemas.microsoft.com/office/drawing/2010/main">
+              <a14:hiddenEffects xmlns:a14="http://schemas.microsoft.com/office/drawing/2010/main" xmlns="">
                 <a:effectLst>
                   <a:outerShdw dist="35921" dir="2700000" algn="ctr" rotWithShape="0">
                     <a:schemeClr val="bg2"/>
@@ -2176,13 +2178,13 @@
     <p:sldLayoutId id="2147483653" r:id="rId2"/>
     <p:sldLayoutId id="2147483660" r:id="rId3"/>
   </p:sldLayoutIdLst>
-  <p:transition xmlns:p14="http://schemas.microsoft.com/office/powerpoint/2010/main" spd="slow">
+  <p:transition spd="slow">
     <p:fade/>
   </p:transition>
   <p:timing>
     <p:tnLst>
       <p:par>
-        <p:cTn xmlns:p14="http://schemas.microsoft.com/office/powerpoint/2010/main" id="1" dur="indefinite" restart="never" nodeType="tmRoot"/>
+        <p:cTn id="1" dur="indefinite" restart="never" nodeType="tmRoot"/>
       </p:par>
     </p:tnLst>
   </p:timing>
@@ -2743,25 +2745,25 @@
     </p:spTree>
     <p:extLst>
       <p:ext uri="{BB962C8B-B14F-4D97-AF65-F5344CB8AC3E}">
-        <p14:creationId xmlns:p14="http://schemas.microsoft.com/office/powerpoint/2010/main" val="4007722145"/>
+        <p14:creationId xmlns:p14="http://schemas.microsoft.com/office/powerpoint/2010/main" xmlns="" val="4007722145"/>
       </p:ext>
     </p:extLst>
   </p:cSld>
   <p:clrMapOvr>
     <a:masterClrMapping/>
   </p:clrMapOvr>
-  <mc:AlternateContent xmlns:mc="http://schemas.openxmlformats.org/markup-compatibility/2006" xmlns:p14="http://schemas.microsoft.com/office/powerpoint/2010/main">
-    <mc:Choice Requires="p14">
+  <mc:AlternateContent xmlns:mc="http://schemas.openxmlformats.org/markup-compatibility/2006">
+    <mc:Choice xmlns:p14="http://schemas.microsoft.com/office/powerpoint/2010/main" xmlns="" Requires="p14">
       <p:transition p14:dur="0"/>
     </mc:Choice>
-    <mc:Fallback xmlns="">
+    <mc:Fallback>
       <p:transition/>
     </mc:Fallback>
   </mc:AlternateContent>
   <p:timing>
     <p:tnLst>
       <p:par>
-        <p:cTn xmlns:p14="http://schemas.microsoft.com/office/powerpoint/2010/main" id="1" dur="indefinite" restart="never" nodeType="tmRoot"/>
+        <p:cTn id="1" dur="indefinite" restart="never" nodeType="tmRoot"/>
       </p:par>
     </p:tnLst>
   </p:timing>
@@ -2866,10 +2868,10 @@
           </p:nvPr>
         </p:nvPicPr>
         <p:blipFill rotWithShape="1">
-          <a:blip r:embed="rId3">
+          <a:blip r:embed="rId3" cstate="print">
             <a:extLst>
               <a:ext uri="{28A0092B-C50C-407E-A947-70E740481C1C}">
-                <a14:useLocalDpi xmlns:a14="http://schemas.microsoft.com/office/drawing/2010/main" val="0"/>
+                <a14:useLocalDpi xmlns:a14="http://schemas.microsoft.com/office/drawing/2010/main" xmlns="" val="0"/>
               </a:ext>
             </a:extLst>
           </a:blip>
@@ -2892,7 +2894,7 @@
           <p:nvPr>
             <p:extLst>
               <p:ext uri="{D42A27DB-BD31-4B8C-83A1-F6EECF244321}">
-                <p14:modId xmlns:p14="http://schemas.microsoft.com/office/powerpoint/2010/main" val="1783936355"/>
+                <p14:modId xmlns:p14="http://schemas.microsoft.com/office/powerpoint/2010/main" xmlns="" val="1783936355"/>
               </p:ext>
             </p:extLst>
           </p:nvPr>
@@ -2903,40 +2905,9 @@
         </p:xfrm>
         <a:graphic>
           <a:graphicData uri="http://schemas.openxmlformats.org/presentationml/2006/ole">
-            <mc:AlternateContent xmlns:mc="http://schemas.openxmlformats.org/markup-compatibility/2006">
-              <mc:Choice xmlns:v="urn:schemas-microsoft-com:vml" Requires="v">
-                <p:oleObj spid="_x0000_s2069" name="Formel" r:id="rId4" imgW="469900" imgH="1041400" progId="Equation.3">
-                  <p:embed/>
-                </p:oleObj>
-              </mc:Choice>
-              <mc:Fallback>
-                <p:oleObj name="Formel" r:id="rId4" imgW="469900" imgH="1041400" progId="Equation.3">
-                  <p:embed/>
-                  <p:pic>
-                    <p:nvPicPr>
-                      <p:cNvPr id="0" name=""/>
-                      <p:cNvPicPr/>
-                      <p:nvPr/>
-                    </p:nvPicPr>
-                    <p:blipFill>
-                      <a:blip r:embed="rId5"/>
-                      <a:stretch>
-                        <a:fillRect/>
-                      </a:stretch>
-                    </p:blipFill>
-                    <p:spPr>
-                      <a:xfrm>
-                        <a:off x="215900" y="1141626"/>
-                        <a:ext cx="635000" cy="1407297"/>
-                      </a:xfrm>
-                      <a:prstGeom prst="rect">
-                        <a:avLst/>
-                      </a:prstGeom>
-                    </p:spPr>
-                  </p:pic>
-                </p:oleObj>
-              </mc:Fallback>
-            </mc:AlternateContent>
+            <p:oleObj spid="_x0000_s2069" name="Formel" r:id="rId4" imgW="456840" imgH="1032840" progId="Equation.3">
+              <p:embed/>
+            </p:oleObj>
           </a:graphicData>
         </a:graphic>
       </p:graphicFrame>
@@ -2949,7 +2920,7 @@
           <p:nvPr>
             <p:extLst>
               <p:ext uri="{D42A27DB-BD31-4B8C-83A1-F6EECF244321}">
-                <p14:modId xmlns:p14="http://schemas.microsoft.com/office/powerpoint/2010/main" val="842372637"/>
+                <p14:modId xmlns:p14="http://schemas.microsoft.com/office/powerpoint/2010/main" xmlns="" val="842372637"/>
               </p:ext>
             </p:extLst>
           </p:nvPr>
@@ -2960,40 +2931,9 @@
         </p:xfrm>
         <a:graphic>
           <a:graphicData uri="http://schemas.openxmlformats.org/presentationml/2006/ole">
-            <mc:AlternateContent xmlns:mc="http://schemas.openxmlformats.org/markup-compatibility/2006">
-              <mc:Choice xmlns:v="urn:schemas-microsoft-com:vml" Requires="v">
-                <p:oleObj spid="_x0000_s2070" name="Formel" r:id="rId6" imgW="444500" imgH="1041400" progId="Equation.3">
-                  <p:embed/>
-                </p:oleObj>
-              </mc:Choice>
-              <mc:Fallback>
-                <p:oleObj name="Formel" r:id="rId6" imgW="444500" imgH="1041400" progId="Equation.3">
-                  <p:embed/>
-                  <p:pic>
-                    <p:nvPicPr>
-                      <p:cNvPr id="0" name=""/>
-                      <p:cNvPicPr/>
-                      <p:nvPr/>
-                    </p:nvPicPr>
-                    <p:blipFill>
-                      <a:blip r:embed="rId7"/>
-                      <a:stretch>
-                        <a:fillRect/>
-                      </a:stretch>
-                    </p:blipFill>
-                    <p:spPr>
-                      <a:xfrm>
-                        <a:off x="2659063" y="2830513"/>
-                        <a:ext cx="600075" cy="1408112"/>
-                      </a:xfrm>
-                      <a:prstGeom prst="rect">
-                        <a:avLst/>
-                      </a:prstGeom>
-                    </p:spPr>
-                  </p:pic>
-                </p:oleObj>
-              </mc:Fallback>
-            </mc:AlternateContent>
+            <p:oleObj spid="_x0000_s2070" name="Formel" r:id="rId5" imgW="429480" imgH="1032840" progId="Equation.3">
+              <p:embed/>
+            </p:oleObj>
           </a:graphicData>
         </a:graphic>
       </p:graphicFrame>
@@ -3062,51 +3002,20 @@
           <p:nvPr>
             <p:extLst>
               <p:ext uri="{D42A27DB-BD31-4B8C-83A1-F6EECF244321}">
-                <p14:modId xmlns:p14="http://schemas.microsoft.com/office/powerpoint/2010/main" val="4264526694"/>
+                <p14:modId xmlns:p14="http://schemas.microsoft.com/office/powerpoint/2010/main" xmlns="" val="4264526694"/>
               </p:ext>
             </p:extLst>
           </p:nvPr>
         </p:nvGraphicFramePr>
         <p:xfrm>
-          <a:off x="5775324" y="3033713"/>
-          <a:ext cx="1793875" cy="1797928"/>
+          <a:off x="5737225" y="3016250"/>
+          <a:ext cx="1849438" cy="1803400"/>
         </p:xfrm>
         <a:graphic>
           <a:graphicData uri="http://schemas.openxmlformats.org/presentationml/2006/ole">
-            <mc:AlternateContent xmlns:mc="http://schemas.openxmlformats.org/markup-compatibility/2006">
-              <mc:Choice xmlns:v="urn:schemas-microsoft-com:vml" Requires="v">
-                <p:oleObj spid="_x0000_s2071" name="Formel" r:id="rId8" imgW="1041400" imgH="1041400" progId="Equation.3">
-                  <p:embed/>
-                </p:oleObj>
-              </mc:Choice>
-              <mc:Fallback>
-                <p:oleObj name="Formel" r:id="rId8" imgW="1041400" imgH="1041400" progId="Equation.3">
-                  <p:embed/>
-                  <p:pic>
-                    <p:nvPicPr>
-                      <p:cNvPr id="0" name=""/>
-                      <p:cNvPicPr/>
-                      <p:nvPr/>
-                    </p:nvPicPr>
-                    <p:blipFill>
-                      <a:blip r:embed="rId9"/>
-                      <a:stretch>
-                        <a:fillRect/>
-                      </a:stretch>
-                    </p:blipFill>
-                    <p:spPr>
-                      <a:xfrm>
-                        <a:off x="5775324" y="3033713"/>
-                        <a:ext cx="1793875" cy="1797928"/>
-                      </a:xfrm>
-                      <a:prstGeom prst="rect">
-                        <a:avLst/>
-                      </a:prstGeom>
-                    </p:spPr>
-                  </p:pic>
-                </p:oleObj>
-              </mc:Fallback>
-            </mc:AlternateContent>
+            <p:oleObj spid="_x0000_s2071" name="Equation" r:id="rId6" imgW="1066680" imgH="1041120" progId="Equation.3">
+              <p:embed/>
+            </p:oleObj>
           </a:graphicData>
         </a:graphic>
       </p:graphicFrame>
@@ -3285,7 +3194,7 @@
           <p:nvPr>
             <p:extLst>
               <p:ext uri="{D42A27DB-BD31-4B8C-83A1-F6EECF244321}">
-                <p14:modId xmlns:p14="http://schemas.microsoft.com/office/powerpoint/2010/main" val="3101432426"/>
+                <p14:modId xmlns:p14="http://schemas.microsoft.com/office/powerpoint/2010/main" xmlns="" val="3101432426"/>
               </p:ext>
             </p:extLst>
           </p:nvPr>
@@ -3296,61 +3205,37 @@
         </p:xfrm>
         <a:graphic>
           <a:graphicData uri="http://schemas.openxmlformats.org/presentationml/2006/ole">
-            <mc:AlternateContent xmlns:mc="http://schemas.openxmlformats.org/markup-compatibility/2006">
-              <mc:Choice xmlns:v="urn:schemas-microsoft-com:vml" Requires="v">
-                <p:oleObj spid="_x0000_s2072" name="Formel" r:id="rId10" imgW="2019300" imgH="571500" progId="Equation.3">
-                  <p:embed/>
-                </p:oleObj>
-              </mc:Choice>
-              <mc:Fallback>
-                <p:oleObj name="Formel" r:id="rId10" imgW="2019300" imgH="571500" progId="Equation.3">
-                  <p:embed/>
-                  <p:pic>
-                    <p:nvPicPr>
-                      <p:cNvPr id="0" name=""/>
-                      <p:cNvPicPr/>
-                      <p:nvPr/>
-                    </p:nvPicPr>
-                    <p:blipFill>
-                      <a:blip r:embed="rId11"/>
-                      <a:stretch>
-                        <a:fillRect/>
-                      </a:stretch>
-                    </p:blipFill>
-                    <p:spPr>
-                      <a:xfrm>
-                        <a:off x="5764212" y="5103812"/>
-                        <a:ext cx="3093337" cy="877887"/>
-                      </a:xfrm>
-                      <a:prstGeom prst="rect">
-                        <a:avLst/>
-                      </a:prstGeom>
-                    </p:spPr>
-                  </p:pic>
-                </p:oleObj>
-              </mc:Fallback>
-            </mc:AlternateContent>
+            <p:oleObj spid="_x0000_s2072" name="Formel" r:id="rId7" imgW="2011320" imgH="557640" progId="Equation.3">
+              <p:embed/>
+            </p:oleObj>
           </a:graphicData>
         </a:graphic>
       </p:graphicFrame>
     </p:spTree>
     <p:extLst>
       <p:ext uri="{BB962C8B-B14F-4D97-AF65-F5344CB8AC3E}">
-        <p14:creationId xmlns:p14="http://schemas.microsoft.com/office/powerpoint/2010/main" val="1409542441"/>
+        <p14:creationId xmlns:p14="http://schemas.microsoft.com/office/powerpoint/2010/main" xmlns="" val="1409542441"/>
       </p:ext>
     </p:extLst>
   </p:cSld>
   <p:clrMapOvr>
     <a:masterClrMapping/>
   </p:clrMapOvr>
-  <mc:AlternateContent xmlns:mc="http://schemas.openxmlformats.org/markup-compatibility/2006" xmlns:p14="http://schemas.microsoft.com/office/powerpoint/2010/main">
-    <mc:Choice Requires="p14">
+  <mc:AlternateContent xmlns:mc="http://schemas.openxmlformats.org/markup-compatibility/2006">
+    <mc:Choice xmlns:p14="http://schemas.microsoft.com/office/powerpoint/2010/main" xmlns="" Requires="p14">
       <p:transition p14:dur="0"/>
     </mc:Choice>
-    <mc:Fallback xmlns="">
+    <mc:Fallback>
       <p:transition/>
     </mc:Fallback>
   </mc:AlternateContent>
+  <p:timing>
+    <p:tnLst>
+      <p:par>
+        <p:cTn id="1" dur="indefinite" restart="never" nodeType="tmRoot"/>
+      </p:par>
+    </p:tnLst>
+  </p:timing>
 </p:sld>
 </file>
 
@@ -3604,10 +3489,10 @@
           </p:nvPr>
         </p:nvPicPr>
         <p:blipFill rotWithShape="1">
-          <a:blip r:embed="rId2">
+          <a:blip r:embed="rId2" cstate="print">
             <a:extLst>
               <a:ext uri="{28A0092B-C50C-407E-A947-70E740481C1C}">
-                <a14:useLocalDpi xmlns:a14="http://schemas.microsoft.com/office/drawing/2010/main" val="0"/>
+                <a14:useLocalDpi xmlns:a14="http://schemas.microsoft.com/office/drawing/2010/main" xmlns="" val="0"/>
               </a:ext>
             </a:extLst>
           </a:blip>
@@ -3624,21 +3509,28 @@
     </p:spTree>
     <p:extLst>
       <p:ext uri="{BB962C8B-B14F-4D97-AF65-F5344CB8AC3E}">
-        <p14:creationId xmlns:p14="http://schemas.microsoft.com/office/powerpoint/2010/main" val="1897204175"/>
+        <p14:creationId xmlns:p14="http://schemas.microsoft.com/office/powerpoint/2010/main" xmlns="" val="1897204175"/>
       </p:ext>
     </p:extLst>
   </p:cSld>
   <p:clrMapOvr>
     <a:masterClrMapping/>
   </p:clrMapOvr>
-  <mc:AlternateContent xmlns:mc="http://schemas.openxmlformats.org/markup-compatibility/2006" xmlns:p14="http://schemas.microsoft.com/office/powerpoint/2010/main">
-    <mc:Choice Requires="p14">
+  <mc:AlternateContent xmlns:mc="http://schemas.openxmlformats.org/markup-compatibility/2006">
+    <mc:Choice xmlns:p14="http://schemas.microsoft.com/office/powerpoint/2010/main" xmlns="" Requires="p14">
       <p:transition p14:dur="0"/>
     </mc:Choice>
-    <mc:Fallback xmlns="">
+    <mc:Fallback>
       <p:transition/>
     </mc:Fallback>
   </mc:AlternateContent>
+  <p:timing>
+    <p:tnLst>
+      <p:par>
+        <p:cTn id="1" dur="indefinite" restart="never" nodeType="tmRoot"/>
+      </p:par>
+    </p:tnLst>
+  </p:timing>
 </p:sld>
 </file>
 
@@ -3722,50 +3614,178 @@
           <a:lstStyle/>
           <a:p>
             <a:r>
-              <a:rPr lang="de-DE" dirty="0" err="1" smtClean="0"/>
-              <a:t>Trajectory-Controlers</a:t>
-            </a:r>
-            <a:endParaRPr lang="de-DE" dirty="0"/>
-          </a:p>
-        </p:txBody>
-      </p:sp>
-      <p:sp>
-        <p:nvSpPr>
-          <p:cNvPr id="5" name="Inhaltsplatzhalter 4"/>
-          <p:cNvSpPr>
-            <a:spLocks noGrp="1"/>
-          </p:cNvSpPr>
-          <p:nvPr>
-            <p:ph sz="quarter" idx="13"/>
-          </p:nvPr>
-        </p:nvSpPr>
-        <p:spPr/>
-        <p:txBody>
-          <a:bodyPr/>
+              <a:rPr lang="en-US" dirty="0" smtClean="0"/>
+              <a:t>Trajectory-Controllers</a:t>
+            </a:r>
+            <a:endParaRPr lang="en-US" dirty="0"/>
+          </a:p>
+        </p:txBody>
+      </p:sp>
+      <p:pic>
+        <p:nvPicPr>
+          <p:cNvPr id="11" name="Picture 6" descr="C:\Users\Matthias\GITHUB\skye_model\Model_freeze\5_trajectories\presentation\Sim_106_on_2012_06_08_07_24\figure_3D_agile_SplineDegree3_purePursuit_Disturbance_0.png"/>
+          <p:cNvPicPr>
+            <a:picLocks noChangeAspect="1" noChangeArrowheads="1"/>
+          </p:cNvPicPr>
+          <p:nvPr/>
+        </p:nvPicPr>
+        <p:blipFill>
+          <a:blip r:embed="rId2" cstate="print"/>
+          <a:srcRect t="16387"/>
+          <a:stretch>
+            <a:fillRect/>
+          </a:stretch>
+        </p:blipFill>
+        <p:spPr bwMode="auto">
+          <a:xfrm>
+            <a:off x="283708" y="1277257"/>
+            <a:ext cx="4878876" cy="4418405"/>
+          </a:xfrm>
+          <a:prstGeom prst="rect">
+            <a:avLst/>
+          </a:prstGeom>
+          <a:noFill/>
+        </p:spPr>
+      </p:pic>
+      <p:sp>
+        <p:nvSpPr>
+          <p:cNvPr id="12" name="Textfeld 11"/>
+          <p:cNvSpPr txBox="1"/>
+          <p:nvPr/>
+        </p:nvSpPr>
+        <p:spPr>
+          <a:xfrm>
+            <a:off x="5765996" y="3283963"/>
+            <a:ext cx="2507147" cy="400110"/>
+          </a:xfrm>
+          <a:prstGeom prst="rect">
+            <a:avLst/>
+          </a:prstGeom>
+          <a:noFill/>
+        </p:spPr>
+        <p:txBody>
+          <a:bodyPr wrap="square" rtlCol="0">
+            <a:spAutoFit/>
+          </a:bodyPr>
           <a:lstStyle/>
           <a:p>
-            <a:endParaRPr lang="de-DE" dirty="0"/>
+            <a:r>
+              <a:rPr lang="de-DE" sz="2000" dirty="0" err="1" smtClean="0">
+                <a:solidFill>
+                  <a:srgbClr val="008000"/>
+                </a:solidFill>
+                <a:latin typeface="ETH Light" pitchFamily="2" charset="0"/>
+                <a:cs typeface="Adobe Arabic" pitchFamily="18" charset="-78"/>
+              </a:rPr>
+              <a:t>Trace</a:t>
+            </a:r>
+            <a:r>
+              <a:rPr lang="de-DE" sz="2000" dirty="0" smtClean="0">
+                <a:solidFill>
+                  <a:srgbClr val="008000"/>
+                </a:solidFill>
+                <a:latin typeface="ETH Light" pitchFamily="2" charset="0"/>
+                <a:cs typeface="Adobe Arabic" pitchFamily="18" charset="-78"/>
+              </a:rPr>
+              <a:t> </a:t>
+            </a:r>
+            <a:r>
+              <a:rPr lang="de-DE" sz="2000" dirty="0" err="1" smtClean="0">
+                <a:solidFill>
+                  <a:srgbClr val="008000"/>
+                </a:solidFill>
+                <a:latin typeface="ETH Light" pitchFamily="2" charset="0"/>
+                <a:cs typeface="Adobe Arabic" pitchFamily="18" charset="-78"/>
+              </a:rPr>
+              <a:t>of</a:t>
+            </a:r>
+            <a:r>
+              <a:rPr lang="de-DE" sz="2000" dirty="0" smtClean="0">
+                <a:solidFill>
+                  <a:srgbClr val="008000"/>
+                </a:solidFill>
+                <a:latin typeface="ETH Light" pitchFamily="2" charset="0"/>
+                <a:cs typeface="Adobe Arabic" pitchFamily="18" charset="-78"/>
+              </a:rPr>
+              <a:t> Simulation</a:t>
+            </a:r>
+            <a:endParaRPr lang="de-DE" sz="2000" dirty="0">
+              <a:solidFill>
+                <a:srgbClr val="008000"/>
+              </a:solidFill>
+              <a:latin typeface="ETH Light" pitchFamily="2" charset="0"/>
+              <a:cs typeface="Adobe Arabic" pitchFamily="18" charset="-78"/>
+            </a:endParaRPr>
+          </a:p>
+        </p:txBody>
+      </p:sp>
+      <p:sp>
+        <p:nvSpPr>
+          <p:cNvPr id="13" name="Textfeld 12"/>
+          <p:cNvSpPr txBox="1"/>
+          <p:nvPr/>
+        </p:nvSpPr>
+        <p:spPr>
+          <a:xfrm>
+            <a:off x="5737746" y="2322302"/>
+            <a:ext cx="1861782" cy="400110"/>
+          </a:xfrm>
+          <a:prstGeom prst="rect">
+            <a:avLst/>
+          </a:prstGeom>
+          <a:noFill/>
+        </p:spPr>
+        <p:txBody>
+          <a:bodyPr wrap="square" rtlCol="0">
+            <a:spAutoFit/>
+          </a:bodyPr>
+          <a:lstStyle/>
+          <a:p>
+            <a:r>
+              <a:rPr lang="de-DE" sz="2000" dirty="0" err="1" smtClean="0">
+                <a:solidFill>
+                  <a:srgbClr val="0000FF"/>
+                </a:solidFill>
+                <a:latin typeface="ETH Light" pitchFamily="2" charset="0"/>
+                <a:cs typeface="Adobe Arabic" pitchFamily="18" charset="-78"/>
+              </a:rPr>
+              <a:t>Trajectory</a:t>
+            </a:r>
+            <a:endParaRPr lang="de-DE" sz="2000" dirty="0" smtClean="0">
+              <a:solidFill>
+                <a:srgbClr val="0000FF"/>
+              </a:solidFill>
+              <a:latin typeface="ETH Light" pitchFamily="2" charset="0"/>
+              <a:cs typeface="Adobe Arabic" pitchFamily="18" charset="-78"/>
+            </a:endParaRPr>
           </a:p>
         </p:txBody>
       </p:sp>
     </p:spTree>
     <p:extLst>
       <p:ext uri="{BB962C8B-B14F-4D97-AF65-F5344CB8AC3E}">
-        <p14:creationId xmlns:p14="http://schemas.microsoft.com/office/powerpoint/2010/main" val="1749412363"/>
+        <p14:creationId xmlns:p14="http://schemas.microsoft.com/office/powerpoint/2010/main" xmlns="" val="1749412363"/>
       </p:ext>
     </p:extLst>
   </p:cSld>
   <p:clrMapOvr>
     <a:masterClrMapping/>
   </p:clrMapOvr>
-  <mc:AlternateContent xmlns:mc="http://schemas.openxmlformats.org/markup-compatibility/2006" xmlns:p14="http://schemas.microsoft.com/office/powerpoint/2010/main">
-    <mc:Choice Requires="p14">
+  <mc:AlternateContent xmlns:mc="http://schemas.openxmlformats.org/markup-compatibility/2006">
+    <mc:Choice xmlns:p14="http://schemas.microsoft.com/office/powerpoint/2010/main" xmlns="" Requires="p14">
       <p:transition p14:dur="0"/>
     </mc:Choice>
-    <mc:Fallback xmlns="">
+    <mc:Fallback>
       <p:transition/>
     </mc:Fallback>
   </mc:AlternateContent>
+  <p:timing>
+    <p:tnLst>
+      <p:par>
+        <p:cTn id="1" dur="indefinite" restart="never" nodeType="tmRoot"/>
+      </p:par>
+    </p:tnLst>
+  </p:timing>
 </p:sld>
 </file>
 
@@ -3849,50 +3869,420 @@
           <a:lstStyle/>
           <a:p>
             <a:r>
-              <a:rPr lang="de-DE" dirty="0" smtClean="0"/>
-              <a:t>Evaluation</a:t>
-            </a:r>
-            <a:endParaRPr lang="de-DE" dirty="0"/>
-          </a:p>
-        </p:txBody>
-      </p:sp>
-      <p:sp>
-        <p:nvSpPr>
-          <p:cNvPr id="5" name="Inhaltsplatzhalter 4"/>
-          <p:cNvSpPr>
-            <a:spLocks noGrp="1"/>
-          </p:cNvSpPr>
-          <p:nvPr>
-            <p:ph sz="quarter" idx="13"/>
-          </p:nvPr>
-        </p:nvSpPr>
-        <p:spPr/>
-        <p:txBody>
-          <a:bodyPr/>
+              <a:rPr lang="en-US" dirty="0" smtClean="0"/>
+              <a:t>Trajectory-Controllers</a:t>
+            </a:r>
+            <a:endParaRPr lang="en-US" dirty="0"/>
+          </a:p>
+        </p:txBody>
+      </p:sp>
+      <p:graphicFrame>
+        <p:nvGraphicFramePr>
+          <p:cNvPr id="17411" name="Object 3"/>
+          <p:cNvGraphicFramePr>
+            <a:graphicFrameLocks noChangeAspect="1"/>
+          </p:cNvGraphicFramePr>
+          <p:nvPr/>
+        </p:nvGraphicFramePr>
+        <p:xfrm>
+          <a:off x="4503738" y="2105025"/>
+          <a:ext cx="2641600" cy="484188"/>
+        </p:xfrm>
+        <a:graphic>
+          <a:graphicData uri="http://schemas.openxmlformats.org/presentationml/2006/ole">
+            <p:oleObj spid="_x0000_s18434" name="Equation" r:id="rId3" imgW="1523880" imgH="279360" progId="Equation.3">
+              <p:embed/>
+            </p:oleObj>
+          </a:graphicData>
+        </a:graphic>
+      </p:graphicFrame>
+      <p:sp>
+        <p:nvSpPr>
+          <p:cNvPr id="8" name="Textfeld 7"/>
+          <p:cNvSpPr txBox="1"/>
+          <p:nvPr/>
+        </p:nvSpPr>
+        <p:spPr>
+          <a:xfrm>
+            <a:off x="4441372" y="1600200"/>
+            <a:ext cx="3797300" cy="379848"/>
+          </a:xfrm>
+          <a:prstGeom prst="rect">
+            <a:avLst/>
+          </a:prstGeom>
+          <a:noFill/>
+        </p:spPr>
+        <p:txBody>
+          <a:bodyPr wrap="square" rtlCol="0">
+            <a:spAutoFit/>
+          </a:bodyPr>
           <a:lstStyle/>
           <a:p>
-            <a:endParaRPr lang="de-DE" dirty="0"/>
+            <a:r>
+              <a:rPr lang="de-DE" dirty="0" err="1" smtClean="0">
+                <a:latin typeface="ETH Light" pitchFamily="2" charset="0"/>
+              </a:rPr>
+              <a:t>Precise</a:t>
+            </a:r>
+            <a:r>
+              <a:rPr lang="de-DE" dirty="0" smtClean="0">
+                <a:latin typeface="ETH Light" pitchFamily="2" charset="0"/>
+              </a:rPr>
+              <a:t> </a:t>
+            </a:r>
+            <a:r>
+              <a:rPr lang="de-DE" dirty="0" err="1" smtClean="0">
+                <a:latin typeface="ETH Light" pitchFamily="2" charset="0"/>
+              </a:rPr>
+              <a:t>path</a:t>
+            </a:r>
+            <a:r>
+              <a:rPr lang="de-DE" dirty="0" smtClean="0">
+                <a:latin typeface="ETH Light" pitchFamily="2" charset="0"/>
+              </a:rPr>
+              <a:t> </a:t>
+            </a:r>
+            <a:r>
+              <a:rPr lang="de-DE" dirty="0" err="1" smtClean="0">
+                <a:latin typeface="ETH Light" pitchFamily="2" charset="0"/>
+              </a:rPr>
+              <a:t>tracking</a:t>
+            </a:r>
+            <a:endParaRPr lang="de-DE" dirty="0">
+              <a:latin typeface="ETH Light" pitchFamily="2" charset="0"/>
+            </a:endParaRPr>
+          </a:p>
+        </p:txBody>
+      </p:sp>
+      <p:graphicFrame>
+        <p:nvGraphicFramePr>
+          <p:cNvPr id="17412" name="Object 4"/>
+          <p:cNvGraphicFramePr>
+            <a:graphicFrameLocks noChangeAspect="1"/>
+          </p:cNvGraphicFramePr>
+          <p:nvPr/>
+        </p:nvGraphicFramePr>
+        <p:xfrm>
+          <a:off x="4531633" y="5448983"/>
+          <a:ext cx="2092325" cy="615950"/>
+        </p:xfrm>
+        <a:graphic>
+          <a:graphicData uri="http://schemas.openxmlformats.org/presentationml/2006/ole">
+            <p:oleObj spid="_x0000_s18435" name="Equation" r:id="rId4" imgW="1206360" imgH="355320" progId="Equation.3">
+              <p:embed/>
+            </p:oleObj>
+          </a:graphicData>
+        </a:graphic>
+      </p:graphicFrame>
+      <p:sp>
+        <p:nvSpPr>
+          <p:cNvPr id="10" name="Textfeld 9"/>
+          <p:cNvSpPr txBox="1"/>
+          <p:nvPr/>
+        </p:nvSpPr>
+        <p:spPr>
+          <a:xfrm>
+            <a:off x="4488543" y="4408715"/>
+            <a:ext cx="4118428" cy="379848"/>
+          </a:xfrm>
+          <a:prstGeom prst="rect">
+            <a:avLst/>
+          </a:prstGeom>
+          <a:noFill/>
+        </p:spPr>
+        <p:txBody>
+          <a:bodyPr wrap="square" rtlCol="0">
+            <a:spAutoFit/>
+          </a:bodyPr>
+          <a:lstStyle/>
+          <a:p>
+            <a:r>
+              <a:rPr lang="de-DE" dirty="0" smtClean="0">
+                <a:latin typeface="ETH Light" pitchFamily="2" charset="0"/>
+              </a:rPr>
+              <a:t>Time </a:t>
+            </a:r>
+            <a:r>
+              <a:rPr lang="de-DE" dirty="0" err="1" smtClean="0">
+                <a:latin typeface="ETH Light" pitchFamily="2" charset="0"/>
+              </a:rPr>
+              <a:t>equivalence</a:t>
+            </a:r>
+            <a:r>
+              <a:rPr lang="de-DE" dirty="0" smtClean="0">
+                <a:latin typeface="ETH Light" pitchFamily="2" charset="0"/>
+              </a:rPr>
+              <a:t> (</a:t>
+            </a:r>
+            <a:r>
+              <a:rPr lang="de-DE" dirty="0" err="1" smtClean="0">
+                <a:latin typeface="ETH Light" pitchFamily="2" charset="0"/>
+              </a:rPr>
+              <a:t>trajectory</a:t>
+            </a:r>
+            <a:r>
+              <a:rPr lang="de-DE" dirty="0" smtClean="0">
+                <a:latin typeface="ETH Light" pitchFamily="2" charset="0"/>
+              </a:rPr>
+              <a:t> </a:t>
+            </a:r>
+            <a:r>
+              <a:rPr lang="de-DE" dirty="0" err="1" smtClean="0">
+                <a:latin typeface="ETH Light" pitchFamily="2" charset="0"/>
+              </a:rPr>
+              <a:t>tracking</a:t>
+            </a:r>
+            <a:r>
+              <a:rPr lang="de-DE" dirty="0" smtClean="0">
+                <a:latin typeface="ETH Light" pitchFamily="2" charset="0"/>
+              </a:rPr>
+              <a:t>)</a:t>
+            </a:r>
+            <a:endParaRPr lang="de-DE" dirty="0">
+              <a:latin typeface="ETH Light" pitchFamily="2" charset="0"/>
+            </a:endParaRPr>
+          </a:p>
+        </p:txBody>
+      </p:sp>
+      <p:pic>
+        <p:nvPicPr>
+          <p:cNvPr id="18438" name="Picture 6" descr="C:\Users\Matthias\GITHUB\skye_model\Model_freeze\5_trajectories\presentation\Sim_106_on_2012_06_08_07_24\figure_3D_agile_SplineDegree3_purePursuit_Disturbance_0.png"/>
+          <p:cNvPicPr>
+            <a:picLocks noChangeAspect="1" noChangeArrowheads="1"/>
+          </p:cNvPicPr>
+          <p:nvPr/>
+        </p:nvPicPr>
+        <p:blipFill>
+          <a:blip r:embed="rId5" cstate="print"/>
+          <a:srcRect t="16387"/>
+          <a:stretch>
+            <a:fillRect/>
+          </a:stretch>
+        </p:blipFill>
+        <p:spPr bwMode="auto">
+          <a:xfrm>
+            <a:off x="864280" y="3744005"/>
+            <a:ext cx="3100640" cy="2808000"/>
+          </a:xfrm>
+          <a:prstGeom prst="rect">
+            <a:avLst/>
+          </a:prstGeom>
+          <a:noFill/>
+        </p:spPr>
+      </p:pic>
+      <p:pic>
+        <p:nvPicPr>
+          <p:cNvPr id="18440" name="Picture 8" descr="C:\Users\Matthias\GITHUB\skye_model\Model_freeze\5_trajectories\presentation\Sim_34_on_2012_06_08_07_16\figure_3D_agile_SplineDegree3_trajectoryFollowing_Disturbance_0.png"/>
+          <p:cNvPicPr>
+            <a:picLocks noChangeAspect="1" noChangeArrowheads="1"/>
+          </p:cNvPicPr>
+          <p:nvPr/>
+        </p:nvPicPr>
+        <p:blipFill>
+          <a:blip r:embed="rId6" cstate="print"/>
+          <a:srcRect t="19193"/>
+          <a:stretch>
+            <a:fillRect/>
+          </a:stretch>
+        </p:blipFill>
+        <p:spPr bwMode="auto">
+          <a:xfrm>
+            <a:off x="931409" y="957943"/>
+            <a:ext cx="3129242" cy="2808000"/>
+          </a:xfrm>
+          <a:prstGeom prst="rect">
+            <a:avLst/>
+          </a:prstGeom>
+          <a:noFill/>
+        </p:spPr>
+      </p:pic>
+      <p:sp>
+        <p:nvSpPr>
+          <p:cNvPr id="14" name="Textfeld 13"/>
+          <p:cNvSpPr txBox="1"/>
+          <p:nvPr/>
+        </p:nvSpPr>
+        <p:spPr>
+          <a:xfrm rot="16200000">
+            <a:off x="7258" y="1762736"/>
+            <a:ext cx="1037772" cy="379848"/>
+          </a:xfrm>
+          <a:prstGeom prst="rect">
+            <a:avLst/>
+          </a:prstGeom>
+          <a:noFill/>
+        </p:spPr>
+        <p:txBody>
+          <a:bodyPr wrap="square" rtlCol="0">
+            <a:spAutoFit/>
+          </a:bodyPr>
+          <a:lstStyle/>
+          <a:p>
+            <a:pPr algn="ctr"/>
+            <a:r>
+              <a:rPr lang="de-DE" dirty="0" smtClean="0">
+                <a:solidFill>
+                  <a:srgbClr val="FF0000"/>
+                </a:solidFill>
+                <a:latin typeface="ETH Light" pitchFamily="2" charset="0"/>
+              </a:rPr>
+              <a:t>GOOD</a:t>
+            </a:r>
+            <a:endParaRPr lang="de-DE" dirty="0">
+              <a:solidFill>
+                <a:srgbClr val="FF0000"/>
+              </a:solidFill>
+              <a:latin typeface="ETH Light" pitchFamily="2" charset="0"/>
+            </a:endParaRPr>
+          </a:p>
+        </p:txBody>
+      </p:sp>
+      <p:sp>
+        <p:nvSpPr>
+          <p:cNvPr id="15" name="Textfeld 14"/>
+          <p:cNvSpPr txBox="1"/>
+          <p:nvPr/>
+        </p:nvSpPr>
+        <p:spPr>
+          <a:xfrm rot="16200000">
+            <a:off x="14518" y="4629254"/>
+            <a:ext cx="1037772" cy="379848"/>
+          </a:xfrm>
+          <a:prstGeom prst="rect">
+            <a:avLst/>
+          </a:prstGeom>
+          <a:noFill/>
+        </p:spPr>
+        <p:txBody>
+          <a:bodyPr wrap="square" rtlCol="0">
+            <a:spAutoFit/>
+          </a:bodyPr>
+          <a:lstStyle/>
+          <a:p>
+            <a:pPr algn="ctr"/>
+            <a:r>
+              <a:rPr lang="de-DE" dirty="0" smtClean="0">
+                <a:solidFill>
+                  <a:srgbClr val="FF0000"/>
+                </a:solidFill>
+                <a:latin typeface="ETH Light" pitchFamily="2" charset="0"/>
+              </a:rPr>
+              <a:t>BAD</a:t>
+            </a:r>
+            <a:endParaRPr lang="de-DE" dirty="0">
+              <a:solidFill>
+                <a:srgbClr val="FF0000"/>
+              </a:solidFill>
+              <a:latin typeface="ETH Light" pitchFamily="2" charset="0"/>
+            </a:endParaRPr>
+          </a:p>
+        </p:txBody>
+      </p:sp>
+      <p:graphicFrame>
+        <p:nvGraphicFramePr>
+          <p:cNvPr id="18443" name="Object 11"/>
+          <p:cNvGraphicFramePr>
+            <a:graphicFrameLocks noChangeAspect="1"/>
+          </p:cNvGraphicFramePr>
+          <p:nvPr/>
+        </p:nvGraphicFramePr>
+        <p:xfrm>
+          <a:off x="4520520" y="3332388"/>
+          <a:ext cx="1936750" cy="727075"/>
+        </p:xfrm>
+        <a:graphic>
+          <a:graphicData uri="http://schemas.openxmlformats.org/presentationml/2006/ole">
+            <p:oleObj spid="_x0000_s18443" name="Equation" r:id="rId7" imgW="1117440" imgH="419040" progId="Equation.3">
+              <p:embed/>
+            </p:oleObj>
+          </a:graphicData>
+        </a:graphic>
+      </p:graphicFrame>
+      <p:graphicFrame>
+        <p:nvGraphicFramePr>
+          <p:cNvPr id="18444" name="Object 12"/>
+          <p:cNvGraphicFramePr>
+            <a:graphicFrameLocks noChangeAspect="1"/>
+          </p:cNvGraphicFramePr>
+          <p:nvPr/>
+        </p:nvGraphicFramePr>
+        <p:xfrm>
+          <a:off x="4523473" y="4919663"/>
+          <a:ext cx="2509838" cy="484187"/>
+        </p:xfrm>
+        <a:graphic>
+          <a:graphicData uri="http://schemas.openxmlformats.org/presentationml/2006/ole">
+            <p:oleObj spid="_x0000_s18444" name="Equation" r:id="rId8" imgW="1447560" imgH="279360" progId="Equation.3">
+              <p:embed/>
+            </p:oleObj>
+          </a:graphicData>
+        </a:graphic>
+      </p:graphicFrame>
+      <p:sp>
+        <p:nvSpPr>
+          <p:cNvPr id="20" name="Textfeld 19"/>
+          <p:cNvSpPr txBox="1"/>
+          <p:nvPr/>
+        </p:nvSpPr>
+        <p:spPr>
+          <a:xfrm>
+            <a:off x="4434118" y="2899206"/>
+            <a:ext cx="3797300" cy="379848"/>
+          </a:xfrm>
+          <a:prstGeom prst="rect">
+            <a:avLst/>
+          </a:prstGeom>
+          <a:noFill/>
+        </p:spPr>
+        <p:txBody>
+          <a:bodyPr wrap="square" rtlCol="0">
+            <a:spAutoFit/>
+          </a:bodyPr>
+          <a:lstStyle/>
+          <a:p>
+            <a:r>
+              <a:rPr lang="de-DE" dirty="0" smtClean="0">
+                <a:latin typeface="ETH Light" pitchFamily="2" charset="0"/>
+              </a:rPr>
+              <a:t>Low power </a:t>
+            </a:r>
+            <a:r>
+              <a:rPr lang="de-DE" dirty="0" err="1" smtClean="0">
+                <a:latin typeface="ETH Light" pitchFamily="2" charset="0"/>
+              </a:rPr>
+              <a:t>consumption</a:t>
+            </a:r>
+            <a:endParaRPr lang="de-DE" dirty="0">
+              <a:latin typeface="ETH Light" pitchFamily="2" charset="0"/>
+            </a:endParaRPr>
           </a:p>
         </p:txBody>
       </p:sp>
     </p:spTree>
     <p:extLst>
       <p:ext uri="{BB962C8B-B14F-4D97-AF65-F5344CB8AC3E}">
-        <p14:creationId xmlns:p14="http://schemas.microsoft.com/office/powerpoint/2010/main" val="533356852"/>
+        <p14:creationId xmlns:p14="http://schemas.microsoft.com/office/powerpoint/2010/main" xmlns="" val="1749412363"/>
       </p:ext>
     </p:extLst>
   </p:cSld>
   <p:clrMapOvr>
     <a:masterClrMapping/>
   </p:clrMapOvr>
-  <mc:AlternateContent xmlns:mc="http://schemas.openxmlformats.org/markup-compatibility/2006" xmlns:p14="http://schemas.microsoft.com/office/powerpoint/2010/main">
-    <mc:Choice Requires="p14">
+  <mc:AlternateContent xmlns:mc="http://schemas.openxmlformats.org/markup-compatibility/2006">
+    <mc:Choice xmlns:p14="http://schemas.microsoft.com/office/powerpoint/2010/main" xmlns="" Requires="p14">
       <p:transition p14:dur="0"/>
     </mc:Choice>
-    <mc:Fallback xmlns="">
+    <mc:Fallback>
       <p:transition/>
     </mc:Fallback>
   </mc:AlternateContent>
+  <p:timing>
+    <p:tnLst>
+      <p:par>
+        <p:cTn id="1" dur="indefinite" restart="never" nodeType="tmRoot"/>
+      </p:par>
+    </p:tnLst>
+  </p:timing>
 </p:sld>
 </file>
 
@@ -3915,12 +4305,12 @@
       </p:grpSpPr>
       <p:sp>
         <p:nvSpPr>
-          <p:cNvPr id="2" name="Titel 1"/>
+          <p:cNvPr id="2" name="Foliennummernplatzhalter 1"/>
           <p:cNvSpPr>
             <a:spLocks noGrp="1"/>
           </p:cNvSpPr>
           <p:nvPr>
-            <p:ph type="ctrTitle"/>
+            <p:ph type="sldNum" sz="quarter" idx="11"/>
           </p:nvPr>
         </p:nvSpPr>
         <p:spPr/>
@@ -3928,23 +4318,12 @@
           <a:bodyPr/>
           <a:lstStyle/>
           <a:p>
-            <a:r>
-              <a:rPr lang="de-CH" dirty="0">
-                <a:solidFill>
-                  <a:srgbClr val="00B0F0"/>
-                </a:solidFill>
-              </a:rPr>
-              <a:t>&gt;&gt;</a:t>
-            </a:r>
-            <a:r>
-              <a:rPr lang="de-CH" dirty="0"/>
-              <a:t> </a:t>
-            </a:r>
-            <a:r>
-              <a:rPr lang="de-CH" dirty="0" smtClean="0"/>
-              <a:t>Backup</a:t>
-            </a:r>
-            <a:endParaRPr lang="de-DE" dirty="0"/>
+            <a:fld id="{B69F85DD-1765-4155-BE31-DCDCF098BCB6}" type="slidenum">
+              <a:rPr lang="de-DE" smtClean="0"/>
+              <a:pPr/>
+              <a:t>14</a:t>
+            </a:fld>
+            <a:endParaRPr lang="de-DE"/>
           </a:p>
         </p:txBody>
       </p:sp>
@@ -3955,7 +4334,7 @@
             <a:spLocks noGrp="1"/>
           </p:cNvSpPr>
           <p:nvPr>
-            <p:ph type="subTitle" idx="1"/>
+            <p:ph type="subTitle" idx="12"/>
           </p:nvPr>
         </p:nvSpPr>
         <p:spPr/>
@@ -3964,35 +4343,782 @@
           <a:lstStyle/>
           <a:p>
             <a:r>
-              <a:rPr lang="de-CH" dirty="0" smtClean="0"/>
+              <a:rPr lang="de-DE" dirty="0" err="1" smtClean="0"/>
+              <a:t>Trajectories</a:t>
+            </a:r>
+            <a:endParaRPr lang="de-DE" dirty="0"/>
+          </a:p>
+        </p:txBody>
+      </p:sp>
+      <p:sp>
+        <p:nvSpPr>
+          <p:cNvPr id="4" name="Titel 3"/>
+          <p:cNvSpPr>
+            <a:spLocks noGrp="1"/>
+          </p:cNvSpPr>
+          <p:nvPr>
+            <p:ph type="title"/>
+          </p:nvPr>
+        </p:nvSpPr>
+        <p:spPr/>
+        <p:txBody>
+          <a:bodyPr/>
+          <a:lstStyle/>
+          <a:p>
+            <a:r>
+              <a:rPr lang="en-US" dirty="0" smtClean="0"/>
+              <a:t>Trajectory-Controllers</a:t>
+            </a:r>
+            <a:endParaRPr lang="en-US" dirty="0"/>
+          </a:p>
+        </p:txBody>
+      </p:sp>
+      <p:sp>
+        <p:nvSpPr>
+          <p:cNvPr id="8" name="Textfeld 7"/>
+          <p:cNvSpPr txBox="1"/>
+          <p:nvPr/>
+        </p:nvSpPr>
+        <p:spPr>
+          <a:xfrm>
+            <a:off x="493487" y="1135745"/>
+            <a:ext cx="3797300" cy="3862596"/>
+          </a:xfrm>
+          <a:prstGeom prst="rect">
+            <a:avLst/>
+          </a:prstGeom>
+          <a:noFill/>
+        </p:spPr>
+        <p:txBody>
+          <a:bodyPr wrap="square" rtlCol="0">
+            <a:spAutoFit/>
+          </a:bodyPr>
+          <a:lstStyle/>
+          <a:p>
+            <a:r>
+              <a:rPr lang="de-DE" dirty="0" smtClean="0">
+                <a:latin typeface="ETH Light" pitchFamily="2" charset="0"/>
+              </a:rPr>
+              <a:t>3 different </a:t>
+            </a:r>
+            <a:r>
+              <a:rPr lang="de-DE" dirty="0" err="1" smtClean="0">
+                <a:latin typeface="ETH Light" pitchFamily="2" charset="0"/>
+              </a:rPr>
+              <a:t>approaches</a:t>
+            </a:r>
+            <a:r>
+              <a:rPr lang="de-DE" dirty="0" smtClean="0">
+                <a:latin typeface="ETH Light" pitchFamily="2" charset="0"/>
+              </a:rPr>
+              <a:t>:</a:t>
+            </a:r>
+          </a:p>
+          <a:p>
+            <a:r>
+              <a:rPr lang="de-DE" dirty="0" err="1" smtClean="0">
+                <a:latin typeface="ETH Light" pitchFamily="2" charset="0"/>
+              </a:rPr>
+              <a:t>Trajectory</a:t>
+            </a:r>
+            <a:r>
+              <a:rPr lang="de-DE" dirty="0" smtClean="0">
+                <a:latin typeface="ETH Light" pitchFamily="2" charset="0"/>
+              </a:rPr>
               <a:t> </a:t>
             </a:r>
-            <a:endParaRPr lang="de-DE" dirty="0"/>
+            <a:r>
+              <a:rPr lang="de-DE" dirty="0" err="1" smtClean="0">
+                <a:latin typeface="ETH Light" pitchFamily="2" charset="0"/>
+              </a:rPr>
+              <a:t>Following</a:t>
+            </a:r>
+            <a:endParaRPr lang="de-DE" dirty="0" smtClean="0">
+              <a:latin typeface="ETH Light" pitchFamily="2" charset="0"/>
+            </a:endParaRPr>
+          </a:p>
+          <a:p>
+            <a:endParaRPr lang="de-DE" dirty="0" smtClean="0">
+              <a:latin typeface="ETH Light" pitchFamily="2" charset="0"/>
+            </a:endParaRPr>
+          </a:p>
+          <a:p>
+            <a:endParaRPr lang="de-DE" dirty="0" smtClean="0">
+              <a:latin typeface="ETH Light" pitchFamily="2" charset="0"/>
+            </a:endParaRPr>
+          </a:p>
+          <a:p>
+            <a:endParaRPr lang="de-DE" dirty="0" smtClean="0">
+              <a:latin typeface="ETH Light" pitchFamily="2" charset="0"/>
+            </a:endParaRPr>
+          </a:p>
+          <a:p>
+            <a:r>
+              <a:rPr lang="de-DE" dirty="0" smtClean="0">
+                <a:latin typeface="ETH Light" pitchFamily="2" charset="0"/>
+              </a:rPr>
+              <a:t>Pure </a:t>
+            </a:r>
+            <a:r>
+              <a:rPr lang="de-DE" dirty="0" err="1" smtClean="0">
+                <a:latin typeface="ETH Light" pitchFamily="2" charset="0"/>
+              </a:rPr>
+              <a:t>Pursuit</a:t>
+            </a:r>
+            <a:r>
+              <a:rPr lang="de-DE" dirty="0" smtClean="0">
+                <a:latin typeface="ETH Light" pitchFamily="2" charset="0"/>
+              </a:rPr>
+              <a:t> (</a:t>
+            </a:r>
+            <a:r>
+              <a:rPr lang="de-DE" dirty="0" err="1" smtClean="0">
+                <a:latin typeface="ETH Light" pitchFamily="2" charset="0"/>
+              </a:rPr>
+              <a:t>Lookahead</a:t>
+            </a:r>
+            <a:r>
+              <a:rPr lang="de-DE" dirty="0" smtClean="0">
+                <a:latin typeface="ETH Light" pitchFamily="2" charset="0"/>
+              </a:rPr>
+              <a:t>)</a:t>
+            </a:r>
+          </a:p>
+          <a:p>
+            <a:endParaRPr lang="de-DE" dirty="0" smtClean="0">
+              <a:latin typeface="ETH Light" pitchFamily="2" charset="0"/>
+            </a:endParaRPr>
+          </a:p>
+          <a:p>
+            <a:endParaRPr lang="de-DE" dirty="0" smtClean="0">
+              <a:latin typeface="ETH Light" pitchFamily="2" charset="0"/>
+            </a:endParaRPr>
+          </a:p>
+          <a:p>
+            <a:endParaRPr lang="de-DE" dirty="0" smtClean="0">
+              <a:latin typeface="ETH Light" pitchFamily="2" charset="0"/>
+            </a:endParaRPr>
+          </a:p>
+          <a:p>
+            <a:r>
+              <a:rPr lang="de-DE" dirty="0" smtClean="0">
+                <a:latin typeface="ETH Light" pitchFamily="2" charset="0"/>
+              </a:rPr>
+              <a:t>Cross Track</a:t>
+            </a:r>
+            <a:endParaRPr lang="de-DE" dirty="0">
+              <a:latin typeface="ETH Light" pitchFamily="2" charset="0"/>
+            </a:endParaRPr>
+          </a:p>
+        </p:txBody>
+      </p:sp>
+      <p:sp>
+        <p:nvSpPr>
+          <p:cNvPr id="9" name="Rechteck 8"/>
+          <p:cNvSpPr/>
+          <p:nvPr/>
+        </p:nvSpPr>
+        <p:spPr bwMode="auto">
+          <a:xfrm>
+            <a:off x="522512" y="1567543"/>
+            <a:ext cx="2728686" cy="1262743"/>
+          </a:xfrm>
+          <a:prstGeom prst="rect">
+            <a:avLst/>
+          </a:prstGeom>
+          <a:noFill/>
+          <a:ln>
+            <a:solidFill>
+              <a:srgbClr val="00B050"/>
+            </a:solidFill>
+            <a:headEnd type="none" w="med" len="med"/>
+            <a:tailEnd type="none" w="med" len="med"/>
+          </a:ln>
+        </p:spPr>
+        <p:style>
+          <a:lnRef idx="2">
+            <a:schemeClr val="accent2"/>
+          </a:lnRef>
+          <a:fillRef idx="1">
+            <a:schemeClr val="lt1"/>
+          </a:fillRef>
+          <a:effectRef idx="0">
+            <a:schemeClr val="accent2"/>
+          </a:effectRef>
+          <a:fontRef idx="minor">
+            <a:schemeClr val="dk1"/>
+          </a:fontRef>
+        </p:style>
+        <p:txBody>
+          <a:bodyPr vert="horz" wrap="square" lIns="0" tIns="36000" rIns="0" bIns="36000" numCol="1" rtlCol="0" anchor="t" anchorCtr="0" compatLnSpc="1">
+            <a:prstTxWarp prst="textNoShape">
+              <a:avLst/>
+            </a:prstTxWarp>
+          </a:bodyPr>
+          <a:lstStyle/>
+          <a:p>
+            <a:pPr marL="0" marR="0" indent="0" algn="l" defTabSz="457200" rtl="0" eaLnBrk="1" fontAlgn="base" latinLnBrk="0" hangingPunct="1">
+              <a:lnSpc>
+                <a:spcPts val="2400"/>
+              </a:lnSpc>
+              <a:spcBef>
+                <a:spcPts val="600"/>
+              </a:spcBef>
+              <a:spcAft>
+                <a:spcPct val="0"/>
+              </a:spcAft>
+              <a:buClr>
+                <a:srgbClr val="2A6AB3"/>
+              </a:buClr>
+              <a:buSzPct val="110000"/>
+              <a:buFont typeface="Wingdings" pitchFamily="16" charset="2"/>
+              <a:buNone/>
+              <a:tabLst/>
+            </a:pPr>
+            <a:endParaRPr kumimoji="0" lang="de-CH" sz="1600" b="0" i="0" u="none" strike="noStrike" cap="none" normalizeH="0" baseline="0" smtClean="0">
+              <a:ln>
+                <a:noFill/>
+              </a:ln>
+              <a:solidFill>
+                <a:srgbClr val="000000"/>
+              </a:solidFill>
+              <a:effectLst/>
+              <a:latin typeface="Arial" charset="0"/>
+            </a:endParaRPr>
+          </a:p>
+        </p:txBody>
+      </p:sp>
+      <p:sp>
+        <p:nvSpPr>
+          <p:cNvPr id="10" name="Rechteck 9"/>
+          <p:cNvSpPr/>
+          <p:nvPr/>
+        </p:nvSpPr>
+        <p:spPr bwMode="auto">
+          <a:xfrm>
+            <a:off x="529769" y="2953657"/>
+            <a:ext cx="2728686" cy="3287486"/>
+          </a:xfrm>
+          <a:prstGeom prst="rect">
+            <a:avLst/>
+          </a:prstGeom>
+          <a:noFill/>
+          <a:ln>
+            <a:solidFill>
+              <a:srgbClr val="00B050"/>
+            </a:solidFill>
+            <a:headEnd type="none" w="med" len="med"/>
+            <a:tailEnd type="none" w="med" len="med"/>
+          </a:ln>
+        </p:spPr>
+        <p:style>
+          <a:lnRef idx="2">
+            <a:schemeClr val="accent2"/>
+          </a:lnRef>
+          <a:fillRef idx="1">
+            <a:schemeClr val="lt1"/>
+          </a:fillRef>
+          <a:effectRef idx="0">
+            <a:schemeClr val="accent2"/>
+          </a:effectRef>
+          <a:fontRef idx="minor">
+            <a:schemeClr val="dk1"/>
+          </a:fontRef>
+        </p:style>
+        <p:txBody>
+          <a:bodyPr vert="horz" wrap="square" lIns="0" tIns="36000" rIns="0" bIns="36000" numCol="1" rtlCol="0" anchor="t" anchorCtr="0" compatLnSpc="1">
+            <a:prstTxWarp prst="textNoShape">
+              <a:avLst/>
+            </a:prstTxWarp>
+          </a:bodyPr>
+          <a:lstStyle/>
+          <a:p>
+            <a:pPr marL="0" marR="0" indent="0" algn="l" defTabSz="457200" rtl="0" eaLnBrk="1" fontAlgn="base" latinLnBrk="0" hangingPunct="1">
+              <a:lnSpc>
+                <a:spcPts val="2400"/>
+              </a:lnSpc>
+              <a:spcBef>
+                <a:spcPts val="600"/>
+              </a:spcBef>
+              <a:spcAft>
+                <a:spcPct val="0"/>
+              </a:spcAft>
+              <a:buClr>
+                <a:srgbClr val="2A6AB3"/>
+              </a:buClr>
+              <a:buSzPct val="110000"/>
+              <a:buFont typeface="Wingdings" pitchFamily="16" charset="2"/>
+              <a:buNone/>
+              <a:tabLst/>
+            </a:pPr>
+            <a:endParaRPr kumimoji="0" lang="de-CH" sz="1600" b="0" i="0" u="none" strike="noStrike" cap="none" normalizeH="0" baseline="0" smtClean="0">
+              <a:ln>
+                <a:noFill/>
+              </a:ln>
+              <a:solidFill>
+                <a:srgbClr val="000000"/>
+              </a:solidFill>
+              <a:effectLst/>
+              <a:latin typeface="Arial" charset="0"/>
+            </a:endParaRPr>
+          </a:p>
+        </p:txBody>
+      </p:sp>
+      <p:sp>
+        <p:nvSpPr>
+          <p:cNvPr id="14" name="Textfeld 13"/>
+          <p:cNvSpPr txBox="1"/>
+          <p:nvPr/>
+        </p:nvSpPr>
+        <p:spPr>
+          <a:xfrm rot="16200000">
+            <a:off x="-426107" y="1978390"/>
+            <a:ext cx="1381997" cy="379848"/>
+          </a:xfrm>
+          <a:prstGeom prst="rect">
+            <a:avLst/>
+          </a:prstGeom>
+          <a:noFill/>
+        </p:spPr>
+        <p:txBody>
+          <a:bodyPr wrap="square" rtlCol="0">
+            <a:spAutoFit/>
+          </a:bodyPr>
+          <a:lstStyle/>
+          <a:p>
+            <a:pPr algn="ctr"/>
+            <a:r>
+              <a:rPr lang="de-DE" dirty="0" smtClean="0">
+                <a:solidFill>
+                  <a:srgbClr val="FF0000"/>
+                </a:solidFill>
+                <a:latin typeface="ETH Light" pitchFamily="2" charset="0"/>
+              </a:rPr>
+              <a:t>Open Loop</a:t>
+            </a:r>
+            <a:endParaRPr lang="de-DE" dirty="0">
+              <a:solidFill>
+                <a:srgbClr val="FF0000"/>
+              </a:solidFill>
+              <a:latin typeface="ETH Light" pitchFamily="2" charset="0"/>
+            </a:endParaRPr>
+          </a:p>
+        </p:txBody>
+      </p:sp>
+      <p:sp>
+        <p:nvSpPr>
+          <p:cNvPr id="15" name="Textfeld 14"/>
+          <p:cNvSpPr txBox="1"/>
+          <p:nvPr/>
+        </p:nvSpPr>
+        <p:spPr>
+          <a:xfrm rot="16200000">
+            <a:off x="-447875" y="4191778"/>
+            <a:ext cx="1381997" cy="379848"/>
+          </a:xfrm>
+          <a:prstGeom prst="rect">
+            <a:avLst/>
+          </a:prstGeom>
+          <a:noFill/>
+        </p:spPr>
+        <p:txBody>
+          <a:bodyPr wrap="square" rtlCol="0">
+            <a:spAutoFit/>
+          </a:bodyPr>
+          <a:lstStyle/>
+          <a:p>
+            <a:pPr algn="ctr"/>
+            <a:r>
+              <a:rPr lang="de-DE" dirty="0" err="1" smtClean="0">
+                <a:solidFill>
+                  <a:srgbClr val="FF0000"/>
+                </a:solidFill>
+                <a:latin typeface="ETH Light" pitchFamily="2" charset="0"/>
+              </a:rPr>
+              <a:t>Closed</a:t>
+            </a:r>
+            <a:r>
+              <a:rPr lang="de-DE" dirty="0" smtClean="0">
+                <a:solidFill>
+                  <a:srgbClr val="FF0000"/>
+                </a:solidFill>
+                <a:latin typeface="ETH Light" pitchFamily="2" charset="0"/>
+              </a:rPr>
+              <a:t> Loop</a:t>
+            </a:r>
+            <a:endParaRPr lang="de-DE" dirty="0">
+              <a:solidFill>
+                <a:srgbClr val="FF0000"/>
+              </a:solidFill>
+              <a:latin typeface="ETH Light" pitchFamily="2" charset="0"/>
+            </a:endParaRPr>
+          </a:p>
+        </p:txBody>
+      </p:sp>
+      <p:sp>
+        <p:nvSpPr>
+          <p:cNvPr id="16" name="Freihandform 15"/>
+          <p:cNvSpPr/>
+          <p:nvPr/>
+        </p:nvSpPr>
+        <p:spPr bwMode="auto">
+          <a:xfrm>
+            <a:off x="4049485" y="1804611"/>
+            <a:ext cx="2728686" cy="880533"/>
+          </a:xfrm>
+          <a:custGeom>
+            <a:avLst/>
+            <a:gdLst>
+              <a:gd name="connsiteX0" fmla="*/ 0 w 2336800"/>
+              <a:gd name="connsiteY0" fmla="*/ 619276 h 677333"/>
+              <a:gd name="connsiteX1" fmla="*/ 914400 w 2336800"/>
+              <a:gd name="connsiteY1" fmla="*/ 9676 h 677333"/>
+              <a:gd name="connsiteX2" fmla="*/ 2336800 w 2336800"/>
+              <a:gd name="connsiteY2" fmla="*/ 677333 h 677333"/>
+              <a:gd name="connsiteX3" fmla="*/ 2336800 w 2336800"/>
+              <a:gd name="connsiteY3" fmla="*/ 677333 h 677333"/>
+            </a:gdLst>
+            <a:ahLst/>
+            <a:cxnLst>
+              <a:cxn ang="0">
+                <a:pos x="connsiteX0" y="connsiteY0"/>
+              </a:cxn>
+              <a:cxn ang="0">
+                <a:pos x="connsiteX1" y="connsiteY1"/>
+              </a:cxn>
+              <a:cxn ang="0">
+                <a:pos x="connsiteX2" y="connsiteY2"/>
+              </a:cxn>
+              <a:cxn ang="0">
+                <a:pos x="connsiteX3" y="connsiteY3"/>
+              </a:cxn>
+            </a:cxnLst>
+            <a:rect l="l" t="t" r="r" b="b"/>
+            <a:pathLst>
+              <a:path w="2336800" h="677333">
+                <a:moveTo>
+                  <a:pt x="0" y="619276"/>
+                </a:moveTo>
+                <a:cubicBezTo>
+                  <a:pt x="262466" y="309638"/>
+                  <a:pt x="524933" y="0"/>
+                  <a:pt x="914400" y="9676"/>
+                </a:cubicBezTo>
+                <a:cubicBezTo>
+                  <a:pt x="1303867" y="19352"/>
+                  <a:pt x="2336800" y="677333"/>
+                  <a:pt x="2336800" y="677333"/>
+                </a:cubicBezTo>
+                <a:lnTo>
+                  <a:pt x="2336800" y="677333"/>
+                </a:lnTo>
+              </a:path>
+            </a:pathLst>
+          </a:custGeom>
+          <a:noFill/>
+          <a:ln w="9525" cap="flat" cmpd="sng" algn="ctr">
+            <a:solidFill>
+              <a:schemeClr val="tx1"/>
+            </a:solidFill>
+            <a:prstDash val="solid"/>
+            <a:round/>
+            <a:headEnd type="none" w="med" len="med"/>
+            <a:tailEnd type="none" w="med" len="med"/>
+          </a:ln>
+          <a:effectLst/>
+        </p:spPr>
+        <p:txBody>
+          <a:bodyPr vert="horz" wrap="square" lIns="0" tIns="36000" rIns="0" bIns="36000" numCol="1" rtlCol="0" anchor="t" anchorCtr="0" compatLnSpc="1">
+            <a:prstTxWarp prst="textNoShape">
+              <a:avLst/>
+            </a:prstTxWarp>
+          </a:bodyPr>
+          <a:lstStyle/>
+          <a:p>
+            <a:pPr marL="0" marR="0" indent="0" algn="l" defTabSz="457200" rtl="0" eaLnBrk="1" fontAlgn="base" latinLnBrk="0" hangingPunct="1">
+              <a:lnSpc>
+                <a:spcPts val="2400"/>
+              </a:lnSpc>
+              <a:spcBef>
+                <a:spcPts val="600"/>
+              </a:spcBef>
+              <a:spcAft>
+                <a:spcPct val="0"/>
+              </a:spcAft>
+              <a:buClr>
+                <a:srgbClr val="2A6AB3"/>
+              </a:buClr>
+              <a:buSzPct val="110000"/>
+              <a:buFont typeface="Wingdings" pitchFamily="16" charset="2"/>
+              <a:buNone/>
+              <a:tabLst/>
+            </a:pPr>
+            <a:endParaRPr kumimoji="0" lang="de-CH" sz="1600" b="0" i="0" u="none" strike="noStrike" cap="none" normalizeH="0" baseline="0" smtClean="0">
+              <a:ln>
+                <a:noFill/>
+              </a:ln>
+              <a:solidFill>
+                <a:srgbClr val="000000"/>
+              </a:solidFill>
+              <a:effectLst/>
+              <a:latin typeface="Arial" charset="0"/>
+            </a:endParaRPr>
+          </a:p>
+        </p:txBody>
+      </p:sp>
+      <p:sp>
+        <p:nvSpPr>
+          <p:cNvPr id="17" name="Rechteck 16"/>
+          <p:cNvSpPr/>
+          <p:nvPr/>
+        </p:nvSpPr>
+        <p:spPr bwMode="auto">
+          <a:xfrm>
+            <a:off x="6879771" y="4194629"/>
+            <a:ext cx="1146629" cy="580571"/>
+          </a:xfrm>
+          <a:prstGeom prst="rect">
+            <a:avLst/>
+          </a:prstGeom>
+          <a:solidFill>
+            <a:schemeClr val="bg1"/>
+          </a:solidFill>
+          <a:ln w="9525" cap="flat" cmpd="sng" algn="ctr">
+            <a:solidFill>
+              <a:schemeClr val="tx1"/>
+            </a:solidFill>
+            <a:prstDash val="solid"/>
+            <a:round/>
+            <a:headEnd type="none" w="med" len="med"/>
+            <a:tailEnd type="none" w="med" len="med"/>
+          </a:ln>
+          <a:effectLst/>
+        </p:spPr>
+        <p:txBody>
+          <a:bodyPr vert="horz" wrap="square" lIns="0" tIns="36000" rIns="0" bIns="36000" numCol="1" rtlCol="0" anchor="ctr" anchorCtr="1" compatLnSpc="1">
+            <a:prstTxWarp prst="textNoShape">
+              <a:avLst/>
+            </a:prstTxWarp>
+          </a:bodyPr>
+          <a:lstStyle/>
+          <a:p>
+            <a:pPr marL="0" marR="0" indent="0" algn="l" defTabSz="457200" rtl="0" eaLnBrk="1" fontAlgn="base" latinLnBrk="0" hangingPunct="1">
+              <a:lnSpc>
+                <a:spcPts val="2400"/>
+              </a:lnSpc>
+              <a:spcBef>
+                <a:spcPts val="600"/>
+              </a:spcBef>
+              <a:spcAft>
+                <a:spcPct val="0"/>
+              </a:spcAft>
+              <a:buClr>
+                <a:srgbClr val="2A6AB3"/>
+              </a:buClr>
+              <a:buSzPct val="110000"/>
+              <a:buFont typeface="Wingdings" pitchFamily="16" charset="2"/>
+              <a:buNone/>
+              <a:tabLst/>
+            </a:pPr>
+            <a:r>
+              <a:rPr kumimoji="0" lang="de-CH" sz="2000" b="0" i="0" u="none" strike="noStrike" cap="none" normalizeH="0" baseline="0" dirty="0" smtClean="0">
+                <a:ln>
+                  <a:noFill/>
+                </a:ln>
+                <a:solidFill>
+                  <a:srgbClr val="000000"/>
+                </a:solidFill>
+                <a:effectLst/>
+                <a:latin typeface="Arial" charset="0"/>
+              </a:rPr>
+              <a:t>P</a:t>
+            </a:r>
+            <a:endParaRPr kumimoji="0" lang="de-CH" sz="2000" b="0" i="0" u="none" strike="noStrike" cap="none" normalizeH="0" baseline="0" dirty="0" smtClean="0">
+              <a:ln>
+                <a:noFill/>
+              </a:ln>
+              <a:solidFill>
+                <a:srgbClr val="000000"/>
+              </a:solidFill>
+              <a:effectLst/>
+              <a:latin typeface="Arial" charset="0"/>
+            </a:endParaRPr>
+          </a:p>
+        </p:txBody>
+      </p:sp>
+      <p:sp>
+        <p:nvSpPr>
+          <p:cNvPr id="18" name="Rechteck 17"/>
+          <p:cNvSpPr/>
+          <p:nvPr/>
+        </p:nvSpPr>
+        <p:spPr bwMode="auto">
+          <a:xfrm>
+            <a:off x="5290453" y="4187373"/>
+            <a:ext cx="1146629" cy="580571"/>
+          </a:xfrm>
+          <a:prstGeom prst="rect">
+            <a:avLst/>
+          </a:prstGeom>
+          <a:solidFill>
+            <a:schemeClr val="bg1"/>
+          </a:solidFill>
+          <a:ln w="9525" cap="flat" cmpd="sng" algn="ctr">
+            <a:solidFill>
+              <a:schemeClr val="tx1"/>
+            </a:solidFill>
+            <a:prstDash val="solid"/>
+            <a:round/>
+            <a:headEnd type="none" w="med" len="med"/>
+            <a:tailEnd type="none" w="med" len="med"/>
+          </a:ln>
+          <a:effectLst/>
+        </p:spPr>
+        <p:txBody>
+          <a:bodyPr vert="horz" wrap="square" lIns="0" tIns="36000" rIns="0" bIns="36000" numCol="1" rtlCol="0" anchor="ctr" anchorCtr="1" compatLnSpc="1">
+            <a:prstTxWarp prst="textNoShape">
+              <a:avLst/>
+            </a:prstTxWarp>
+          </a:bodyPr>
+          <a:lstStyle/>
+          <a:p>
+            <a:pPr marL="0" marR="0" indent="0" algn="l" defTabSz="457200" rtl="0" eaLnBrk="1" fontAlgn="base" latinLnBrk="0" hangingPunct="1">
+              <a:lnSpc>
+                <a:spcPts val="2400"/>
+              </a:lnSpc>
+              <a:spcBef>
+                <a:spcPts val="600"/>
+              </a:spcBef>
+              <a:spcAft>
+                <a:spcPct val="0"/>
+              </a:spcAft>
+              <a:buClr>
+                <a:srgbClr val="2A6AB3"/>
+              </a:buClr>
+              <a:buSzPct val="110000"/>
+              <a:buFont typeface="Wingdings" pitchFamily="16" charset="2"/>
+              <a:buNone/>
+              <a:tabLst/>
+            </a:pPr>
+            <a:r>
+              <a:rPr lang="de-CH" sz="2000" dirty="0" smtClean="0"/>
+              <a:t>C</a:t>
+            </a:r>
+            <a:endParaRPr kumimoji="0" lang="de-CH" sz="2000" b="0" i="0" u="none" strike="noStrike" cap="none" normalizeH="0" baseline="0" dirty="0" smtClean="0">
+              <a:ln>
+                <a:noFill/>
+              </a:ln>
+              <a:solidFill>
+                <a:srgbClr val="000000"/>
+              </a:solidFill>
+              <a:effectLst/>
+              <a:latin typeface="Arial" charset="0"/>
+            </a:endParaRPr>
+          </a:p>
+        </p:txBody>
+      </p:sp>
+      <p:sp>
+        <p:nvSpPr>
+          <p:cNvPr id="23" name="Rechteck 22"/>
+          <p:cNvSpPr/>
+          <p:nvPr/>
+        </p:nvSpPr>
+        <p:spPr bwMode="auto">
+          <a:xfrm>
+            <a:off x="3730171" y="4194630"/>
+            <a:ext cx="1146629" cy="580571"/>
+          </a:xfrm>
+          <a:prstGeom prst="rect">
+            <a:avLst/>
+          </a:prstGeom>
+          <a:solidFill>
+            <a:schemeClr val="bg1"/>
+          </a:solidFill>
+          <a:ln w="9525" cap="flat" cmpd="sng" algn="ctr">
+            <a:solidFill>
+              <a:schemeClr val="tx1"/>
+            </a:solidFill>
+            <a:prstDash val="solid"/>
+            <a:round/>
+            <a:headEnd type="none" w="med" len="med"/>
+            <a:tailEnd type="none" w="med" len="med"/>
+          </a:ln>
+          <a:effectLst/>
+        </p:spPr>
+        <p:txBody>
+          <a:bodyPr vert="horz" wrap="square" lIns="0" tIns="36000" rIns="0" bIns="36000" numCol="1" rtlCol="0" anchor="ctr" anchorCtr="1" compatLnSpc="1">
+            <a:prstTxWarp prst="textNoShape">
+              <a:avLst/>
+            </a:prstTxWarp>
+          </a:bodyPr>
+          <a:lstStyle/>
+          <a:p>
+            <a:pPr marL="0" marR="0" indent="0" algn="l" defTabSz="457200" rtl="0" eaLnBrk="1" fontAlgn="base" latinLnBrk="0" hangingPunct="1">
+              <a:lnSpc>
+                <a:spcPts val="2400"/>
+              </a:lnSpc>
+              <a:spcBef>
+                <a:spcPts val="600"/>
+              </a:spcBef>
+              <a:spcAft>
+                <a:spcPct val="0"/>
+              </a:spcAft>
+              <a:buClr>
+                <a:srgbClr val="2A6AB3"/>
+              </a:buClr>
+              <a:buSzPct val="110000"/>
+              <a:buFont typeface="Wingdings" pitchFamily="16" charset="2"/>
+              <a:buNone/>
+              <a:tabLst/>
+            </a:pPr>
+            <a:r>
+              <a:rPr kumimoji="0" lang="de-CH" sz="2000" b="0" i="0" u="none" strike="noStrike" cap="none" normalizeH="0" baseline="0" dirty="0" smtClean="0">
+                <a:ln>
+                  <a:noFill/>
+                </a:ln>
+                <a:solidFill>
+                  <a:srgbClr val="000000"/>
+                </a:solidFill>
+                <a:effectLst/>
+                <a:latin typeface="Arial" charset="0"/>
+              </a:rPr>
+              <a:t>R</a:t>
+            </a:r>
+            <a:endParaRPr kumimoji="0" lang="de-CH" sz="2000" b="0" i="0" u="none" strike="noStrike" cap="none" normalizeH="0" baseline="0" dirty="0" smtClean="0">
+              <a:ln>
+                <a:noFill/>
+              </a:ln>
+              <a:solidFill>
+                <a:srgbClr val="000000"/>
+              </a:solidFill>
+              <a:effectLst/>
+              <a:latin typeface="Arial" charset="0"/>
+            </a:endParaRPr>
           </a:p>
         </p:txBody>
       </p:sp>
     </p:spTree>
     <p:extLst>
       <p:ext uri="{BB962C8B-B14F-4D97-AF65-F5344CB8AC3E}">
-        <p14:creationId xmlns:p14="http://schemas.microsoft.com/office/powerpoint/2010/main" val="289141002"/>
+        <p14:creationId xmlns:p14="http://schemas.microsoft.com/office/powerpoint/2010/main" xmlns="" val="1749412363"/>
       </p:ext>
     </p:extLst>
   </p:cSld>
   <p:clrMapOvr>
     <a:masterClrMapping/>
   </p:clrMapOvr>
-  <mc:AlternateContent xmlns:mc="http://schemas.openxmlformats.org/markup-compatibility/2006" xmlns:p14="http://schemas.microsoft.com/office/powerpoint/2010/main">
-    <mc:Choice Requires="p14">
+  <mc:AlternateContent xmlns:mc="http://schemas.openxmlformats.org/markup-compatibility/2006">
+    <mc:Choice xmlns:p14="http://schemas.microsoft.com/office/powerpoint/2010/main" xmlns="" Requires="p14">
       <p:transition p14:dur="0"/>
     </mc:Choice>
-    <mc:Fallback xmlns="">
+    <mc:Fallback>
       <p:transition/>
     </mc:Fallback>
   </mc:AlternateContent>
   <p:timing>
     <p:tnLst>
       <p:par>
-        <p:cTn xmlns:p14="http://schemas.microsoft.com/office/powerpoint/2010/main" id="1" dur="indefinite" restart="never" nodeType="tmRoot"/>
+        <p:cTn id="1" dur="indefinite" restart="never" nodeType="tmRoot"/>
       </p:par>
     </p:tnLst>
   </p:timing>
@@ -4018,6 +5144,243 @@
       </p:grpSpPr>
       <p:sp>
         <p:nvSpPr>
+          <p:cNvPr id="2" name="Foliennummernplatzhalter 1"/>
+          <p:cNvSpPr>
+            <a:spLocks noGrp="1"/>
+          </p:cNvSpPr>
+          <p:nvPr>
+            <p:ph type="sldNum" sz="quarter" idx="11"/>
+          </p:nvPr>
+        </p:nvSpPr>
+        <p:spPr/>
+        <p:txBody>
+          <a:bodyPr/>
+          <a:lstStyle/>
+          <a:p>
+            <a:fld id="{B69F85DD-1765-4155-BE31-DCDCF098BCB6}" type="slidenum">
+              <a:rPr lang="de-DE" smtClean="0"/>
+              <a:pPr/>
+              <a:t>15</a:t>
+            </a:fld>
+            <a:endParaRPr lang="de-DE"/>
+          </a:p>
+        </p:txBody>
+      </p:sp>
+      <p:sp>
+        <p:nvSpPr>
+          <p:cNvPr id="3" name="Untertitel 2"/>
+          <p:cNvSpPr>
+            <a:spLocks noGrp="1"/>
+          </p:cNvSpPr>
+          <p:nvPr>
+            <p:ph type="subTitle" idx="12"/>
+          </p:nvPr>
+        </p:nvSpPr>
+        <p:spPr/>
+        <p:txBody>
+          <a:bodyPr/>
+          <a:lstStyle/>
+          <a:p>
+            <a:r>
+              <a:rPr lang="de-DE" dirty="0" err="1" smtClean="0"/>
+              <a:t>Trajectories</a:t>
+            </a:r>
+            <a:endParaRPr lang="de-DE" dirty="0"/>
+          </a:p>
+        </p:txBody>
+      </p:sp>
+      <p:sp>
+        <p:nvSpPr>
+          <p:cNvPr id="4" name="Titel 3"/>
+          <p:cNvSpPr>
+            <a:spLocks noGrp="1"/>
+          </p:cNvSpPr>
+          <p:nvPr>
+            <p:ph type="title"/>
+          </p:nvPr>
+        </p:nvSpPr>
+        <p:spPr/>
+        <p:txBody>
+          <a:bodyPr/>
+          <a:lstStyle/>
+          <a:p>
+            <a:r>
+              <a:rPr lang="de-DE" dirty="0" smtClean="0"/>
+              <a:t>Evaluation</a:t>
+            </a:r>
+            <a:endParaRPr lang="de-DE" dirty="0"/>
+          </a:p>
+        </p:txBody>
+      </p:sp>
+      <p:sp>
+        <p:nvSpPr>
+          <p:cNvPr id="5" name="Inhaltsplatzhalter 4"/>
+          <p:cNvSpPr>
+            <a:spLocks noGrp="1"/>
+          </p:cNvSpPr>
+          <p:nvPr>
+            <p:ph sz="quarter" idx="13"/>
+          </p:nvPr>
+        </p:nvSpPr>
+        <p:spPr/>
+        <p:txBody>
+          <a:bodyPr/>
+          <a:lstStyle/>
+          <a:p>
+            <a:endParaRPr lang="de-DE" dirty="0"/>
+          </a:p>
+        </p:txBody>
+      </p:sp>
+    </p:spTree>
+    <p:extLst>
+      <p:ext uri="{BB962C8B-B14F-4D97-AF65-F5344CB8AC3E}">
+        <p14:creationId xmlns:p14="http://schemas.microsoft.com/office/powerpoint/2010/main" xmlns="" val="533356852"/>
+      </p:ext>
+    </p:extLst>
+  </p:cSld>
+  <p:clrMapOvr>
+    <a:masterClrMapping/>
+  </p:clrMapOvr>
+  <mc:AlternateContent xmlns:mc="http://schemas.openxmlformats.org/markup-compatibility/2006">
+    <mc:Choice xmlns:p14="http://schemas.microsoft.com/office/powerpoint/2010/main" xmlns="" Requires="p14">
+      <p:transition p14:dur="0"/>
+    </mc:Choice>
+    <mc:Fallback>
+      <p:transition/>
+    </mc:Fallback>
+  </mc:AlternateContent>
+  <p:timing>
+    <p:tnLst>
+      <p:par>
+        <p:cTn id="1" dur="indefinite" restart="never" nodeType="tmRoot"/>
+      </p:par>
+    </p:tnLst>
+  </p:timing>
+</p:sld>
+</file>
+
+<file path=ppt/slides/slide16.xml><?xml version="1.0" encoding="utf-8"?>
+<p:sld xmlns:a="http://schemas.openxmlformats.org/drawingml/2006/main" xmlns:r="http://schemas.openxmlformats.org/officeDocument/2006/relationships" xmlns:p="http://schemas.openxmlformats.org/presentationml/2006/main">
+  <p:cSld>
+    <p:spTree>
+      <p:nvGrpSpPr>
+        <p:cNvPr id="1" name=""/>
+        <p:cNvGrpSpPr/>
+        <p:nvPr/>
+      </p:nvGrpSpPr>
+      <p:grpSpPr>
+        <a:xfrm>
+          <a:off x="0" y="0"/>
+          <a:ext cx="0" cy="0"/>
+          <a:chOff x="0" y="0"/>
+          <a:chExt cx="0" cy="0"/>
+        </a:xfrm>
+      </p:grpSpPr>
+      <p:sp>
+        <p:nvSpPr>
+          <p:cNvPr id="2" name="Titel 1"/>
+          <p:cNvSpPr>
+            <a:spLocks noGrp="1"/>
+          </p:cNvSpPr>
+          <p:nvPr>
+            <p:ph type="ctrTitle"/>
+          </p:nvPr>
+        </p:nvSpPr>
+        <p:spPr/>
+        <p:txBody>
+          <a:bodyPr/>
+          <a:lstStyle/>
+          <a:p>
+            <a:r>
+              <a:rPr lang="de-CH" dirty="0">
+                <a:solidFill>
+                  <a:srgbClr val="00B0F0"/>
+                </a:solidFill>
+              </a:rPr>
+              <a:t>&gt;&gt;</a:t>
+            </a:r>
+            <a:r>
+              <a:rPr lang="de-CH" dirty="0"/>
+              <a:t> </a:t>
+            </a:r>
+            <a:r>
+              <a:rPr lang="de-CH" dirty="0" smtClean="0"/>
+              <a:t>Backup</a:t>
+            </a:r>
+            <a:endParaRPr lang="de-DE" dirty="0"/>
+          </a:p>
+        </p:txBody>
+      </p:sp>
+      <p:sp>
+        <p:nvSpPr>
+          <p:cNvPr id="3" name="Untertitel 2"/>
+          <p:cNvSpPr>
+            <a:spLocks noGrp="1"/>
+          </p:cNvSpPr>
+          <p:nvPr>
+            <p:ph type="subTitle" idx="1"/>
+          </p:nvPr>
+        </p:nvSpPr>
+        <p:spPr/>
+        <p:txBody>
+          <a:bodyPr/>
+          <a:lstStyle/>
+          <a:p>
+            <a:r>
+              <a:rPr lang="de-CH" dirty="0" smtClean="0"/>
+              <a:t> </a:t>
+            </a:r>
+            <a:endParaRPr lang="de-DE" dirty="0"/>
+          </a:p>
+        </p:txBody>
+      </p:sp>
+    </p:spTree>
+    <p:extLst>
+      <p:ext uri="{BB962C8B-B14F-4D97-AF65-F5344CB8AC3E}">
+        <p14:creationId xmlns:p14="http://schemas.microsoft.com/office/powerpoint/2010/main" xmlns="" val="289141002"/>
+      </p:ext>
+    </p:extLst>
+  </p:cSld>
+  <p:clrMapOvr>
+    <a:masterClrMapping/>
+  </p:clrMapOvr>
+  <mc:AlternateContent xmlns:mc="http://schemas.openxmlformats.org/markup-compatibility/2006">
+    <mc:Choice xmlns:p14="http://schemas.microsoft.com/office/powerpoint/2010/main" xmlns="" Requires="p14">
+      <p:transition p14:dur="0"/>
+    </mc:Choice>
+    <mc:Fallback>
+      <p:transition/>
+    </mc:Fallback>
+  </mc:AlternateContent>
+  <p:timing>
+    <p:tnLst>
+      <p:par>
+        <p:cTn id="1" dur="indefinite" restart="never" nodeType="tmRoot"/>
+      </p:par>
+    </p:tnLst>
+  </p:timing>
+</p:sld>
+</file>
+
+<file path=ppt/slides/slide17.xml><?xml version="1.0" encoding="utf-8"?>
+<p:sld xmlns:a="http://schemas.openxmlformats.org/drawingml/2006/main" xmlns:r="http://schemas.openxmlformats.org/officeDocument/2006/relationships" xmlns:p="http://schemas.openxmlformats.org/presentationml/2006/main">
+  <p:cSld>
+    <p:spTree>
+      <p:nvGrpSpPr>
+        <p:cNvPr id="1" name=""/>
+        <p:cNvGrpSpPr/>
+        <p:nvPr/>
+      </p:nvGrpSpPr>
+      <p:grpSpPr>
+        <a:xfrm>
+          <a:off x="0" y="0"/>
+          <a:ext cx="0" cy="0"/>
+          <a:chOff x="0" y="0"/>
+          <a:chExt cx="0" cy="0"/>
+        </a:xfrm>
+      </p:grpSpPr>
+      <p:sp>
+        <p:nvSpPr>
           <p:cNvPr id="2" name="Slide Number Placeholder 1"/>
           <p:cNvSpPr>
             <a:spLocks noGrp="1"/>
@@ -4034,7 +5397,7 @@
             <a:fld id="{B69F85DD-1765-4155-BE31-DCDCF098BCB6}" type="slidenum">
               <a:rPr lang="de-DE"/>
               <a:pPr/>
-              <a:t>15</a:t>
+              <a:t>17</a:t>
             </a:fld>
             <a:endParaRPr lang="de-DE"/>
           </a:p>
@@ -4100,21 +5463,28 @@
     </p:spTree>
     <p:extLst>
       <p:ext uri="{BB962C8B-B14F-4D97-AF65-F5344CB8AC3E}">
-        <p14:creationId xmlns:p14="http://schemas.microsoft.com/office/powerpoint/2010/main" val="166370413"/>
+        <p14:creationId xmlns:p14="http://schemas.microsoft.com/office/powerpoint/2010/main" xmlns="" val="166370413"/>
       </p:ext>
     </p:extLst>
   </p:cSld>
   <p:clrMapOvr>
     <a:masterClrMapping/>
   </p:clrMapOvr>
-  <mc:AlternateContent xmlns:mc="http://schemas.openxmlformats.org/markup-compatibility/2006" xmlns:p14="http://schemas.microsoft.com/office/powerpoint/2010/main">
-    <mc:Choice Requires="p14">
+  <mc:AlternateContent xmlns:mc="http://schemas.openxmlformats.org/markup-compatibility/2006">
+    <mc:Choice xmlns:p14="http://schemas.microsoft.com/office/powerpoint/2010/main" xmlns="" Requires="p14">
       <p:transition p14:dur="0"/>
     </mc:Choice>
-    <mc:Fallback xmlns="">
+    <mc:Fallback>
       <p:transition/>
     </mc:Fallback>
   </mc:AlternateContent>
+  <p:timing>
+    <p:tnLst>
+      <p:par>
+        <p:cTn id="1" dur="indefinite" restart="never" nodeType="tmRoot"/>
+      </p:par>
+    </p:tnLst>
+  </p:timing>
 </p:sld>
 </file>
 
@@ -4500,21 +5870,28 @@
     </p:spTree>
     <p:extLst>
       <p:ext uri="{BB962C8B-B14F-4D97-AF65-F5344CB8AC3E}">
-        <p14:creationId xmlns:p14="http://schemas.microsoft.com/office/powerpoint/2010/main" val="4237116540"/>
+        <p14:creationId xmlns:p14="http://schemas.microsoft.com/office/powerpoint/2010/main" xmlns="" val="4237116540"/>
       </p:ext>
     </p:extLst>
   </p:cSld>
   <p:clrMapOvr>
     <a:masterClrMapping/>
   </p:clrMapOvr>
-  <mc:AlternateContent xmlns:mc="http://schemas.openxmlformats.org/markup-compatibility/2006" xmlns:p14="http://schemas.microsoft.com/office/powerpoint/2010/main">
-    <mc:Choice Requires="p14">
+  <mc:AlternateContent xmlns:mc="http://schemas.openxmlformats.org/markup-compatibility/2006">
+    <mc:Choice xmlns:p14="http://schemas.microsoft.com/office/powerpoint/2010/main" xmlns="" Requires="p14">
       <p:transition p14:dur="0"/>
     </mc:Choice>
-    <mc:Fallback xmlns="">
+    <mc:Fallback>
       <p:transition/>
     </mc:Fallback>
   </mc:AlternateContent>
+  <p:timing>
+    <p:tnLst>
+      <p:par>
+        <p:cTn id="1" dur="indefinite" restart="never" nodeType="tmRoot"/>
+      </p:par>
+    </p:tnLst>
+  </p:timing>
 </p:sld>
 </file>
 
@@ -4568,10 +5945,10 @@
           <p:nvPr/>
         </p:nvPicPr>
         <p:blipFill>
-          <a:blip r:embed="rId2">
+          <a:blip r:embed="rId2" cstate="print">
             <a:extLst>
               <a:ext uri="{28A0092B-C50C-407E-A947-70E740481C1C}">
-                <a14:useLocalDpi xmlns:a14="http://schemas.microsoft.com/office/drawing/2010/main" val="0"/>
+                <a14:useLocalDpi xmlns:a14="http://schemas.microsoft.com/office/drawing/2010/main" xmlns="" val="0"/>
               </a:ext>
             </a:extLst>
           </a:blip>
@@ -4600,10 +5977,10 @@
           </p:nvPr>
         </p:nvPicPr>
         <p:blipFill rotWithShape="1">
-          <a:blip r:embed="rId3">
+          <a:blip r:embed="rId3" cstate="print">
             <a:extLst>
               <a:ext uri="{28A0092B-C50C-407E-A947-70E740481C1C}">
-                <a14:useLocalDpi xmlns:a14="http://schemas.microsoft.com/office/drawing/2010/main" val="0"/>
+                <a14:useLocalDpi xmlns:a14="http://schemas.microsoft.com/office/drawing/2010/main" xmlns="" val="0"/>
               </a:ext>
             </a:extLst>
           </a:blip>
@@ -4672,10 +6049,10 @@
           <p:nvPr/>
         </p:nvPicPr>
         <p:blipFill>
-          <a:blip r:embed="rId4">
+          <a:blip r:embed="rId4" cstate="print">
             <a:extLst>
               <a:ext uri="{28A0092B-C50C-407E-A947-70E740481C1C}">
-                <a14:useLocalDpi xmlns:a14="http://schemas.microsoft.com/office/drawing/2010/main" val="0"/>
+                <a14:useLocalDpi xmlns:a14="http://schemas.microsoft.com/office/drawing/2010/main" xmlns="" val="0"/>
               </a:ext>
             </a:extLst>
           </a:blip>
@@ -4696,21 +6073,28 @@
     </p:spTree>
     <p:extLst>
       <p:ext uri="{BB962C8B-B14F-4D97-AF65-F5344CB8AC3E}">
-        <p14:creationId xmlns:p14="http://schemas.microsoft.com/office/powerpoint/2010/main" val="825980652"/>
+        <p14:creationId xmlns:p14="http://schemas.microsoft.com/office/powerpoint/2010/main" xmlns="" val="825980652"/>
       </p:ext>
     </p:extLst>
   </p:cSld>
   <p:clrMapOvr>
     <a:masterClrMapping/>
   </p:clrMapOvr>
-  <mc:AlternateContent xmlns:mc="http://schemas.openxmlformats.org/markup-compatibility/2006" xmlns:p14="http://schemas.microsoft.com/office/powerpoint/2010/main">
-    <mc:Choice Requires="p14">
+  <mc:AlternateContent xmlns:mc="http://schemas.openxmlformats.org/markup-compatibility/2006">
+    <mc:Choice xmlns:p14="http://schemas.microsoft.com/office/powerpoint/2010/main" xmlns="" Requires="p14">
       <p:transition p14:dur="0"/>
     </mc:Choice>
-    <mc:Fallback xmlns="">
+    <mc:Fallback>
       <p:transition/>
     </mc:Fallback>
   </mc:AlternateContent>
+  <p:timing>
+    <p:tnLst>
+      <p:par>
+        <p:cTn id="1" dur="indefinite" restart="never" nodeType="tmRoot"/>
+      </p:par>
+    </p:tnLst>
+  </p:timing>
 </p:sld>
 </file>
 
@@ -4865,21 +6249,28 @@
     </p:spTree>
     <p:extLst>
       <p:ext uri="{BB962C8B-B14F-4D97-AF65-F5344CB8AC3E}">
-        <p14:creationId xmlns:p14="http://schemas.microsoft.com/office/powerpoint/2010/main" val="3000962235"/>
+        <p14:creationId xmlns:p14="http://schemas.microsoft.com/office/powerpoint/2010/main" xmlns="" val="3000962235"/>
       </p:ext>
     </p:extLst>
   </p:cSld>
   <p:clrMapOvr>
     <a:masterClrMapping/>
   </p:clrMapOvr>
-  <mc:AlternateContent xmlns:mc="http://schemas.openxmlformats.org/markup-compatibility/2006" xmlns:p14="http://schemas.microsoft.com/office/powerpoint/2010/main">
-    <mc:Choice Requires="p14">
+  <mc:AlternateContent xmlns:mc="http://schemas.openxmlformats.org/markup-compatibility/2006">
+    <mc:Choice xmlns:p14="http://schemas.microsoft.com/office/powerpoint/2010/main" xmlns="" Requires="p14">
       <p:transition p14:dur="0"/>
     </mc:Choice>
-    <mc:Fallback xmlns="">
+    <mc:Fallback>
       <p:transition/>
     </mc:Fallback>
   </mc:AlternateContent>
+  <p:timing>
+    <p:tnLst>
+      <p:par>
+        <p:cTn id="1" dur="indefinite" restart="never" nodeType="tmRoot"/>
+      </p:par>
+    </p:tnLst>
+  </p:timing>
 </p:sld>
 </file>
 
@@ -4992,21 +6383,28 @@
     </p:spTree>
     <p:extLst>
       <p:ext uri="{BB962C8B-B14F-4D97-AF65-F5344CB8AC3E}">
-        <p14:creationId xmlns:p14="http://schemas.microsoft.com/office/powerpoint/2010/main" val="2498159707"/>
+        <p14:creationId xmlns:p14="http://schemas.microsoft.com/office/powerpoint/2010/main" xmlns="" val="2498159707"/>
       </p:ext>
     </p:extLst>
   </p:cSld>
   <p:clrMapOvr>
     <a:masterClrMapping/>
   </p:clrMapOvr>
-  <mc:AlternateContent xmlns:mc="http://schemas.openxmlformats.org/markup-compatibility/2006" xmlns:p14="http://schemas.microsoft.com/office/powerpoint/2010/main">
-    <mc:Choice Requires="p14">
+  <mc:AlternateContent xmlns:mc="http://schemas.openxmlformats.org/markup-compatibility/2006">
+    <mc:Choice xmlns:p14="http://schemas.microsoft.com/office/powerpoint/2010/main" xmlns="" Requires="p14">
       <p:transition p14:dur="0"/>
     </mc:Choice>
-    <mc:Fallback xmlns="">
+    <mc:Fallback>
       <p:transition/>
     </mc:Fallback>
   </mc:AlternateContent>
+  <p:timing>
+    <p:tnLst>
+      <p:par>
+        <p:cTn id="1" dur="indefinite" restart="never" nodeType="tmRoot"/>
+      </p:par>
+    </p:tnLst>
+  </p:timing>
 </p:sld>
 </file>
 
@@ -5133,21 +6531,28 @@
     </p:spTree>
     <p:extLst>
       <p:ext uri="{BB962C8B-B14F-4D97-AF65-F5344CB8AC3E}">
-        <p14:creationId xmlns:p14="http://schemas.microsoft.com/office/powerpoint/2010/main" val="4153126855"/>
+        <p14:creationId xmlns:p14="http://schemas.microsoft.com/office/powerpoint/2010/main" xmlns="" val="4153126855"/>
       </p:ext>
     </p:extLst>
   </p:cSld>
   <p:clrMapOvr>
     <a:masterClrMapping/>
   </p:clrMapOvr>
-  <mc:AlternateContent xmlns:mc="http://schemas.openxmlformats.org/markup-compatibility/2006" xmlns:p14="http://schemas.microsoft.com/office/powerpoint/2010/main">
-    <mc:Choice Requires="p14">
+  <mc:AlternateContent xmlns:mc="http://schemas.openxmlformats.org/markup-compatibility/2006">
+    <mc:Choice xmlns:p14="http://schemas.microsoft.com/office/powerpoint/2010/main" xmlns="" Requires="p14">
       <p:transition p14:dur="0"/>
     </mc:Choice>
-    <mc:Fallback xmlns="">
+    <mc:Fallback>
       <p:transition/>
     </mc:Fallback>
   </mc:AlternateContent>
+  <p:timing>
+    <p:tnLst>
+      <p:par>
+        <p:cTn id="1" dur="indefinite" restart="never" nodeType="tmRoot"/>
+      </p:par>
+    </p:tnLst>
+  </p:timing>
 </p:sld>
 </file>
 
@@ -5256,10 +6661,10 @@
           </p:nvPr>
         </p:nvPicPr>
         <p:blipFill rotWithShape="1">
-          <a:blip r:embed="rId2">
+          <a:blip r:embed="rId2" cstate="print">
             <a:extLst>
               <a:ext uri="{28A0092B-C50C-407E-A947-70E740481C1C}">
-                <a14:useLocalDpi xmlns:a14="http://schemas.microsoft.com/office/drawing/2010/main" val="0"/>
+                <a14:useLocalDpi xmlns:a14="http://schemas.microsoft.com/office/drawing/2010/main" xmlns="" val="0"/>
               </a:ext>
             </a:extLst>
           </a:blip>
@@ -5276,21 +6681,28 @@
     </p:spTree>
     <p:extLst>
       <p:ext uri="{BB962C8B-B14F-4D97-AF65-F5344CB8AC3E}">
-        <p14:creationId xmlns:p14="http://schemas.microsoft.com/office/powerpoint/2010/main" val="1599841371"/>
+        <p14:creationId xmlns:p14="http://schemas.microsoft.com/office/powerpoint/2010/main" xmlns="" val="1599841371"/>
       </p:ext>
     </p:extLst>
   </p:cSld>
   <p:clrMapOvr>
     <a:masterClrMapping/>
   </p:clrMapOvr>
-  <mc:AlternateContent xmlns:mc="http://schemas.openxmlformats.org/markup-compatibility/2006" xmlns:p14="http://schemas.microsoft.com/office/powerpoint/2010/main">
-    <mc:Choice Requires="p14">
+  <mc:AlternateContent xmlns:mc="http://schemas.openxmlformats.org/markup-compatibility/2006">
+    <mc:Choice xmlns:p14="http://schemas.microsoft.com/office/powerpoint/2010/main" xmlns="" Requires="p14">
       <p:transition p14:dur="0"/>
     </mc:Choice>
-    <mc:Fallback xmlns="">
+    <mc:Fallback>
       <p:transition/>
     </mc:Fallback>
   </mc:AlternateContent>
+  <p:timing>
+    <p:tnLst>
+      <p:par>
+        <p:cTn id="1" dur="indefinite" restart="never" nodeType="tmRoot"/>
+      </p:par>
+    </p:tnLst>
+  </p:timing>
 </p:sld>
 </file>
 
@@ -5400,10 +6812,10 @@
           </p:nvPr>
         </p:nvPicPr>
         <p:blipFill rotWithShape="1">
-          <a:blip r:embed="rId3">
+          <a:blip r:embed="rId3" cstate="print">
             <a:extLst>
               <a:ext uri="{28A0092B-C50C-407E-A947-70E740481C1C}">
-                <a14:useLocalDpi xmlns:a14="http://schemas.microsoft.com/office/drawing/2010/main" val="0"/>
+                <a14:useLocalDpi xmlns:a14="http://schemas.microsoft.com/office/drawing/2010/main" xmlns="" val="0"/>
               </a:ext>
             </a:extLst>
           </a:blip>
@@ -5426,10 +6838,10 @@
           <p:nvPr/>
         </p:nvPicPr>
         <p:blipFill rotWithShape="1">
-          <a:blip r:embed="rId4">
+          <a:blip r:embed="rId4" cstate="print">
             <a:extLst>
               <a:ext uri="{28A0092B-C50C-407E-A947-70E740481C1C}">
-                <a14:useLocalDpi xmlns:a14="http://schemas.microsoft.com/office/drawing/2010/main" val="0"/>
+                <a14:useLocalDpi xmlns:a14="http://schemas.microsoft.com/office/drawing/2010/main" xmlns="" val="0"/>
               </a:ext>
             </a:extLst>
           </a:blip>
@@ -5455,7 +6867,7 @@
           <p:nvPr>
             <p:extLst>
               <p:ext uri="{D42A27DB-BD31-4B8C-83A1-F6EECF244321}">
-                <p14:modId xmlns:p14="http://schemas.microsoft.com/office/powerpoint/2010/main" val="4135257245"/>
+                <p14:modId xmlns:p14="http://schemas.microsoft.com/office/powerpoint/2010/main" xmlns="" val="4135257245"/>
               </p:ext>
             </p:extLst>
           </p:nvPr>
@@ -5466,40 +6878,9 @@
         </p:xfrm>
         <a:graphic>
           <a:graphicData uri="http://schemas.openxmlformats.org/presentationml/2006/ole">
-            <mc:AlternateContent xmlns:mc="http://schemas.openxmlformats.org/markup-compatibility/2006">
-              <mc:Choice xmlns:v="urn:schemas-microsoft-com:vml" Requires="v">
-                <p:oleObj spid="_x0000_s1049" name="Formel" r:id="rId5" imgW="1295400" imgH="787400" progId="Equation.3">
-                  <p:embed/>
-                </p:oleObj>
-              </mc:Choice>
-              <mc:Fallback>
-                <p:oleObj name="Formel" r:id="rId5" imgW="1295400" imgH="787400" progId="Equation.3">
-                  <p:embed/>
-                  <p:pic>
-                    <p:nvPicPr>
-                      <p:cNvPr id="0" name=""/>
-                      <p:cNvPicPr/>
-                      <p:nvPr/>
-                    </p:nvPicPr>
-                    <p:blipFill>
-                      <a:blip r:embed="rId6"/>
-                      <a:stretch>
-                        <a:fillRect/>
-                      </a:stretch>
-                    </p:blipFill>
-                    <p:spPr>
-                      <a:xfrm>
-                        <a:off x="246649" y="4664982"/>
-                        <a:ext cx="1735565" cy="1073901"/>
-                      </a:xfrm>
-                      <a:prstGeom prst="rect">
-                        <a:avLst/>
-                      </a:prstGeom>
-                    </p:spPr>
-                  </p:pic>
-                </p:oleObj>
-              </mc:Fallback>
-            </mc:AlternateContent>
+            <p:oleObj spid="_x0000_s1049" name="Formel" r:id="rId5" imgW="1279800" imgH="776880" progId="Equation.3">
+              <p:embed/>
+            </p:oleObj>
           </a:graphicData>
         </a:graphic>
       </p:graphicFrame>
@@ -5512,7 +6893,7 @@
           <p:nvPr>
             <p:extLst>
               <p:ext uri="{D42A27DB-BD31-4B8C-83A1-F6EECF244321}">
-                <p14:modId xmlns:p14="http://schemas.microsoft.com/office/powerpoint/2010/main" val="3059197637"/>
+                <p14:modId xmlns:p14="http://schemas.microsoft.com/office/powerpoint/2010/main" xmlns="" val="3059197637"/>
               </p:ext>
             </p:extLst>
           </p:nvPr>
@@ -5523,40 +6904,9 @@
         </p:xfrm>
         <a:graphic>
           <a:graphicData uri="http://schemas.openxmlformats.org/presentationml/2006/ole">
-            <mc:AlternateContent xmlns:mc="http://schemas.openxmlformats.org/markup-compatibility/2006">
-              <mc:Choice xmlns:v="urn:schemas-microsoft-com:vml" Requires="v">
-                <p:oleObj spid="_x0000_s1050" name="Formel" r:id="rId7" imgW="800100" imgH="393700" progId="Equation.3">
-                  <p:embed/>
-                </p:oleObj>
-              </mc:Choice>
-              <mc:Fallback>
-                <p:oleObj name="Formel" r:id="rId7" imgW="800100" imgH="393700" progId="Equation.3">
-                  <p:embed/>
-                  <p:pic>
-                    <p:nvPicPr>
-                      <p:cNvPr id="0" name=""/>
-                      <p:cNvPicPr/>
-                      <p:nvPr/>
-                    </p:nvPicPr>
-                    <p:blipFill>
-                      <a:blip r:embed="rId8"/>
-                      <a:stretch>
-                        <a:fillRect/>
-                      </a:stretch>
-                    </p:blipFill>
-                    <p:spPr>
-                      <a:xfrm>
-                        <a:off x="2239889" y="4587768"/>
-                        <a:ext cx="1295400" cy="647700"/>
-                      </a:xfrm>
-                      <a:prstGeom prst="rect">
-                        <a:avLst/>
-                      </a:prstGeom>
-                    </p:spPr>
-                  </p:pic>
-                </p:oleObj>
-              </mc:Fallback>
-            </mc:AlternateContent>
+            <p:oleObj spid="_x0000_s1050" name="Formel" r:id="rId6" imgW="786240" imgH="383760" progId="Equation.3">
+              <p:embed/>
+            </p:oleObj>
           </a:graphicData>
         </a:graphic>
       </p:graphicFrame>
@@ -5569,7 +6919,7 @@
           <p:nvPr>
             <p:extLst>
               <p:ext uri="{D42A27DB-BD31-4B8C-83A1-F6EECF244321}">
-                <p14:modId xmlns:p14="http://schemas.microsoft.com/office/powerpoint/2010/main" val="3694390986"/>
+                <p14:modId xmlns:p14="http://schemas.microsoft.com/office/powerpoint/2010/main" xmlns="" val="3694390986"/>
               </p:ext>
             </p:extLst>
           </p:nvPr>
@@ -5580,65 +6930,34 @@
         </p:xfrm>
         <a:graphic>
           <a:graphicData uri="http://schemas.openxmlformats.org/presentationml/2006/ole">
-            <mc:AlternateContent xmlns:mc="http://schemas.openxmlformats.org/markup-compatibility/2006">
-              <mc:Choice xmlns:v="urn:schemas-microsoft-com:vml" Requires="v">
-                <p:oleObj spid="_x0000_s1051" name="Formel" r:id="rId9" imgW="1752600" imgH="457200" progId="Equation.3">
-                  <p:embed/>
-                </p:oleObj>
-              </mc:Choice>
-              <mc:Fallback>
-                <p:oleObj name="Formel" r:id="rId9" imgW="1752600" imgH="457200" progId="Equation.3">
-                  <p:embed/>
-                  <p:pic>
-                    <p:nvPicPr>
-                      <p:cNvPr id="0" name=""/>
-                      <p:cNvPicPr/>
-                      <p:nvPr/>
-                    </p:nvPicPr>
-                    <p:blipFill>
-                      <a:blip r:embed="rId10"/>
-                      <a:stretch>
-                        <a:fillRect/>
-                      </a:stretch>
-                    </p:blipFill>
-                    <p:spPr>
-                      <a:xfrm>
-                        <a:off x="2192700" y="5506028"/>
-                        <a:ext cx="2835275" cy="754062"/>
-                      </a:xfrm>
-                      <a:prstGeom prst="rect">
-                        <a:avLst/>
-                      </a:prstGeom>
-                    </p:spPr>
-                  </p:pic>
-                </p:oleObj>
-              </mc:Fallback>
-            </mc:AlternateContent>
+            <p:oleObj spid="_x0000_s1051" name="Formel" r:id="rId7" imgW="1737000" imgH="447840" progId="Equation.3">
+              <p:embed/>
+            </p:oleObj>
           </a:graphicData>
         </a:graphic>
       </p:graphicFrame>
     </p:spTree>
     <p:extLst>
       <p:ext uri="{BB962C8B-B14F-4D97-AF65-F5344CB8AC3E}">
-        <p14:creationId xmlns:p14="http://schemas.microsoft.com/office/powerpoint/2010/main" val="2101599046"/>
+        <p14:creationId xmlns:p14="http://schemas.microsoft.com/office/powerpoint/2010/main" xmlns="" val="2101599046"/>
       </p:ext>
     </p:extLst>
   </p:cSld>
   <p:clrMapOvr>
     <a:masterClrMapping/>
   </p:clrMapOvr>
-  <mc:AlternateContent xmlns:mc="http://schemas.openxmlformats.org/markup-compatibility/2006" xmlns:p14="http://schemas.microsoft.com/office/powerpoint/2010/main">
-    <mc:Choice Requires="p14">
+  <mc:AlternateContent xmlns:mc="http://schemas.openxmlformats.org/markup-compatibility/2006">
+    <mc:Choice xmlns:p14="http://schemas.microsoft.com/office/powerpoint/2010/main" xmlns="" Requires="p14">
       <p:transition p14:dur="0"/>
     </mc:Choice>
-    <mc:Fallback xmlns="">
+    <mc:Fallback>
       <p:transition/>
     </mc:Fallback>
   </mc:AlternateContent>
   <p:timing>
     <p:tnLst>
       <p:par>
-        <p:cTn xmlns:p14="http://schemas.microsoft.com/office/powerpoint/2010/main" id="1" dur="indefinite" restart="never" nodeType="tmRoot"/>
+        <p:cTn id="1" dur="indefinite" restart="never" nodeType="tmRoot"/>
       </p:par>
     </p:tnLst>
   </p:timing>
@@ -5726,7 +7045,7 @@
         <p:spPr/>
         <p:txBody>
           <a:bodyPr>
-            <a:normAutofit fontScale="90000"/>
+            <a:normAutofit/>
           </a:bodyPr>
           <a:lstStyle/>
           <a:p>
@@ -5765,10 +7084,10 @@
           </p:nvPr>
         </p:nvPicPr>
         <p:blipFill rotWithShape="1">
-          <a:blip r:embed="rId2">
+          <a:blip r:embed="rId2" cstate="print">
             <a:extLst>
               <a:ext uri="{28A0092B-C50C-407E-A947-70E740481C1C}">
-                <a14:useLocalDpi xmlns:a14="http://schemas.microsoft.com/office/drawing/2010/main" val="0"/>
+                <a14:useLocalDpi xmlns:a14="http://schemas.microsoft.com/office/drawing/2010/main" xmlns="" val="0"/>
               </a:ext>
             </a:extLst>
           </a:blip>
@@ -5870,10 +7189,10 @@
             <p:nvPr/>
           </p:nvPicPr>
           <p:blipFill rotWithShape="1">
-            <a:blip r:embed="rId3">
+            <a:blip r:embed="rId3" cstate="print">
               <a:extLst>
                 <a:ext uri="{28A0092B-C50C-407E-A947-70E740481C1C}">
-                  <a14:useLocalDpi xmlns:a14="http://schemas.microsoft.com/office/drawing/2010/main" val="0"/>
+                  <a14:useLocalDpi xmlns:a14="http://schemas.microsoft.com/office/drawing/2010/main" xmlns="" val="0"/>
                 </a:ext>
               </a:extLst>
             </a:blip>
@@ -6296,21 +7615,28 @@
     </p:spTree>
     <p:extLst>
       <p:ext uri="{BB962C8B-B14F-4D97-AF65-F5344CB8AC3E}">
-        <p14:creationId xmlns:p14="http://schemas.microsoft.com/office/powerpoint/2010/main" val="3126738451"/>
+        <p14:creationId xmlns:p14="http://schemas.microsoft.com/office/powerpoint/2010/main" xmlns="" val="3126738451"/>
       </p:ext>
     </p:extLst>
   </p:cSld>
   <p:clrMapOvr>
     <a:masterClrMapping/>
   </p:clrMapOvr>
-  <mc:AlternateContent xmlns:mc="http://schemas.openxmlformats.org/markup-compatibility/2006" xmlns:p14="http://schemas.microsoft.com/office/powerpoint/2010/main">
-    <mc:Choice Requires="p14">
+  <mc:AlternateContent xmlns:mc="http://schemas.openxmlformats.org/markup-compatibility/2006">
+    <mc:Choice xmlns:p14="http://schemas.microsoft.com/office/powerpoint/2010/main" xmlns="" Requires="p14">
       <p:transition p14:dur="0"/>
     </mc:Choice>
-    <mc:Fallback xmlns="">
+    <mc:Fallback>
       <p:transition/>
     </mc:Fallback>
   </mc:AlternateContent>
+  <p:timing>
+    <p:tnLst>
+      <p:par>
+        <p:cTn id="1" dur="indefinite" restart="never" nodeType="tmRoot"/>
+      </p:par>
+    </p:tnLst>
+  </p:timing>
 </p:sld>
 </file>
 
@@ -6537,21 +7863,13 @@
   <a:objectDefaults>
     <a:spDef>
       <a:spPr bwMode="auto">
-        <a:xfrm>
-          <a:off x="0" y="0"/>
-          <a:ext cx="1" cy="1"/>
-        </a:xfrm>
-        <a:custGeom>
-          <a:avLst/>
-          <a:gdLst/>
-          <a:ahLst/>
-          <a:cxnLst/>
-          <a:rect l="0" t="0" r="0" b="0"/>
-          <a:pathLst/>
-        </a:custGeom>
-        <a:noFill/>
+        <a:solidFill>
+          <a:schemeClr val="bg1"/>
+        </a:solidFill>
         <a:ln w="9525" cap="flat" cmpd="sng" algn="ctr">
-          <a:noFill/>
+          <a:solidFill>
+            <a:schemeClr val="tx1"/>
+          </a:solidFill>
           <a:prstDash val="solid"/>
           <a:round/>
           <a:headEnd type="none" w="med" len="med"/>
@@ -6559,7 +7877,7 @@
         </a:ln>
         <a:effectLst/>
       </a:spPr>
-      <a:bodyPr vert="horz" wrap="square" lIns="0" tIns="36000" rIns="0" bIns="36000" numCol="1" anchor="t" anchorCtr="0" compatLnSpc="1">
+      <a:bodyPr vert="horz" wrap="square" lIns="0" tIns="36000" rIns="0" bIns="36000" numCol="1" rtlCol="0" anchor="ctr" anchorCtr="1" compatLnSpc="1">
         <a:prstTxWarp prst="textNoShape">
           <a:avLst/>
         </a:prstTxWarp>
@@ -6582,7 +7900,7 @@
           <a:buFont typeface="Wingdings" pitchFamily="16" charset="2"/>
           <a:buNone/>
           <a:tabLst/>
-          <a:defRPr kumimoji="0" lang="en-GB" sz="1600" b="0" i="0" u="none" strike="noStrike" cap="none" normalizeH="0" baseline="0" smtClean="0">
+          <a:defRPr kumimoji="0" sz="2000" b="0" i="0" u="none" strike="noStrike" cap="none" normalizeH="0" baseline="0" dirty="0" smtClean="0">
             <a:ln>
               <a:noFill/>
             </a:ln>

</xml_diff>